<commit_message>
numerous small bug fixes and user friendly features 2
</commit_message>
<xml_diff>
--- a/Launcher-presentation.pptx
+++ b/Launcher-presentation.pptx
@@ -5,10 +5,10 @@
     <p:sldMasterId id="2147483648" r:id="rId1"/>
   </p:sldMasterIdLst>
   <p:notesMasterIdLst>
-    <p:notesMasterId r:id="rId21"/>
+    <p:notesMasterId r:id="rId29"/>
   </p:notesMasterIdLst>
   <p:handoutMasterIdLst>
-    <p:handoutMasterId r:id="rId22"/>
+    <p:handoutMasterId r:id="rId30"/>
   </p:handoutMasterIdLst>
   <p:sldIdLst>
     <p:sldId id="256" r:id="rId2"/>
@@ -29,7 +29,15 @@
     <p:sldId id="316" r:id="rId17"/>
     <p:sldId id="315" r:id="rId18"/>
     <p:sldId id="317" r:id="rId19"/>
-    <p:sldId id="318" r:id="rId20"/>
+    <p:sldId id="324" r:id="rId20"/>
+    <p:sldId id="325" r:id="rId21"/>
+    <p:sldId id="318" r:id="rId22"/>
+    <p:sldId id="326" r:id="rId23"/>
+    <p:sldId id="327" r:id="rId24"/>
+    <p:sldId id="328" r:id="rId25"/>
+    <p:sldId id="329" r:id="rId26"/>
+    <p:sldId id="330" r:id="rId27"/>
+    <p:sldId id="331" r:id="rId28"/>
   </p:sldIdLst>
   <p:sldSz cx="9144000" cy="6858000" type="screen4x3"/>
   <p:notesSz cx="6858000" cy="9144000"/>
@@ -8004,13 +8012,9 @@
           <a:p>
             <a:r>
               <a:rPr lang="en-US" dirty="0" smtClean="0"/>
-              <a:t>2. I/</a:t>
-            </a:r>
-            <a:r>
-              <a:rPr lang="en-US" smtClean="0"/>
-              <a:t>O destinations</a:t>
-            </a:r>
-            <a:endParaRPr lang="en-US"/>
+              <a:t>2. I/O destinations</a:t>
+            </a:r>
+            <a:endParaRPr lang="en-US" dirty="0"/>
           </a:p>
         </p:txBody>
       </p:sp>
@@ -8514,94 +8518,6 @@
                 <a:latin typeface="Avenir Book"/>
               </a:rPr>
               <a:t>) or stored when working off line.</a:t>
-            </a:r>
-            <a:endParaRPr lang="en-US" dirty="0">
-              <a:solidFill>
-                <a:schemeClr val="accent1">
-                  <a:lumMod val="50000"/>
-                </a:schemeClr>
-              </a:solidFill>
-              <a:latin typeface="Avenir Book"/>
-            </a:endParaRPr>
-          </a:p>
-        </p:txBody>
-      </p:sp>
-      <p:sp>
-        <p:nvSpPr>
-          <p:cNvPr id="10" name="Rounded Rectangular Callout 9"/>
-          <p:cNvSpPr/>
-          <p:nvPr/>
-        </p:nvSpPr>
-        <p:spPr>
-          <a:xfrm>
-            <a:off x="5194596" y="3259235"/>
-            <a:ext cx="3197698" cy="711587"/>
-          </a:xfrm>
-          <a:prstGeom prst="wedgeRoundRectCallout">
-            <a:avLst>
-              <a:gd name="adj1" fmla="val -81249"/>
-              <a:gd name="adj2" fmla="val 140044"/>
-              <a:gd name="adj3" fmla="val 16667"/>
-            </a:avLst>
-          </a:prstGeom>
-          <a:noFill/>
-          <a:ln w="25400">
-            <a:solidFill>
-              <a:srgbClr val="6C0424"/>
-            </a:solidFill>
-          </a:ln>
-          <a:effectLst/>
-        </p:spPr>
-        <p:style>
-          <a:lnRef idx="1">
-            <a:schemeClr val="accent1"/>
-          </a:lnRef>
-          <a:fillRef idx="3">
-            <a:schemeClr val="accent1"/>
-          </a:fillRef>
-          <a:effectRef idx="2">
-            <a:schemeClr val="accent1"/>
-          </a:effectRef>
-          <a:fontRef idx="minor">
-            <a:schemeClr val="lt1"/>
-          </a:fontRef>
-        </p:style>
-        <p:txBody>
-          <a:bodyPr rtlCol="0" anchor="ctr"/>
-          <a:lstStyle/>
-          <a:p>
-            <a:r>
-              <a:rPr lang="en-US" dirty="0" smtClean="0">
-                <a:solidFill>
-                  <a:schemeClr val="accent1">
-                    <a:lumMod val="50000"/>
-                  </a:schemeClr>
-                </a:solidFill>
-                <a:latin typeface="Avenir Book"/>
-              </a:rPr>
-              <a:t>Optional subfolder (relative to </a:t>
-            </a:r>
-            <a:r>
-              <a:rPr lang="en-US" i="1" dirty="0" smtClean="0">
-                <a:solidFill>
-                  <a:schemeClr val="accent1">
-                    <a:lumMod val="50000"/>
-                  </a:schemeClr>
-                </a:solidFill>
-                <a:latin typeface="Avenir Book"/>
-              </a:rPr>
-              <a:t>location</a:t>
-            </a:r>
-            <a:r>
-              <a:rPr lang="en-US" dirty="0" smtClean="0">
-                <a:solidFill>
-                  <a:schemeClr val="accent1">
-                    <a:lumMod val="50000"/>
-                  </a:schemeClr>
-                </a:solidFill>
-                <a:latin typeface="Avenir Book"/>
-              </a:rPr>
-              <a:t>) goes here.</a:t>
             </a:r>
             <a:endParaRPr lang="en-US" dirty="0">
               <a:solidFill>
@@ -8703,51 +8619,6 @@
                                           </p:stCondLst>
                                         </p:cTn>
                                         <p:tgtEl>
-                                          <p:spTgt spid="10"/>
-                                        </p:tgtEl>
-                                        <p:attrNameLst>
-                                          <p:attrName>style.visibility</p:attrName>
-                                        </p:attrNameLst>
-                                      </p:cBhvr>
-                                      <p:to>
-                                        <p:strVal val="visible"/>
-                                      </p:to>
-                                    </p:set>
-                                  </p:childTnLst>
-                                </p:cTn>
-                              </p:par>
-                            </p:childTnLst>
-                          </p:cTn>
-                        </p:par>
-                      </p:childTnLst>
-                    </p:cTn>
-                  </p:par>
-                  <p:par>
-                    <p:cTn id="11" fill="hold">
-                      <p:stCondLst>
-                        <p:cond delay="indefinite"/>
-                      </p:stCondLst>
-                      <p:childTnLst>
-                        <p:par>
-                          <p:cTn id="12" fill="hold">
-                            <p:stCondLst>
-                              <p:cond delay="0"/>
-                            </p:stCondLst>
-                            <p:childTnLst>
-                              <p:par>
-                                <p:cTn id="13" presetID="1" presetClass="entr" presetSubtype="0" fill="hold" grpId="0" nodeType="clickEffect">
-                                  <p:stCondLst>
-                                    <p:cond delay="0"/>
-                                  </p:stCondLst>
-                                  <p:childTnLst>
-                                    <p:set>
-                                      <p:cBhvr>
-                                        <p:cTn id="14" dur="1" fill="hold">
-                                          <p:stCondLst>
-                                            <p:cond delay="0"/>
-                                          </p:stCondLst>
-                                        </p:cTn>
-                                        <p:tgtEl>
                                           <p:spTgt spid="9"/>
                                         </p:tgtEl>
                                         <p:attrNameLst>
@@ -8791,7 +8662,6 @@
     <p:bldLst>
       <p:bldP spid="8" grpId="0" animBg="1"/>
       <p:bldP spid="9" grpId="0" animBg="1"/>
-      <p:bldP spid="10" grpId="0" animBg="1"/>
     </p:bldLst>
   </p:timing>
 </p:sld>
@@ -8829,7 +8699,11 @@
           <a:bodyPr/>
           <a:lstStyle/>
           <a:p>
-            <a:endParaRPr lang="en-US"/>
+            <a:r>
+              <a:rPr lang="en-US" dirty="0"/>
+              <a:t>2. I/O destinations</a:t>
+            </a:r>
+            <a:endParaRPr lang="en-US" dirty="0"/>
           </a:p>
         </p:txBody>
       </p:sp>
@@ -9106,13 +8980,13 @@
         </p:nvSpPr>
         <p:spPr>
           <a:xfrm>
-            <a:off x="4999306" y="2288271"/>
-            <a:ext cx="3566283" cy="1224000"/>
+            <a:off x="4999306" y="2288270"/>
+            <a:ext cx="3566283" cy="1575581"/>
           </a:xfrm>
           <a:prstGeom prst="wedgeRoundRectCallout">
             <a:avLst>
-              <a:gd name="adj1" fmla="val -68933"/>
-              <a:gd name="adj2" fmla="val 54754"/>
+              <a:gd name="adj1" fmla="val -69312"/>
+              <a:gd name="adj2" fmla="val 35890"/>
               <a:gd name="adj3" fmla="val 16667"/>
             </a:avLst>
           </a:prstGeom>
@@ -9173,7 +9047,18 @@
                 </a:solidFill>
                 <a:latin typeface="Avenir Book"/>
               </a:rPr>
-              <a:t>” that script will be loaded, and all fields above will be set</a:t>
+              <a:t>” that script will be loaded, and all fields above will be </a:t>
+            </a:r>
+            <a:r>
+              <a:rPr lang="en-US" dirty="0" smtClean="0">
+                <a:solidFill>
+                  <a:schemeClr val="accent1">
+                    <a:lumMod val="50000"/>
+                  </a:schemeClr>
+                </a:solidFill>
+                <a:latin typeface="Avenir Book"/>
+              </a:rPr>
+              <a:t>set according to the job script</a:t>
             </a:r>
             <a:endParaRPr lang="en-US" dirty="0">
               <a:solidFill>
@@ -9309,7 +9194,11 @@
           <a:bodyPr/>
           <a:lstStyle/>
           <a:p>
-            <a:endParaRPr lang="en-US"/>
+            <a:r>
+              <a:rPr lang="en-US" dirty="0"/>
+              <a:t>2. I/O destinations</a:t>
+            </a:r>
+            <a:endParaRPr lang="en-US" dirty="0"/>
           </a:p>
         </p:txBody>
       </p:sp>
@@ -9641,13 +9530,13 @@
         </p:nvSpPr>
         <p:spPr>
           <a:xfrm>
-            <a:off x="4796631" y="2288271"/>
-            <a:ext cx="3890169" cy="684000"/>
+            <a:off x="4796631" y="2288269"/>
+            <a:ext cx="3890169" cy="994653"/>
           </a:xfrm>
           <a:prstGeom prst="wedgeRoundRectCallout">
             <a:avLst>
               <a:gd name="adj1" fmla="val -88569"/>
-              <a:gd name="adj2" fmla="val 113618"/>
+              <a:gd name="adj2" fmla="val 63362"/>
               <a:gd name="adj3" fmla="val 16667"/>
             </a:avLst>
           </a:prstGeom>
@@ -9706,7 +9595,40 @@
                 </a:solidFill>
                 <a:latin typeface="Avenir Book"/>
               </a:rPr>
-              <a:t> destination folder, the job name will be added</a:t>
+              <a:t> destination </a:t>
+            </a:r>
+            <a:r>
+              <a:rPr lang="en-US" dirty="0" smtClean="0">
+                <a:solidFill>
+                  <a:schemeClr val="accent1">
+                    <a:lumMod val="50000"/>
+                  </a:schemeClr>
+                </a:solidFill>
+                <a:latin typeface="Avenir Book"/>
+              </a:rPr>
+              <a:t>folder to your preference, </a:t>
+            </a:r>
+            <a:r>
+              <a:rPr lang="en-US" dirty="0" smtClean="0">
+                <a:solidFill>
+                  <a:schemeClr val="accent1">
+                    <a:lumMod val="50000"/>
+                  </a:schemeClr>
+                </a:solidFill>
+                <a:latin typeface="Avenir Book"/>
+              </a:rPr>
+              <a:t>the job name will be </a:t>
+            </a:r>
+            <a:r>
+              <a:rPr lang="en-US" dirty="0" smtClean="0">
+                <a:solidFill>
+                  <a:schemeClr val="accent1">
+                    <a:lumMod val="50000"/>
+                  </a:schemeClr>
+                </a:solidFill>
+                <a:latin typeface="Avenir Book"/>
+              </a:rPr>
+              <a:t>added.</a:t>
             </a:r>
             <a:endParaRPr lang="en-US" dirty="0">
               <a:solidFill>
@@ -9911,7 +9833,11 @@
           <a:bodyPr/>
           <a:lstStyle/>
           <a:p>
-            <a:endParaRPr lang="en-US"/>
+            <a:r>
+              <a:rPr lang="en-US" dirty="0"/>
+              <a:t>2. I/O destinations</a:t>
+            </a:r>
+            <a:endParaRPr lang="en-US" dirty="0"/>
           </a:p>
         </p:txBody>
       </p:sp>
@@ -10164,13 +10090,13 @@
         </p:nvSpPr>
         <p:spPr>
           <a:xfrm>
-            <a:off x="4466243" y="2325664"/>
-            <a:ext cx="4173913" cy="684000"/>
+            <a:off x="6019800" y="4570267"/>
+            <a:ext cx="2269955" cy="862690"/>
           </a:xfrm>
           <a:prstGeom prst="wedgeRoundRectCallout">
             <a:avLst>
-              <a:gd name="adj1" fmla="val -80233"/>
-              <a:gd name="adj2" fmla="val 267679"/>
+              <a:gd name="adj1" fmla="val -137618"/>
+              <a:gd name="adj2" fmla="val 8144"/>
               <a:gd name="adj3" fmla="val 16667"/>
             </a:avLst>
           </a:prstGeom>
@@ -10229,7 +10155,18 @@
                 </a:solidFill>
                 <a:latin typeface="Avenir Book"/>
               </a:rPr>
-              <a:t>destination folder here, ...    and here</a:t>
+              <a:t>destination folder </a:t>
+            </a:r>
+            <a:r>
+              <a:rPr lang="en-US" dirty="0" smtClean="0">
+                <a:solidFill>
+                  <a:schemeClr val="accent1">
+                    <a:lumMod val="50000"/>
+                  </a:schemeClr>
+                </a:solidFill>
+                <a:latin typeface="Avenir Book"/>
+              </a:rPr>
+              <a:t>here</a:t>
             </a:r>
             <a:endParaRPr lang="en-US" dirty="0">
               <a:solidFill>
@@ -10244,19 +10181,19 @@
       </p:sp>
       <p:sp>
         <p:nvSpPr>
-          <p:cNvPr id="12" name="Rounded Rectangular Callout 11"/>
+          <p:cNvPr id="13" name="Rounded Rectangular Callout 12"/>
           <p:cNvSpPr/>
           <p:nvPr/>
         </p:nvSpPr>
         <p:spPr>
           <a:xfrm>
-            <a:off x="4466243" y="2325664"/>
-            <a:ext cx="4173913" cy="684000"/>
+            <a:off x="6019800" y="3134314"/>
+            <a:ext cx="2269955" cy="667726"/>
           </a:xfrm>
           <a:prstGeom prst="wedgeRoundRectCallout">
             <a:avLst>
-              <a:gd name="adj1" fmla="val -39768"/>
-              <a:gd name="adj2" fmla="val 261754"/>
+              <a:gd name="adj1" fmla="val -109642"/>
+              <a:gd name="adj2" fmla="val 190239"/>
               <a:gd name="adj3" fmla="val 16667"/>
             </a:avLst>
           </a:prstGeom>
@@ -10295,27 +10232,7 @@
                 </a:solidFill>
                 <a:latin typeface="Avenir Book"/>
               </a:rPr>
-              <a:t>change the </a:t>
-            </a:r>
-            <a:r>
-              <a:rPr lang="en-US" b="1" dirty="0" smtClean="0">
-                <a:solidFill>
-                  <a:srgbClr val="800000"/>
-                </a:solidFill>
-                <a:latin typeface="Avenir Book"/>
-              </a:rPr>
-              <a:t>remote </a:t>
-            </a:r>
-            <a:r>
-              <a:rPr lang="en-US" dirty="0" smtClean="0">
-                <a:solidFill>
-                  <a:schemeClr val="accent1">
-                    <a:lumMod val="50000"/>
-                  </a:schemeClr>
-                </a:solidFill>
-                <a:latin typeface="Avenir Book"/>
-              </a:rPr>
-              <a:t>destination folder here, ...    and here</a:t>
+              <a:t>optional subfolder goes here</a:t>
             </a:r>
             <a:endParaRPr lang="en-US" dirty="0">
               <a:solidFill>
@@ -10417,7 +10334,7 @@
                                           </p:stCondLst>
                                         </p:cTn>
                                         <p:tgtEl>
-                                          <p:spTgt spid="12"/>
+                                          <p:spTgt spid="13"/>
                                         </p:tgtEl>
                                         <p:attrNameLst>
                                           <p:attrName>style.visibility</p:attrName>
@@ -10459,7 +10376,7 @@
     </p:tnLst>
     <p:bldLst>
       <p:bldP spid="9" grpId="0" animBg="1"/>
-      <p:bldP spid="12" grpId="0" animBg="1"/>
+      <p:bldP spid="13" grpId="0" animBg="1"/>
     </p:bldLst>
   </p:timing>
 </p:sld>
@@ -10482,30 +10399,69 @@
           <a:chExt cx="0" cy="0"/>
         </a:xfrm>
       </p:grpSpPr>
-      <p:pic>
-        <p:nvPicPr>
-          <p:cNvPr id="10" name="Picture 9"/>
-          <p:cNvPicPr>
-            <a:picLocks noChangeAspect="1"/>
-          </p:cNvPicPr>
+      <p:grpSp>
+        <p:nvGrpSpPr>
+          <p:cNvPr id="19" name="Group 18"/>
+          <p:cNvGrpSpPr/>
           <p:nvPr/>
-        </p:nvPicPr>
-        <p:blipFill>
-          <a:blip r:embed="rId2"/>
-          <a:stretch>
-            <a:fillRect/>
-          </a:stretch>
-        </p:blipFill>
-        <p:spPr>
+        </p:nvGrpSpPr>
+        <p:grpSpPr>
           <a:xfrm>
-            <a:off x="177800" y="2743200"/>
-            <a:ext cx="8775700" cy="1371600"/>
+            <a:off x="4025899" y="1404290"/>
+            <a:ext cx="4660900" cy="5030408"/>
+            <a:chOff x="4025899" y="1404290"/>
+            <a:chExt cx="4660900" cy="5030408"/>
           </a:xfrm>
-          <a:prstGeom prst="rect">
-            <a:avLst/>
-          </a:prstGeom>
-        </p:spPr>
-      </p:pic>
+        </p:grpSpPr>
+        <p:pic>
+          <p:nvPicPr>
+            <p:cNvPr id="17" name="Picture 16"/>
+            <p:cNvPicPr>
+              <a:picLocks noChangeAspect="1"/>
+            </p:cNvPicPr>
+            <p:nvPr/>
+          </p:nvPicPr>
+          <p:blipFill>
+            <a:blip r:embed="rId2"/>
+            <a:stretch>
+              <a:fillRect/>
+            </a:stretch>
+          </p:blipFill>
+          <p:spPr>
+            <a:xfrm>
+              <a:off x="4025899" y="1404290"/>
+              <a:ext cx="4660900" cy="4292600"/>
+            </a:xfrm>
+            <a:prstGeom prst="rect">
+              <a:avLst/>
+            </a:prstGeom>
+          </p:spPr>
+        </p:pic>
+        <p:pic>
+          <p:nvPicPr>
+            <p:cNvPr id="18" name="Picture 17"/>
+            <p:cNvPicPr>
+              <a:picLocks noChangeAspect="1"/>
+            </p:cNvPicPr>
+            <p:nvPr/>
+          </p:nvPicPr>
+          <p:blipFill>
+            <a:blip r:embed="rId3"/>
+            <a:stretch>
+              <a:fillRect/>
+            </a:stretch>
+          </p:blipFill>
+          <p:spPr>
+            <a:xfrm>
+              <a:off x="6178880" y="5075798"/>
+              <a:ext cx="2082800" cy="1358900"/>
+            </a:xfrm>
+            <a:prstGeom prst="rect">
+              <a:avLst/>
+            </a:prstGeom>
+          </p:spPr>
+        </p:pic>
+      </p:grpSp>
       <p:sp>
         <p:nvSpPr>
           <p:cNvPr id="2" name="Title 1"/>
@@ -10521,7 +10477,11 @@
           <a:bodyPr/>
           <a:lstStyle/>
           <a:p>
-            <a:endParaRPr lang="en-US"/>
+            <a:r>
+              <a:rPr lang="en-US" dirty="0" smtClean="0"/>
+              <a:t>3. Adding commands and modules</a:t>
+            </a:r>
+            <a:endParaRPr lang="en-US" dirty="0"/>
           </a:p>
         </p:txBody>
       </p:sp>
@@ -10761,8 +10721,45 @@
                 <a:latin typeface="Avenir Book"/>
                 <a:cs typeface="Avenir Book"/>
               </a:rPr>
-              <a:t>executing your job script ...</a:t>
-            </a:r>
+              <a:t>select the </a:t>
+            </a:r>
+            <a:br>
+              <a:rPr lang="en-US" dirty="0" smtClean="0">
+                <a:latin typeface="Avenir Book"/>
+                <a:cs typeface="Avenir Book"/>
+              </a:rPr>
+            </a:br>
+            <a:r>
+              <a:rPr lang="en-US" i="1" dirty="0" smtClean="0">
+                <a:latin typeface="Avenir Book"/>
+                <a:cs typeface="Avenir Book"/>
+              </a:rPr>
+              <a:t>Job script</a:t>
+            </a:r>
+            <a:r>
+              <a:rPr lang="en-US" dirty="0" smtClean="0">
+                <a:latin typeface="Avenir Book"/>
+                <a:cs typeface="Avenir Book"/>
+              </a:rPr>
+              <a:t> </a:t>
+            </a:r>
+            <a:br>
+              <a:rPr lang="en-US" dirty="0" smtClean="0">
+                <a:latin typeface="Avenir Book"/>
+                <a:cs typeface="Avenir Book"/>
+              </a:rPr>
+            </a:br>
+            <a:r>
+              <a:rPr lang="en-US" dirty="0" smtClean="0">
+                <a:latin typeface="Avenir Book"/>
+                <a:cs typeface="Avenir Book"/>
+              </a:rPr>
+              <a:t>page</a:t>
+            </a:r>
+            <a:endParaRPr lang="en-US" dirty="0" smtClean="0">
+              <a:latin typeface="Avenir Book"/>
+              <a:cs typeface="Avenir Book"/>
+            </a:endParaRPr>
           </a:p>
         </p:txBody>
       </p:sp>
@@ -10774,13 +10771,13 @@
         </p:nvSpPr>
         <p:spPr>
           <a:xfrm>
-            <a:off x="5439081" y="3845396"/>
-            <a:ext cx="4173913" cy="684000"/>
+            <a:off x="320845" y="4458291"/>
+            <a:ext cx="3327295" cy="1350997"/>
           </a:xfrm>
           <a:prstGeom prst="wedgeRoundRectCallout">
             <a:avLst>
-              <a:gd name="adj1" fmla="val -80233"/>
-              <a:gd name="adj2" fmla="val 267679"/>
+              <a:gd name="adj1" fmla="val 122033"/>
+              <a:gd name="adj2" fmla="val 28939"/>
               <a:gd name="adj3" fmla="val 16667"/>
             </a:avLst>
           </a:prstGeom>
@@ -10819,27 +10816,7 @@
                 </a:solidFill>
                 <a:latin typeface="Avenir Book"/>
               </a:rPr>
-              <a:t>change the </a:t>
-            </a:r>
-            <a:r>
-              <a:rPr lang="en-US" b="1" dirty="0" smtClean="0">
-                <a:solidFill>
-                  <a:srgbClr val="800000"/>
-                </a:solidFill>
-                <a:latin typeface="Avenir Book"/>
-              </a:rPr>
-              <a:t>remote </a:t>
-            </a:r>
-            <a:r>
-              <a:rPr lang="en-US" dirty="0" smtClean="0">
-                <a:solidFill>
-                  <a:schemeClr val="accent1">
-                    <a:lumMod val="50000"/>
-                  </a:schemeClr>
-                </a:solidFill>
-                <a:latin typeface="Avenir Book"/>
-              </a:rPr>
-              <a:t>destination folder here, ...    and here</a:t>
+              <a:t>add modules here, manually or using the list (which will be empty if you don’t have a connection the first time)</a:t>
             </a:r>
             <a:endParaRPr lang="en-US" dirty="0">
               <a:solidFill>
@@ -10854,19 +10831,19 @@
       </p:sp>
       <p:sp>
         <p:nvSpPr>
-          <p:cNvPr id="12" name="Rounded Rectangular Callout 11"/>
+          <p:cNvPr id="13" name="Rounded Rectangular Callout 12"/>
           <p:cNvSpPr/>
           <p:nvPr/>
         </p:nvSpPr>
         <p:spPr>
           <a:xfrm>
-            <a:off x="642448" y="4187396"/>
-            <a:ext cx="2086903" cy="684000"/>
+            <a:off x="320844" y="3269414"/>
+            <a:ext cx="3327297" cy="972718"/>
           </a:xfrm>
           <a:prstGeom prst="wedgeRoundRectCallout">
             <a:avLst>
-              <a:gd name="adj1" fmla="val 8791"/>
-              <a:gd name="adj2" fmla="val -158951"/>
+              <a:gd name="adj1" fmla="val 70164"/>
+              <a:gd name="adj2" fmla="val -45872"/>
               <a:gd name="adj3" fmla="val 16667"/>
             </a:avLst>
           </a:prstGeom>
@@ -10905,29 +10882,7 @@
                 </a:solidFill>
                 <a:latin typeface="Avenir Book"/>
               </a:rPr>
-              <a:t>create a job script </a:t>
-            </a:r>
-            <a:r>
-              <a:rPr lang="en-US" dirty="0">
-                <a:solidFill>
-                  <a:schemeClr val="accent1">
-                    <a:lumMod val="50000"/>
-                  </a:schemeClr>
-                </a:solidFill>
-                <a:latin typeface="Avenir Book"/>
-              </a:rPr>
-              <a:t>and save </a:t>
-            </a:r>
-            <a:r>
-              <a:rPr lang="en-US" dirty="0" smtClean="0">
-                <a:solidFill>
-                  <a:schemeClr val="accent1">
-                    <a:lumMod val="50000"/>
-                  </a:schemeClr>
-                </a:solidFill>
-                <a:latin typeface="Avenir Book"/>
-              </a:rPr>
-              <a:t>it locally</a:t>
+              <a:t>you can edit the job script, the Resources page will follow</a:t>
             </a:r>
             <a:endParaRPr lang="en-US" dirty="0">
               <a:solidFill>
@@ -10943,7 +10898,7 @@
     </p:spTree>
     <p:extLst>
       <p:ext uri="{BB962C8B-B14F-4D97-AF65-F5344CB8AC3E}">
-        <p14:creationId xmlns:p14="http://schemas.microsoft.com/office/powerpoint/2010/main" val="632518436"/>
+        <p14:creationId xmlns:p14="http://schemas.microsoft.com/office/powerpoint/2010/main" val="2715966278"/>
       </p:ext>
     </p:extLst>
   </p:cSld>
@@ -11029,6 +10984,2099 @@
                                           </p:stCondLst>
                                         </p:cTn>
                                         <p:tgtEl>
+                                          <p:spTgt spid="13"/>
+                                        </p:tgtEl>
+                                        <p:attrNameLst>
+                                          <p:attrName>style.visibility</p:attrName>
+                                        </p:attrNameLst>
+                                      </p:cBhvr>
+                                      <p:to>
+                                        <p:strVal val="visible"/>
+                                      </p:to>
+                                    </p:set>
+                                  </p:childTnLst>
+                                </p:cTn>
+                              </p:par>
+                            </p:childTnLst>
+                          </p:cTn>
+                        </p:par>
+                      </p:childTnLst>
+                    </p:cTn>
+                  </p:par>
+                </p:childTnLst>
+              </p:cTn>
+              <p:prevCondLst>
+                <p:cond evt="onPrev" delay="0">
+                  <p:tgtEl>
+                    <p:sldTgt/>
+                  </p:tgtEl>
+                </p:cond>
+              </p:prevCondLst>
+              <p:nextCondLst>
+                <p:cond evt="onNext" delay="0">
+                  <p:tgtEl>
+                    <p:sldTgt/>
+                  </p:tgtEl>
+                </p:cond>
+              </p:nextCondLst>
+            </p:seq>
+          </p:childTnLst>
+        </p:cTn>
+      </p:par>
+    </p:tnLst>
+    <p:bldLst>
+      <p:bldP spid="9" grpId="0" animBg="1"/>
+      <p:bldP spid="13" grpId="0" animBg="1"/>
+    </p:bldLst>
+  </p:timing>
+</p:sld>
+</file>
+
+<file path=ppt/slides/slide2.xml><?xml version="1.0" encoding="utf-8"?>
+<p:sld xmlns:a="http://schemas.openxmlformats.org/drawingml/2006/main" xmlns:r="http://schemas.openxmlformats.org/officeDocument/2006/relationships" xmlns:p="http://schemas.openxmlformats.org/presentationml/2006/main">
+  <p:cSld>
+    <p:spTree>
+      <p:nvGrpSpPr>
+        <p:cNvPr id="1" name=""/>
+        <p:cNvGrpSpPr/>
+        <p:nvPr/>
+      </p:nvGrpSpPr>
+      <p:grpSpPr>
+        <a:xfrm>
+          <a:off x="0" y="0"/>
+          <a:ext cx="0" cy="0"/>
+          <a:chOff x="0" y="0"/>
+          <a:chExt cx="0" cy="0"/>
+        </a:xfrm>
+      </p:grpSpPr>
+      <p:sp>
+        <p:nvSpPr>
+          <p:cNvPr id="2" name="Title 1"/>
+          <p:cNvSpPr>
+            <a:spLocks noGrp="1"/>
+          </p:cNvSpPr>
+          <p:nvPr>
+            <p:ph type="title"/>
+          </p:nvPr>
+        </p:nvSpPr>
+        <p:spPr/>
+        <p:txBody>
+          <a:bodyPr/>
+          <a:lstStyle/>
+          <a:p>
+            <a:endParaRPr lang="en-US" dirty="0"/>
+          </a:p>
+        </p:txBody>
+      </p:sp>
+      <p:sp>
+        <p:nvSpPr>
+          <p:cNvPr id="3" name="Content Placeholder 2"/>
+          <p:cNvSpPr>
+            <a:spLocks noGrp="1"/>
+          </p:cNvSpPr>
+          <p:nvPr>
+            <p:ph idx="1"/>
+          </p:nvPr>
+        </p:nvSpPr>
+        <p:spPr/>
+        <p:txBody>
+          <a:bodyPr/>
+          <a:lstStyle/>
+          <a:p>
+            <a:pPr marL="0" indent="0">
+              <a:buNone/>
+            </a:pPr>
+            <a:r>
+              <a:rPr lang="en-US" dirty="0" smtClean="0"/>
+              <a:t>Launcher is a GUI for </a:t>
+            </a:r>
+          </a:p>
+          <a:p>
+            <a:r>
+              <a:rPr lang="en-US" dirty="0" smtClean="0"/>
+              <a:t>easy resource allocation</a:t>
+            </a:r>
+          </a:p>
+          <a:p>
+            <a:r>
+              <a:rPr lang="en-US" dirty="0" smtClean="0"/>
+              <a:t>job script creation</a:t>
+            </a:r>
+          </a:p>
+          <a:p>
+            <a:r>
+              <a:rPr lang="en-US" dirty="0" smtClean="0"/>
+              <a:t>submitting jobs</a:t>
+            </a:r>
+          </a:p>
+          <a:p>
+            <a:r>
+              <a:rPr lang="en-US" dirty="0" smtClean="0"/>
+              <a:t>retrieving and storing results</a:t>
+            </a:r>
+          </a:p>
+          <a:p>
+            <a:r>
+              <a:rPr lang="en-US" dirty="0" smtClean="0"/>
+              <a:t>VSC clusters</a:t>
+            </a:r>
+          </a:p>
+          <a:p>
+            <a:pPr lvl="1"/>
+            <a:r>
+              <a:rPr lang="en-US" dirty="0" smtClean="0"/>
+              <a:t>currently only Hopper and Turing</a:t>
+            </a:r>
+            <a:endParaRPr lang="en-US" dirty="0"/>
+          </a:p>
+        </p:txBody>
+      </p:sp>
+      <p:sp>
+        <p:nvSpPr>
+          <p:cNvPr id="4" name="Date Placeholder 3"/>
+          <p:cNvSpPr>
+            <a:spLocks noGrp="1"/>
+          </p:cNvSpPr>
+          <p:nvPr>
+            <p:ph type="dt" sz="half" idx="10"/>
+          </p:nvPr>
+        </p:nvSpPr>
+        <p:spPr/>
+        <p:txBody>
+          <a:bodyPr/>
+          <a:lstStyle/>
+          <a:p>
+            <a:fld id="{575CC414-8FA8-3A46-A15A-107E8D313399}" type="datetime6">
+              <a:rPr lang="en-US" smtClean="0"/>
+              <a:t>May 15</a:t>
+            </a:fld>
+            <a:endParaRPr lang="en-US"/>
+          </a:p>
+        </p:txBody>
+      </p:sp>
+      <p:sp>
+        <p:nvSpPr>
+          <p:cNvPr id="5" name="Footer Placeholder 4"/>
+          <p:cNvSpPr>
+            <a:spLocks noGrp="1"/>
+          </p:cNvSpPr>
+          <p:nvPr>
+            <p:ph type="ftr" sz="quarter" idx="11"/>
+          </p:nvPr>
+        </p:nvSpPr>
+        <p:spPr/>
+        <p:txBody>
+          <a:bodyPr/>
+          <a:lstStyle/>
+          <a:p>
+            <a:r>
+              <a:rPr lang="en-US" dirty="0" smtClean="0"/>
+              <a:t>Launcher-presentation</a:t>
+            </a:r>
+          </a:p>
+        </p:txBody>
+      </p:sp>
+      <p:sp>
+        <p:nvSpPr>
+          <p:cNvPr id="6" name="Slide Number Placeholder 5"/>
+          <p:cNvSpPr>
+            <a:spLocks noGrp="1"/>
+          </p:cNvSpPr>
+          <p:nvPr>
+            <p:ph type="sldNum" sz="quarter" idx="12"/>
+          </p:nvPr>
+        </p:nvSpPr>
+        <p:spPr/>
+        <p:txBody>
+          <a:bodyPr/>
+          <a:lstStyle/>
+          <a:p>
+            <a:fld id="{1F70BE4E-F0F4-974B-B603-7347B10BD271}" type="slidenum">
+              <a:rPr lang="en-US" smtClean="0"/>
+              <a:t>1</a:t>
+            </a:fld>
+            <a:endParaRPr lang="en-US"/>
+          </a:p>
+        </p:txBody>
+      </p:sp>
+    </p:spTree>
+    <p:extLst>
+      <p:ext uri="{BB962C8B-B14F-4D97-AF65-F5344CB8AC3E}">
+        <p14:creationId xmlns:p14="http://schemas.microsoft.com/office/powerpoint/2010/main" val="67010969"/>
+      </p:ext>
+    </p:extLst>
+  </p:cSld>
+  <p:clrMapOvr>
+    <a:masterClrMapping/>
+  </p:clrMapOvr>
+  <p:timing>
+    <p:tnLst>
+      <p:par>
+        <p:cTn xmlns:p14="http://schemas.microsoft.com/office/powerpoint/2010/main" id="1" dur="indefinite" restart="never" nodeType="tmRoot"/>
+      </p:par>
+    </p:tnLst>
+  </p:timing>
+</p:sld>
+</file>
+
+<file path=ppt/slides/slide20.xml><?xml version="1.0" encoding="utf-8"?>
+<p:sld xmlns:a="http://schemas.openxmlformats.org/drawingml/2006/main" xmlns:r="http://schemas.openxmlformats.org/officeDocument/2006/relationships" xmlns:p="http://schemas.openxmlformats.org/presentationml/2006/main">
+  <p:cSld>
+    <p:spTree>
+      <p:nvGrpSpPr>
+        <p:cNvPr id="1" name=""/>
+        <p:cNvGrpSpPr/>
+        <p:nvPr/>
+      </p:nvGrpSpPr>
+      <p:grpSpPr>
+        <a:xfrm>
+          <a:off x="0" y="0"/>
+          <a:ext cx="0" cy="0"/>
+          <a:chOff x="0" y="0"/>
+          <a:chExt cx="0" cy="0"/>
+        </a:xfrm>
+      </p:grpSpPr>
+      <p:sp>
+        <p:nvSpPr>
+          <p:cNvPr id="2" name="Title 1"/>
+          <p:cNvSpPr>
+            <a:spLocks noGrp="1"/>
+          </p:cNvSpPr>
+          <p:nvPr>
+            <p:ph type="title"/>
+          </p:nvPr>
+        </p:nvSpPr>
+        <p:spPr/>
+        <p:txBody>
+          <a:bodyPr/>
+          <a:lstStyle/>
+          <a:p>
+            <a:r>
+              <a:rPr lang="en-US" dirty="0" smtClean="0"/>
+              <a:t>a (very) simple job script</a:t>
+            </a:r>
+            <a:endParaRPr lang="en-US" dirty="0"/>
+          </a:p>
+        </p:txBody>
+      </p:sp>
+      <p:sp>
+        <p:nvSpPr>
+          <p:cNvPr id="3" name="Date Placeholder 2"/>
+          <p:cNvSpPr>
+            <a:spLocks noGrp="1"/>
+          </p:cNvSpPr>
+          <p:nvPr>
+            <p:ph type="dt" sz="half" idx="10"/>
+          </p:nvPr>
+        </p:nvSpPr>
+        <p:spPr/>
+        <p:txBody>
+          <a:bodyPr/>
+          <a:lstStyle/>
+          <a:p>
+            <a:fld id="{A6EF29A7-BBF5-A84F-8C8E-08BE54B3CC62}" type="datetime6">
+              <a:rPr lang="en-US" smtClean="0"/>
+              <a:t>May 15</a:t>
+            </a:fld>
+            <a:endParaRPr lang="en-US"/>
+          </a:p>
+        </p:txBody>
+      </p:sp>
+      <p:sp>
+        <p:nvSpPr>
+          <p:cNvPr id="4" name="Footer Placeholder 3"/>
+          <p:cNvSpPr>
+            <a:spLocks noGrp="1"/>
+          </p:cNvSpPr>
+          <p:nvPr>
+            <p:ph type="ftr" sz="quarter" idx="11"/>
+          </p:nvPr>
+        </p:nvSpPr>
+        <p:spPr/>
+        <p:txBody>
+          <a:bodyPr/>
+          <a:lstStyle/>
+          <a:p>
+            <a:r>
+              <a:rPr lang="en-US" smtClean="0"/>
+              <a:t>Launcher-presentation</a:t>
+            </a:r>
+            <a:endParaRPr lang="en-US"/>
+          </a:p>
+        </p:txBody>
+      </p:sp>
+      <p:sp>
+        <p:nvSpPr>
+          <p:cNvPr id="5" name="Slide Number Placeholder 4"/>
+          <p:cNvSpPr>
+            <a:spLocks noGrp="1"/>
+          </p:cNvSpPr>
+          <p:nvPr>
+            <p:ph type="sldNum" sz="quarter" idx="12"/>
+          </p:nvPr>
+        </p:nvSpPr>
+        <p:spPr/>
+        <p:txBody>
+          <a:bodyPr/>
+          <a:lstStyle/>
+          <a:p>
+            <a:fld id="{1F70BE4E-F0F4-974B-B603-7347B10BD271}" type="slidenum">
+              <a:rPr lang="en-US" smtClean="0"/>
+              <a:t>19</a:t>
+            </a:fld>
+            <a:endParaRPr lang="en-US"/>
+          </a:p>
+        </p:txBody>
+      </p:sp>
+      <p:pic>
+        <p:nvPicPr>
+          <p:cNvPr id="6" name="Picture 5"/>
+          <p:cNvPicPr>
+            <a:picLocks noChangeAspect="1"/>
+          </p:cNvPicPr>
+          <p:nvPr/>
+        </p:nvPicPr>
+        <p:blipFill>
+          <a:blip r:embed="rId2"/>
+          <a:stretch>
+            <a:fillRect/>
+          </a:stretch>
+        </p:blipFill>
+        <p:spPr>
+          <a:xfrm>
+            <a:off x="1326482" y="1501775"/>
+            <a:ext cx="6667500" cy="5219700"/>
+          </a:xfrm>
+          <a:prstGeom prst="rect">
+            <a:avLst/>
+          </a:prstGeom>
+        </p:spPr>
+      </p:pic>
+    </p:spTree>
+    <p:extLst>
+      <p:ext uri="{BB962C8B-B14F-4D97-AF65-F5344CB8AC3E}">
+        <p14:creationId xmlns:p14="http://schemas.microsoft.com/office/powerpoint/2010/main" val="2344218825"/>
+      </p:ext>
+    </p:extLst>
+  </p:cSld>
+  <p:clrMapOvr>
+    <a:masterClrMapping/>
+  </p:clrMapOvr>
+  <p:timing>
+    <p:tnLst>
+      <p:par>
+        <p:cTn xmlns:p14="http://schemas.microsoft.com/office/powerpoint/2010/main" id="1" dur="indefinite" restart="never" nodeType="tmRoot"/>
+      </p:par>
+    </p:tnLst>
+  </p:timing>
+</p:sld>
+</file>
+
+<file path=ppt/slides/slide21.xml><?xml version="1.0" encoding="utf-8"?>
+<p:sld xmlns:a="http://schemas.openxmlformats.org/drawingml/2006/main" xmlns:r="http://schemas.openxmlformats.org/officeDocument/2006/relationships" xmlns:p="http://schemas.openxmlformats.org/presentationml/2006/main">
+  <p:cSld>
+    <p:spTree>
+      <p:nvGrpSpPr>
+        <p:cNvPr id="1" name=""/>
+        <p:cNvGrpSpPr/>
+        <p:nvPr/>
+      </p:nvGrpSpPr>
+      <p:grpSpPr>
+        <a:xfrm>
+          <a:off x="0" y="0"/>
+          <a:ext cx="0" cy="0"/>
+          <a:chOff x="0" y="0"/>
+          <a:chExt cx="0" cy="0"/>
+        </a:xfrm>
+      </p:grpSpPr>
+      <p:pic>
+        <p:nvPicPr>
+          <p:cNvPr id="8" name="Picture 7"/>
+          <p:cNvPicPr>
+            <a:picLocks noChangeAspect="1"/>
+          </p:cNvPicPr>
+          <p:nvPr/>
+        </p:nvPicPr>
+        <p:blipFill>
+          <a:blip r:embed="rId2"/>
+          <a:stretch>
+            <a:fillRect/>
+          </a:stretch>
+        </p:blipFill>
+        <p:spPr>
+          <a:xfrm>
+            <a:off x="1257300" y="1263520"/>
+            <a:ext cx="6629400" cy="4102100"/>
+          </a:xfrm>
+          <a:prstGeom prst="rect">
+            <a:avLst/>
+          </a:prstGeom>
+        </p:spPr>
+      </p:pic>
+      <p:sp>
+        <p:nvSpPr>
+          <p:cNvPr id="2" name="Title 1"/>
+          <p:cNvSpPr>
+            <a:spLocks noGrp="1"/>
+          </p:cNvSpPr>
+          <p:nvPr>
+            <p:ph type="title"/>
+          </p:nvPr>
+        </p:nvSpPr>
+        <p:spPr/>
+        <p:txBody>
+          <a:bodyPr/>
+          <a:lstStyle/>
+          <a:p>
+            <a:r>
+              <a:rPr lang="en-US" dirty="0" smtClean="0"/>
+              <a:t>4. job management</a:t>
+            </a:r>
+            <a:endParaRPr lang="en-US" dirty="0"/>
+          </a:p>
+        </p:txBody>
+      </p:sp>
+      <p:sp>
+        <p:nvSpPr>
+          <p:cNvPr id="3" name="Date Placeholder 2"/>
+          <p:cNvSpPr>
+            <a:spLocks noGrp="1"/>
+          </p:cNvSpPr>
+          <p:nvPr>
+            <p:ph type="dt" sz="half" idx="10"/>
+          </p:nvPr>
+        </p:nvSpPr>
+        <p:spPr/>
+        <p:txBody>
+          <a:bodyPr/>
+          <a:lstStyle/>
+          <a:p>
+            <a:fld id="{A6EF29A7-BBF5-A84F-8C8E-08BE54B3CC62}" type="datetime6">
+              <a:rPr lang="en-US" smtClean="0"/>
+              <a:t>May 15</a:t>
+            </a:fld>
+            <a:endParaRPr lang="en-US"/>
+          </a:p>
+        </p:txBody>
+      </p:sp>
+      <p:sp>
+        <p:nvSpPr>
+          <p:cNvPr id="4" name="Footer Placeholder 3"/>
+          <p:cNvSpPr>
+            <a:spLocks noGrp="1"/>
+          </p:cNvSpPr>
+          <p:nvPr>
+            <p:ph type="ftr" sz="quarter" idx="11"/>
+          </p:nvPr>
+        </p:nvSpPr>
+        <p:spPr/>
+        <p:txBody>
+          <a:bodyPr/>
+          <a:lstStyle/>
+          <a:p>
+            <a:r>
+              <a:rPr lang="en-US" smtClean="0"/>
+              <a:t>Launcher-presentation</a:t>
+            </a:r>
+            <a:endParaRPr lang="en-US"/>
+          </a:p>
+        </p:txBody>
+      </p:sp>
+      <p:sp>
+        <p:nvSpPr>
+          <p:cNvPr id="5" name="Slide Number Placeholder 4"/>
+          <p:cNvSpPr>
+            <a:spLocks noGrp="1"/>
+          </p:cNvSpPr>
+          <p:nvPr>
+            <p:ph type="sldNum" sz="quarter" idx="12"/>
+          </p:nvPr>
+        </p:nvSpPr>
+        <p:spPr/>
+        <p:txBody>
+          <a:bodyPr/>
+          <a:lstStyle/>
+          <a:p>
+            <a:fld id="{1F70BE4E-F0F4-974B-B603-7347B10BD271}" type="slidenum">
+              <a:rPr lang="en-US" smtClean="0"/>
+              <a:t>20</a:t>
+            </a:fld>
+            <a:endParaRPr lang="en-US"/>
+          </a:p>
+        </p:txBody>
+      </p:sp>
+      <p:sp>
+        <p:nvSpPr>
+          <p:cNvPr id="12" name="Rounded Rectangular Callout 11"/>
+          <p:cNvSpPr/>
+          <p:nvPr/>
+        </p:nvSpPr>
+        <p:spPr>
+          <a:xfrm>
+            <a:off x="457200" y="5374185"/>
+            <a:ext cx="2667000" cy="684000"/>
+          </a:xfrm>
+          <a:prstGeom prst="wedgeRoundRectCallout">
+            <a:avLst>
+              <a:gd name="adj1" fmla="val 29563"/>
+              <a:gd name="adj2" fmla="val -103647"/>
+              <a:gd name="adj3" fmla="val 16667"/>
+            </a:avLst>
+          </a:prstGeom>
+          <a:noFill/>
+          <a:ln w="25400">
+            <a:solidFill>
+              <a:srgbClr val="6C0424"/>
+            </a:solidFill>
+          </a:ln>
+          <a:effectLst/>
+        </p:spPr>
+        <p:style>
+          <a:lnRef idx="1">
+            <a:schemeClr val="accent1"/>
+          </a:lnRef>
+          <a:fillRef idx="3">
+            <a:schemeClr val="accent1"/>
+          </a:fillRef>
+          <a:effectRef idx="2">
+            <a:schemeClr val="accent1"/>
+          </a:effectRef>
+          <a:fontRef idx="minor">
+            <a:schemeClr val="lt1"/>
+          </a:fontRef>
+        </p:style>
+        <p:txBody>
+          <a:bodyPr rtlCol="0" anchor="ctr"/>
+          <a:lstStyle/>
+          <a:p>
+            <a:pPr algn="ctr"/>
+            <a:r>
+              <a:rPr lang="en-US" dirty="0" smtClean="0">
+                <a:solidFill>
+                  <a:schemeClr val="accent1">
+                    <a:lumMod val="50000"/>
+                  </a:schemeClr>
+                </a:solidFill>
+                <a:latin typeface="Avenir Book"/>
+              </a:rPr>
+              <a:t>create a job </a:t>
+            </a:r>
+            <a:r>
+              <a:rPr lang="en-US" dirty="0" smtClean="0">
+                <a:solidFill>
+                  <a:schemeClr val="accent1">
+                    <a:lumMod val="50000"/>
+                  </a:schemeClr>
+                </a:solidFill>
+                <a:latin typeface="Avenir Book"/>
+              </a:rPr>
+              <a:t>script file </a:t>
+            </a:r>
+            <a:r>
+              <a:rPr lang="en-US" dirty="0">
+                <a:solidFill>
+                  <a:schemeClr val="accent1">
+                    <a:lumMod val="50000"/>
+                  </a:schemeClr>
+                </a:solidFill>
+                <a:latin typeface="Avenir Book"/>
+              </a:rPr>
+              <a:t>and save </a:t>
+            </a:r>
+            <a:r>
+              <a:rPr lang="en-US" dirty="0" smtClean="0">
+                <a:solidFill>
+                  <a:schemeClr val="accent1">
+                    <a:lumMod val="50000"/>
+                  </a:schemeClr>
+                </a:solidFill>
+                <a:latin typeface="Avenir Book"/>
+              </a:rPr>
+              <a:t>it locally</a:t>
+            </a:r>
+            <a:endParaRPr lang="en-US" dirty="0">
+              <a:solidFill>
+                <a:schemeClr val="accent1">
+                  <a:lumMod val="50000"/>
+                </a:schemeClr>
+              </a:solidFill>
+              <a:latin typeface="Avenir Book"/>
+            </a:endParaRPr>
+          </a:p>
+        </p:txBody>
+      </p:sp>
+      <p:sp>
+        <p:nvSpPr>
+          <p:cNvPr id="13" name="Rounded Rectangular Callout 12"/>
+          <p:cNvSpPr/>
+          <p:nvPr/>
+        </p:nvSpPr>
+        <p:spPr>
+          <a:xfrm>
+            <a:off x="3239077" y="5374185"/>
+            <a:ext cx="2667000" cy="684000"/>
+          </a:xfrm>
+          <a:prstGeom prst="wedgeRoundRectCallout">
+            <a:avLst>
+              <a:gd name="adj1" fmla="val 5751"/>
+              <a:gd name="adj2" fmla="val -103648"/>
+              <a:gd name="adj3" fmla="val 16667"/>
+            </a:avLst>
+          </a:prstGeom>
+          <a:noFill/>
+          <a:ln w="25400">
+            <a:solidFill>
+              <a:srgbClr val="6C0424"/>
+            </a:solidFill>
+          </a:ln>
+          <a:effectLst/>
+        </p:spPr>
+        <p:style>
+          <a:lnRef idx="1">
+            <a:schemeClr val="accent1"/>
+          </a:lnRef>
+          <a:fillRef idx="3">
+            <a:schemeClr val="accent1"/>
+          </a:fillRef>
+          <a:effectRef idx="2">
+            <a:schemeClr val="accent1"/>
+          </a:effectRef>
+          <a:fontRef idx="minor">
+            <a:schemeClr val="lt1"/>
+          </a:fontRef>
+        </p:style>
+        <p:txBody>
+          <a:bodyPr rtlCol="0" anchor="ctr"/>
+          <a:lstStyle/>
+          <a:p>
+            <a:pPr algn="ctr"/>
+            <a:r>
+              <a:rPr lang="en-US" dirty="0" smtClean="0">
+                <a:solidFill>
+                  <a:schemeClr val="accent1">
+                    <a:lumMod val="50000"/>
+                  </a:schemeClr>
+                </a:solidFill>
+                <a:latin typeface="Avenir Book"/>
+              </a:rPr>
+              <a:t>save and submit the job script</a:t>
+            </a:r>
+            <a:endParaRPr lang="en-US" dirty="0">
+              <a:solidFill>
+                <a:schemeClr val="accent1">
+                  <a:lumMod val="50000"/>
+                </a:schemeClr>
+              </a:solidFill>
+              <a:latin typeface="Avenir Book"/>
+            </a:endParaRPr>
+          </a:p>
+        </p:txBody>
+      </p:sp>
+      <p:sp>
+        <p:nvSpPr>
+          <p:cNvPr id="14" name="Rounded Rectangular Callout 13"/>
+          <p:cNvSpPr/>
+          <p:nvPr/>
+        </p:nvSpPr>
+        <p:spPr>
+          <a:xfrm>
+            <a:off x="6019800" y="5374185"/>
+            <a:ext cx="2667000" cy="684000"/>
+          </a:xfrm>
+          <a:prstGeom prst="wedgeRoundRectCallout">
+            <a:avLst>
+              <a:gd name="adj1" fmla="val 3725"/>
+              <a:gd name="adj2" fmla="val -109573"/>
+              <a:gd name="adj3" fmla="val 16667"/>
+            </a:avLst>
+          </a:prstGeom>
+          <a:noFill/>
+          <a:ln w="25400">
+            <a:solidFill>
+              <a:srgbClr val="6C0424"/>
+            </a:solidFill>
+          </a:ln>
+          <a:effectLst/>
+        </p:spPr>
+        <p:style>
+          <a:lnRef idx="1">
+            <a:schemeClr val="accent1"/>
+          </a:lnRef>
+          <a:fillRef idx="3">
+            <a:schemeClr val="accent1"/>
+          </a:fillRef>
+          <a:effectRef idx="2">
+            <a:schemeClr val="accent1"/>
+          </a:effectRef>
+          <a:fontRef idx="minor">
+            <a:schemeClr val="lt1"/>
+          </a:fontRef>
+        </p:style>
+        <p:txBody>
+          <a:bodyPr rtlCol="0" anchor="ctr"/>
+          <a:lstStyle/>
+          <a:p>
+            <a:pPr algn="ctr"/>
+            <a:r>
+              <a:rPr lang="en-US" dirty="0" smtClean="0">
+                <a:solidFill>
+                  <a:schemeClr val="accent1">
+                    <a:lumMod val="50000"/>
+                  </a:schemeClr>
+                </a:solidFill>
+                <a:latin typeface="Avenir Book"/>
+              </a:rPr>
+              <a:t>copy the results if the job is finished</a:t>
+            </a:r>
+            <a:endParaRPr lang="en-US" dirty="0">
+              <a:solidFill>
+                <a:schemeClr val="accent1">
+                  <a:lumMod val="50000"/>
+                </a:schemeClr>
+              </a:solidFill>
+              <a:latin typeface="Avenir Book"/>
+            </a:endParaRPr>
+          </a:p>
+        </p:txBody>
+      </p:sp>
+    </p:spTree>
+    <p:extLst>
+      <p:ext uri="{BB962C8B-B14F-4D97-AF65-F5344CB8AC3E}">
+        <p14:creationId xmlns:p14="http://schemas.microsoft.com/office/powerpoint/2010/main" val="632518436"/>
+      </p:ext>
+    </p:extLst>
+  </p:cSld>
+  <p:clrMapOvr>
+    <a:masterClrMapping/>
+  </p:clrMapOvr>
+  <p:timing>
+    <p:tnLst>
+      <p:par>
+        <p:cTn xmlns:p14="http://schemas.microsoft.com/office/powerpoint/2010/main" id="1" dur="indefinite" restart="never" nodeType="tmRoot">
+          <p:childTnLst>
+            <p:seq concurrent="1" nextAc="seek">
+              <p:cTn id="2" dur="indefinite" nodeType="mainSeq">
+                <p:childTnLst>
+                  <p:par>
+                    <p:cTn id="3" fill="hold">
+                      <p:stCondLst>
+                        <p:cond delay="indefinite"/>
+                      </p:stCondLst>
+                      <p:childTnLst>
+                        <p:par>
+                          <p:cTn id="4" fill="hold">
+                            <p:stCondLst>
+                              <p:cond delay="0"/>
+                            </p:stCondLst>
+                            <p:childTnLst>
+                              <p:par>
+                                <p:cTn id="5" presetID="1" presetClass="entr" presetSubtype="0" fill="hold" grpId="0" nodeType="clickEffect">
+                                  <p:stCondLst>
+                                    <p:cond delay="0"/>
+                                  </p:stCondLst>
+                                  <p:childTnLst>
+                                    <p:set>
+                                      <p:cBhvr>
+                                        <p:cTn id="6" dur="1" fill="hold">
+                                          <p:stCondLst>
+                                            <p:cond delay="0"/>
+                                          </p:stCondLst>
+                                        </p:cTn>
+                                        <p:tgtEl>
+                                          <p:spTgt spid="12"/>
+                                        </p:tgtEl>
+                                        <p:attrNameLst>
+                                          <p:attrName>style.visibility</p:attrName>
+                                        </p:attrNameLst>
+                                      </p:cBhvr>
+                                      <p:to>
+                                        <p:strVal val="visible"/>
+                                      </p:to>
+                                    </p:set>
+                                  </p:childTnLst>
+                                </p:cTn>
+                              </p:par>
+                            </p:childTnLst>
+                          </p:cTn>
+                        </p:par>
+                      </p:childTnLst>
+                    </p:cTn>
+                  </p:par>
+                  <p:par>
+                    <p:cTn id="7" fill="hold">
+                      <p:stCondLst>
+                        <p:cond delay="indefinite"/>
+                      </p:stCondLst>
+                      <p:childTnLst>
+                        <p:par>
+                          <p:cTn id="8" fill="hold">
+                            <p:stCondLst>
+                              <p:cond delay="0"/>
+                            </p:stCondLst>
+                            <p:childTnLst>
+                              <p:par>
+                                <p:cTn id="9" presetID="1" presetClass="entr" presetSubtype="0" fill="hold" grpId="0" nodeType="clickEffect">
+                                  <p:stCondLst>
+                                    <p:cond delay="0"/>
+                                  </p:stCondLst>
+                                  <p:childTnLst>
+                                    <p:set>
+                                      <p:cBhvr>
+                                        <p:cTn id="10" dur="1" fill="hold">
+                                          <p:stCondLst>
+                                            <p:cond delay="0"/>
+                                          </p:stCondLst>
+                                        </p:cTn>
+                                        <p:tgtEl>
+                                          <p:spTgt spid="13"/>
+                                        </p:tgtEl>
+                                        <p:attrNameLst>
+                                          <p:attrName>style.visibility</p:attrName>
+                                        </p:attrNameLst>
+                                      </p:cBhvr>
+                                      <p:to>
+                                        <p:strVal val="visible"/>
+                                      </p:to>
+                                    </p:set>
+                                  </p:childTnLst>
+                                </p:cTn>
+                              </p:par>
+                            </p:childTnLst>
+                          </p:cTn>
+                        </p:par>
+                      </p:childTnLst>
+                    </p:cTn>
+                  </p:par>
+                  <p:par>
+                    <p:cTn id="11" fill="hold">
+                      <p:stCondLst>
+                        <p:cond delay="indefinite"/>
+                      </p:stCondLst>
+                      <p:childTnLst>
+                        <p:par>
+                          <p:cTn id="12" fill="hold">
+                            <p:stCondLst>
+                              <p:cond delay="0"/>
+                            </p:stCondLst>
+                            <p:childTnLst>
+                              <p:par>
+                                <p:cTn id="13" presetID="1" presetClass="entr" presetSubtype="0" fill="hold" grpId="0" nodeType="clickEffect">
+                                  <p:stCondLst>
+                                    <p:cond delay="0"/>
+                                  </p:stCondLst>
+                                  <p:childTnLst>
+                                    <p:set>
+                                      <p:cBhvr>
+                                        <p:cTn id="14" dur="1" fill="hold">
+                                          <p:stCondLst>
+                                            <p:cond delay="0"/>
+                                          </p:stCondLst>
+                                        </p:cTn>
+                                        <p:tgtEl>
+                                          <p:spTgt spid="14"/>
+                                        </p:tgtEl>
+                                        <p:attrNameLst>
+                                          <p:attrName>style.visibility</p:attrName>
+                                        </p:attrNameLst>
+                                      </p:cBhvr>
+                                      <p:to>
+                                        <p:strVal val="visible"/>
+                                      </p:to>
+                                    </p:set>
+                                  </p:childTnLst>
+                                </p:cTn>
+                              </p:par>
+                            </p:childTnLst>
+                          </p:cTn>
+                        </p:par>
+                      </p:childTnLst>
+                    </p:cTn>
+                  </p:par>
+                </p:childTnLst>
+              </p:cTn>
+              <p:prevCondLst>
+                <p:cond evt="onPrev" delay="0">
+                  <p:tgtEl>
+                    <p:sldTgt/>
+                  </p:tgtEl>
+                </p:cond>
+              </p:prevCondLst>
+              <p:nextCondLst>
+                <p:cond evt="onNext" delay="0">
+                  <p:tgtEl>
+                    <p:sldTgt/>
+                  </p:tgtEl>
+                </p:cond>
+              </p:nextCondLst>
+            </p:seq>
+          </p:childTnLst>
+        </p:cTn>
+      </p:par>
+    </p:tnLst>
+    <p:bldLst>
+      <p:bldP spid="12" grpId="0" animBg="1"/>
+      <p:bldP spid="13" grpId="0" animBg="1"/>
+      <p:bldP spid="14" grpId="0" animBg="1"/>
+    </p:bldLst>
+  </p:timing>
+</p:sld>
+</file>
+
+<file path=ppt/slides/slide22.xml><?xml version="1.0" encoding="utf-8"?>
+<p:sld xmlns:a="http://schemas.openxmlformats.org/drawingml/2006/main" xmlns:r="http://schemas.openxmlformats.org/officeDocument/2006/relationships" xmlns:p="http://schemas.openxmlformats.org/presentationml/2006/main">
+  <p:cSld>
+    <p:spTree>
+      <p:nvGrpSpPr>
+        <p:cNvPr id="1" name=""/>
+        <p:cNvGrpSpPr/>
+        <p:nvPr/>
+      </p:nvGrpSpPr>
+      <p:grpSpPr>
+        <a:xfrm>
+          <a:off x="0" y="0"/>
+          <a:ext cx="0" cy="0"/>
+          <a:chOff x="0" y="0"/>
+          <a:chExt cx="0" cy="0"/>
+        </a:xfrm>
+      </p:grpSpPr>
+      <p:sp>
+        <p:nvSpPr>
+          <p:cNvPr id="2" name="Title 1"/>
+          <p:cNvSpPr>
+            <a:spLocks noGrp="1"/>
+          </p:cNvSpPr>
+          <p:nvPr>
+            <p:ph type="title"/>
+          </p:nvPr>
+        </p:nvSpPr>
+        <p:spPr/>
+        <p:txBody>
+          <a:bodyPr/>
+          <a:lstStyle/>
+          <a:p>
+            <a:r>
+              <a:rPr lang="en-US" dirty="0" smtClean="0"/>
+              <a:t>4. Job management</a:t>
+            </a:r>
+            <a:endParaRPr lang="en-US" dirty="0"/>
+          </a:p>
+        </p:txBody>
+      </p:sp>
+      <p:sp>
+        <p:nvSpPr>
+          <p:cNvPr id="3" name="Date Placeholder 2"/>
+          <p:cNvSpPr>
+            <a:spLocks noGrp="1"/>
+          </p:cNvSpPr>
+          <p:nvPr>
+            <p:ph type="dt" sz="half" idx="10"/>
+          </p:nvPr>
+        </p:nvSpPr>
+        <p:spPr/>
+        <p:txBody>
+          <a:bodyPr/>
+          <a:lstStyle/>
+          <a:p>
+            <a:fld id="{A6EF29A7-BBF5-A84F-8C8E-08BE54B3CC62}" type="datetime6">
+              <a:rPr lang="en-US" smtClean="0"/>
+              <a:t>May 15</a:t>
+            </a:fld>
+            <a:endParaRPr lang="en-US"/>
+          </a:p>
+        </p:txBody>
+      </p:sp>
+      <p:sp>
+        <p:nvSpPr>
+          <p:cNvPr id="4" name="Footer Placeholder 3"/>
+          <p:cNvSpPr>
+            <a:spLocks noGrp="1"/>
+          </p:cNvSpPr>
+          <p:nvPr>
+            <p:ph type="ftr" sz="quarter" idx="11"/>
+          </p:nvPr>
+        </p:nvSpPr>
+        <p:spPr/>
+        <p:txBody>
+          <a:bodyPr/>
+          <a:lstStyle/>
+          <a:p>
+            <a:r>
+              <a:rPr lang="en-US" smtClean="0"/>
+              <a:t>Launcher-presentation</a:t>
+            </a:r>
+            <a:endParaRPr lang="en-US"/>
+          </a:p>
+        </p:txBody>
+      </p:sp>
+      <p:sp>
+        <p:nvSpPr>
+          <p:cNvPr id="5" name="Slide Number Placeholder 4"/>
+          <p:cNvSpPr>
+            <a:spLocks noGrp="1"/>
+          </p:cNvSpPr>
+          <p:nvPr>
+            <p:ph type="sldNum" sz="quarter" idx="12"/>
+          </p:nvPr>
+        </p:nvSpPr>
+        <p:spPr/>
+        <p:txBody>
+          <a:bodyPr/>
+          <a:lstStyle/>
+          <a:p>
+            <a:fld id="{1F70BE4E-F0F4-974B-B603-7347B10BD271}" type="slidenum">
+              <a:rPr lang="en-US" smtClean="0"/>
+              <a:t>21</a:t>
+            </a:fld>
+            <a:endParaRPr lang="en-US"/>
+          </a:p>
+        </p:txBody>
+      </p:sp>
+      <p:sp>
+        <p:nvSpPr>
+          <p:cNvPr id="6" name="Content Placeholder 2"/>
+          <p:cNvSpPr txBox="1">
+            <a:spLocks/>
+          </p:cNvSpPr>
+          <p:nvPr/>
+        </p:nvSpPr>
+        <p:spPr>
+          <a:xfrm>
+            <a:off x="457200" y="1567157"/>
+            <a:ext cx="8229599" cy="4458291"/>
+          </a:xfrm>
+          <a:prstGeom prst="rect">
+            <a:avLst/>
+          </a:prstGeom>
+        </p:spPr>
+        <p:txBody>
+          <a:bodyPr vert="horz" lIns="91440" tIns="45720" rIns="91440" bIns="45720" rtlCol="0" anchor="t" anchorCtr="0">
+            <a:normAutofit/>
+          </a:bodyPr>
+          <a:lstStyle>
+            <a:lvl1pPr marL="268288" indent="-268288" algn="l" defTabSz="457200" rtl="0" eaLnBrk="1" latinLnBrk="0" hangingPunct="1">
+              <a:spcBef>
+                <a:spcPct val="20000"/>
+              </a:spcBef>
+              <a:buFont typeface="Arial"/>
+              <a:buChar char="•"/>
+              <a:defRPr sz="3200" kern="1200">
+                <a:solidFill>
+                  <a:srgbClr val="043356"/>
+                </a:solidFill>
+                <a:latin typeface="Verdana"/>
+                <a:ea typeface="+mn-ea"/>
+                <a:cs typeface="Verdana"/>
+              </a:defRPr>
+            </a:lvl1pPr>
+            <a:lvl2pPr marL="536575" indent="-268288" algn="l" defTabSz="457200" rtl="0" eaLnBrk="1" latinLnBrk="0" hangingPunct="1">
+              <a:spcBef>
+                <a:spcPct val="20000"/>
+              </a:spcBef>
+              <a:buFont typeface="Arial"/>
+              <a:buChar char="•"/>
+              <a:defRPr sz="2800" kern="1200">
+                <a:solidFill>
+                  <a:srgbClr val="043356"/>
+                </a:solidFill>
+                <a:latin typeface="Verdana"/>
+                <a:ea typeface="+mn-ea"/>
+                <a:cs typeface="Verdana"/>
+              </a:defRPr>
+            </a:lvl2pPr>
+            <a:lvl3pPr marL="719138" indent="-182563" algn="l" defTabSz="457200" rtl="0" eaLnBrk="1" latinLnBrk="0" hangingPunct="1">
+              <a:spcBef>
+                <a:spcPct val="20000"/>
+              </a:spcBef>
+              <a:buFont typeface="Arial"/>
+              <a:buChar char="•"/>
+              <a:defRPr sz="2400" kern="1200">
+                <a:solidFill>
+                  <a:srgbClr val="043356"/>
+                </a:solidFill>
+                <a:latin typeface="Verdana"/>
+                <a:ea typeface="+mn-ea"/>
+                <a:cs typeface="Verdana"/>
+              </a:defRPr>
+            </a:lvl3pPr>
+            <a:lvl4pPr marL="903288" indent="-184150" algn="l" defTabSz="457200" rtl="0" eaLnBrk="1" latinLnBrk="0" hangingPunct="1">
+              <a:spcBef>
+                <a:spcPct val="20000"/>
+              </a:spcBef>
+              <a:buFont typeface="Arial"/>
+              <a:buChar char="•"/>
+              <a:defRPr sz="2000" kern="1200">
+                <a:solidFill>
+                  <a:srgbClr val="043356"/>
+                </a:solidFill>
+                <a:latin typeface="Verdana"/>
+                <a:ea typeface="+mn-ea"/>
+                <a:cs typeface="Verdana"/>
+              </a:defRPr>
+            </a:lvl4pPr>
+            <a:lvl5pPr marL="1073150" indent="-169863" algn="l" defTabSz="457200" rtl="0" eaLnBrk="1" latinLnBrk="0" hangingPunct="1">
+              <a:spcBef>
+                <a:spcPct val="20000"/>
+              </a:spcBef>
+              <a:buFont typeface="Arial"/>
+              <a:buChar char="•"/>
+              <a:defRPr sz="2000" kern="1200">
+                <a:solidFill>
+                  <a:srgbClr val="043356"/>
+                </a:solidFill>
+                <a:latin typeface="Verdana"/>
+                <a:ea typeface="+mn-ea"/>
+                <a:cs typeface="Verdana"/>
+              </a:defRPr>
+            </a:lvl5pPr>
+            <a:lvl6pPr marL="2514600" indent="-228600" algn="l" defTabSz="457200" rtl="0" eaLnBrk="1" latinLnBrk="0" hangingPunct="1">
+              <a:spcBef>
+                <a:spcPct val="20000"/>
+              </a:spcBef>
+              <a:buFont typeface="Arial"/>
+              <a:buChar char="•"/>
+              <a:defRPr sz="2000" kern="1200">
+                <a:solidFill>
+                  <a:schemeClr val="tx1"/>
+                </a:solidFill>
+                <a:latin typeface="+mn-lt"/>
+                <a:ea typeface="+mn-ea"/>
+                <a:cs typeface="+mn-cs"/>
+              </a:defRPr>
+            </a:lvl6pPr>
+            <a:lvl7pPr marL="2971800" indent="-228600" algn="l" defTabSz="457200" rtl="0" eaLnBrk="1" latinLnBrk="0" hangingPunct="1">
+              <a:spcBef>
+                <a:spcPct val="20000"/>
+              </a:spcBef>
+              <a:buFont typeface="Arial"/>
+              <a:buChar char="•"/>
+              <a:defRPr sz="2000" kern="1200">
+                <a:solidFill>
+                  <a:schemeClr val="tx1"/>
+                </a:solidFill>
+                <a:latin typeface="+mn-lt"/>
+                <a:ea typeface="+mn-ea"/>
+                <a:cs typeface="+mn-cs"/>
+              </a:defRPr>
+            </a:lvl7pPr>
+            <a:lvl8pPr marL="3429000" indent="-228600" algn="l" defTabSz="457200" rtl="0" eaLnBrk="1" latinLnBrk="0" hangingPunct="1">
+              <a:spcBef>
+                <a:spcPct val="20000"/>
+              </a:spcBef>
+              <a:buFont typeface="Arial"/>
+              <a:buChar char="•"/>
+              <a:defRPr sz="2000" kern="1200">
+                <a:solidFill>
+                  <a:schemeClr val="tx1"/>
+                </a:solidFill>
+                <a:latin typeface="+mn-lt"/>
+                <a:ea typeface="+mn-ea"/>
+                <a:cs typeface="+mn-cs"/>
+              </a:defRPr>
+            </a:lvl8pPr>
+            <a:lvl9pPr marL="3886200" indent="-228600" algn="l" defTabSz="457200" rtl="0" eaLnBrk="1" latinLnBrk="0" hangingPunct="1">
+              <a:spcBef>
+                <a:spcPct val="20000"/>
+              </a:spcBef>
+              <a:buFont typeface="Arial"/>
+              <a:buChar char="•"/>
+              <a:defRPr sz="2000" kern="1200">
+                <a:solidFill>
+                  <a:schemeClr val="tx1"/>
+                </a:solidFill>
+                <a:latin typeface="+mn-lt"/>
+                <a:ea typeface="+mn-ea"/>
+                <a:cs typeface="+mn-cs"/>
+              </a:defRPr>
+            </a:lvl9pPr>
+          </a:lstStyle>
+          <a:p>
+            <a:pPr marL="0" indent="0">
+              <a:buNone/>
+            </a:pPr>
+            <a:r>
+              <a:rPr lang="en-US" dirty="0" smtClean="0">
+                <a:latin typeface="Avenir Book"/>
+                <a:cs typeface="Avenir Book"/>
+              </a:rPr>
+              <a:t>use the </a:t>
+            </a:r>
+            <a:r>
+              <a:rPr lang="en-US" i="1" dirty="0" smtClean="0">
+                <a:latin typeface="Avenir Book"/>
+                <a:cs typeface="Avenir Book"/>
+              </a:rPr>
+              <a:t>Retrieve </a:t>
+            </a:r>
+            <a:r>
+              <a:rPr lang="en-US" dirty="0" smtClean="0">
+                <a:latin typeface="Avenir Book"/>
+                <a:cs typeface="Avenir Book"/>
+              </a:rPr>
+              <a:t>page to </a:t>
+            </a:r>
+          </a:p>
+          <a:p>
+            <a:r>
+              <a:rPr lang="en-US" dirty="0" smtClean="0">
+                <a:latin typeface="Avenir Book"/>
+                <a:cs typeface="Avenir Book"/>
+              </a:rPr>
+              <a:t>get an overview of your jobs</a:t>
+            </a:r>
+          </a:p>
+          <a:p>
+            <a:pPr lvl="1"/>
+            <a:r>
+              <a:rPr lang="en-US" dirty="0" smtClean="0">
+                <a:latin typeface="Avenir Book"/>
+                <a:cs typeface="Avenir Book"/>
+              </a:rPr>
+              <a:t>submitted/running/completed</a:t>
+            </a:r>
+          </a:p>
+          <a:p>
+            <a:pPr lvl="1"/>
+            <a:r>
+              <a:rPr lang="en-US" dirty="0" smtClean="0">
+                <a:latin typeface="Avenir Book"/>
+                <a:cs typeface="Avenir Book"/>
+              </a:rPr>
+              <a:t>retrieved </a:t>
+            </a:r>
+          </a:p>
+          <a:p>
+            <a:r>
+              <a:rPr lang="en-US" dirty="0" smtClean="0">
+                <a:latin typeface="Avenir Book"/>
+                <a:cs typeface="Avenir Book"/>
+              </a:rPr>
+              <a:t>retrieve results</a:t>
+            </a:r>
+          </a:p>
+          <a:p>
+            <a:r>
+              <a:rPr lang="en-US" dirty="0" smtClean="0">
+                <a:latin typeface="Avenir Book"/>
+                <a:cs typeface="Avenir Book"/>
+              </a:rPr>
+              <a:t>remove jobs from the retrieve list</a:t>
+            </a:r>
+          </a:p>
+          <a:p>
+            <a:pPr lvl="1"/>
+            <a:r>
+              <a:rPr lang="en-US" dirty="0" smtClean="0">
+                <a:latin typeface="Avenir Book"/>
+                <a:cs typeface="Avenir Book"/>
+              </a:rPr>
+              <a:t>the remote folder is not removed</a:t>
+            </a:r>
+          </a:p>
+          <a:p>
+            <a:r>
+              <a:rPr lang="en-US" dirty="0" smtClean="0">
+                <a:latin typeface="Avenir Book"/>
+                <a:cs typeface="Avenir Book"/>
+              </a:rPr>
+              <a:t>add </a:t>
+            </a:r>
+            <a:r>
+              <a:rPr lang="en-US" dirty="0">
+                <a:latin typeface="Avenir Book"/>
+                <a:cs typeface="Avenir Book"/>
+              </a:rPr>
+              <a:t>jobs </a:t>
+            </a:r>
+            <a:r>
+              <a:rPr lang="en-US" dirty="0" smtClean="0">
+                <a:latin typeface="Avenir Book"/>
+                <a:cs typeface="Avenir Book"/>
+              </a:rPr>
+              <a:t>to </a:t>
+            </a:r>
+            <a:r>
+              <a:rPr lang="en-US" dirty="0">
+                <a:latin typeface="Avenir Book"/>
+                <a:cs typeface="Avenir Book"/>
+              </a:rPr>
+              <a:t>the retrieve list</a:t>
+            </a:r>
+          </a:p>
+          <a:p>
+            <a:endParaRPr lang="en-US" dirty="0">
+              <a:latin typeface="Avenir Book"/>
+              <a:cs typeface="Avenir Book"/>
+            </a:endParaRPr>
+          </a:p>
+        </p:txBody>
+      </p:sp>
+    </p:spTree>
+    <p:extLst>
+      <p:ext uri="{BB962C8B-B14F-4D97-AF65-F5344CB8AC3E}">
+        <p14:creationId xmlns:p14="http://schemas.microsoft.com/office/powerpoint/2010/main" val="218636227"/>
+      </p:ext>
+    </p:extLst>
+  </p:cSld>
+  <p:clrMapOvr>
+    <a:masterClrMapping/>
+  </p:clrMapOvr>
+  <p:timing>
+    <p:tnLst>
+      <p:par>
+        <p:cTn xmlns:p14="http://schemas.microsoft.com/office/powerpoint/2010/main" id="1" dur="indefinite" restart="never" nodeType="tmRoot"/>
+      </p:par>
+    </p:tnLst>
+  </p:timing>
+</p:sld>
+</file>
+
+<file path=ppt/slides/slide23.xml><?xml version="1.0" encoding="utf-8"?>
+<p:sld xmlns:a="http://schemas.openxmlformats.org/drawingml/2006/main" xmlns:r="http://schemas.openxmlformats.org/officeDocument/2006/relationships" xmlns:p="http://schemas.openxmlformats.org/presentationml/2006/main">
+  <p:cSld>
+    <p:spTree>
+      <p:nvGrpSpPr>
+        <p:cNvPr id="1" name=""/>
+        <p:cNvGrpSpPr/>
+        <p:nvPr/>
+      </p:nvGrpSpPr>
+      <p:grpSpPr>
+        <a:xfrm>
+          <a:off x="0" y="0"/>
+          <a:ext cx="0" cy="0"/>
+          <a:chOff x="0" y="0"/>
+          <a:chExt cx="0" cy="0"/>
+        </a:xfrm>
+      </p:grpSpPr>
+      <p:pic>
+        <p:nvPicPr>
+          <p:cNvPr id="6" name="Picture 5"/>
+          <p:cNvPicPr>
+            <a:picLocks noChangeAspect="1"/>
+          </p:cNvPicPr>
+          <p:nvPr/>
+        </p:nvPicPr>
+        <p:blipFill rotWithShape="1">
+          <a:blip r:embed="rId2"/>
+          <a:srcRect t="4562"/>
+          <a:stretch/>
+        </p:blipFill>
+        <p:spPr>
+          <a:xfrm>
+            <a:off x="0" y="1174638"/>
+            <a:ext cx="9144000" cy="6010566"/>
+          </a:xfrm>
+          <a:prstGeom prst="rect">
+            <a:avLst/>
+          </a:prstGeom>
+        </p:spPr>
+      </p:pic>
+      <p:sp>
+        <p:nvSpPr>
+          <p:cNvPr id="2" name="Title 1"/>
+          <p:cNvSpPr>
+            <a:spLocks noGrp="1"/>
+          </p:cNvSpPr>
+          <p:nvPr>
+            <p:ph type="title"/>
+          </p:nvPr>
+        </p:nvSpPr>
+        <p:spPr/>
+        <p:txBody>
+          <a:bodyPr/>
+          <a:lstStyle/>
+          <a:p>
+            <a:r>
+              <a:rPr lang="en-US" dirty="0" smtClean="0"/>
+              <a:t>4. Job management</a:t>
+            </a:r>
+            <a:endParaRPr lang="en-US" dirty="0"/>
+          </a:p>
+        </p:txBody>
+      </p:sp>
+      <p:sp>
+        <p:nvSpPr>
+          <p:cNvPr id="3" name="Date Placeholder 2"/>
+          <p:cNvSpPr>
+            <a:spLocks noGrp="1"/>
+          </p:cNvSpPr>
+          <p:nvPr>
+            <p:ph type="dt" sz="half" idx="10"/>
+          </p:nvPr>
+        </p:nvSpPr>
+        <p:spPr/>
+        <p:txBody>
+          <a:bodyPr/>
+          <a:lstStyle/>
+          <a:p>
+            <a:fld id="{A6EF29A7-BBF5-A84F-8C8E-08BE54B3CC62}" type="datetime6">
+              <a:rPr lang="en-US" smtClean="0"/>
+              <a:t>May 15</a:t>
+            </a:fld>
+            <a:endParaRPr lang="en-US"/>
+          </a:p>
+        </p:txBody>
+      </p:sp>
+      <p:sp>
+        <p:nvSpPr>
+          <p:cNvPr id="4" name="Footer Placeholder 3"/>
+          <p:cNvSpPr>
+            <a:spLocks noGrp="1"/>
+          </p:cNvSpPr>
+          <p:nvPr>
+            <p:ph type="ftr" sz="quarter" idx="11"/>
+          </p:nvPr>
+        </p:nvSpPr>
+        <p:spPr/>
+        <p:txBody>
+          <a:bodyPr/>
+          <a:lstStyle/>
+          <a:p>
+            <a:r>
+              <a:rPr lang="en-US" dirty="0" smtClean="0"/>
+              <a:t>Launcher-presentation</a:t>
+            </a:r>
+            <a:endParaRPr lang="en-US" dirty="0"/>
+          </a:p>
+        </p:txBody>
+      </p:sp>
+      <p:sp>
+        <p:nvSpPr>
+          <p:cNvPr id="5" name="Slide Number Placeholder 4"/>
+          <p:cNvSpPr>
+            <a:spLocks noGrp="1"/>
+          </p:cNvSpPr>
+          <p:nvPr>
+            <p:ph type="sldNum" sz="quarter" idx="12"/>
+          </p:nvPr>
+        </p:nvSpPr>
+        <p:spPr/>
+        <p:txBody>
+          <a:bodyPr/>
+          <a:lstStyle/>
+          <a:p>
+            <a:fld id="{1F70BE4E-F0F4-974B-B603-7347B10BD271}" type="slidenum">
+              <a:rPr lang="en-US" smtClean="0"/>
+              <a:t>22</a:t>
+            </a:fld>
+            <a:endParaRPr lang="en-US"/>
+          </a:p>
+        </p:txBody>
+      </p:sp>
+      <p:sp>
+        <p:nvSpPr>
+          <p:cNvPr id="7" name="Rounded Rectangular Callout 6"/>
+          <p:cNvSpPr/>
+          <p:nvPr/>
+        </p:nvSpPr>
+        <p:spPr>
+          <a:xfrm>
+            <a:off x="308571" y="3023449"/>
+            <a:ext cx="5231199" cy="1475371"/>
+          </a:xfrm>
+          <a:prstGeom prst="wedgeRoundRectCallout">
+            <a:avLst>
+              <a:gd name="adj1" fmla="val 28043"/>
+              <a:gd name="adj2" fmla="val -30567"/>
+              <a:gd name="adj3" fmla="val 16667"/>
+            </a:avLst>
+          </a:prstGeom>
+          <a:noFill/>
+          <a:ln w="25400">
+            <a:solidFill>
+              <a:srgbClr val="6C0424"/>
+            </a:solidFill>
+          </a:ln>
+          <a:effectLst/>
+        </p:spPr>
+        <p:style>
+          <a:lnRef idx="1">
+            <a:schemeClr val="accent1"/>
+          </a:lnRef>
+          <a:fillRef idx="3">
+            <a:schemeClr val="accent1"/>
+          </a:fillRef>
+          <a:effectRef idx="2">
+            <a:schemeClr val="accent1"/>
+          </a:effectRef>
+          <a:fontRef idx="minor">
+            <a:schemeClr val="lt1"/>
+          </a:fontRef>
+        </p:style>
+        <p:txBody>
+          <a:bodyPr rtlCol="0" anchor="ctr"/>
+          <a:lstStyle/>
+          <a:p>
+            <a:pPr algn="ctr"/>
+            <a:endParaRPr lang="en-US" dirty="0">
+              <a:solidFill>
+                <a:schemeClr val="accent1">
+                  <a:lumMod val="50000"/>
+                </a:schemeClr>
+              </a:solidFill>
+              <a:latin typeface="Avenir Book"/>
+            </a:endParaRPr>
+          </a:p>
+        </p:txBody>
+      </p:sp>
+      <p:sp>
+        <p:nvSpPr>
+          <p:cNvPr id="8" name="Rounded Rectangular Callout 7"/>
+          <p:cNvSpPr/>
+          <p:nvPr/>
+        </p:nvSpPr>
+        <p:spPr>
+          <a:xfrm>
+            <a:off x="6019800" y="3023448"/>
+            <a:ext cx="2667000" cy="664775"/>
+          </a:xfrm>
+          <a:prstGeom prst="wedgeRoundRectCallout">
+            <a:avLst>
+              <a:gd name="adj1" fmla="val -68215"/>
+              <a:gd name="adj2" fmla="val -8840"/>
+              <a:gd name="adj3" fmla="val 16667"/>
+            </a:avLst>
+          </a:prstGeom>
+          <a:noFill/>
+          <a:ln w="25400">
+            <a:solidFill>
+              <a:srgbClr val="6C0424"/>
+            </a:solidFill>
+          </a:ln>
+          <a:effectLst/>
+        </p:spPr>
+        <p:style>
+          <a:lnRef idx="1">
+            <a:schemeClr val="accent1"/>
+          </a:lnRef>
+          <a:fillRef idx="3">
+            <a:schemeClr val="accent1"/>
+          </a:fillRef>
+          <a:effectRef idx="2">
+            <a:schemeClr val="accent1"/>
+          </a:effectRef>
+          <a:fontRef idx="minor">
+            <a:schemeClr val="lt1"/>
+          </a:fontRef>
+        </p:style>
+        <p:txBody>
+          <a:bodyPr rtlCol="0" anchor="ctr"/>
+          <a:lstStyle/>
+          <a:p>
+            <a:pPr algn="ctr"/>
+            <a:r>
+              <a:rPr lang="en-US" sz="1600" dirty="0" smtClean="0">
+                <a:solidFill>
+                  <a:schemeClr val="accent1">
+                    <a:lumMod val="50000"/>
+                  </a:schemeClr>
+                </a:solidFill>
+                <a:latin typeface="Avenir Book"/>
+              </a:rPr>
+              <a:t>overview of submitted jobs and their properties</a:t>
+            </a:r>
+            <a:endParaRPr lang="en-US" sz="1600" dirty="0">
+              <a:solidFill>
+                <a:schemeClr val="accent1">
+                  <a:lumMod val="50000"/>
+                </a:schemeClr>
+              </a:solidFill>
+              <a:latin typeface="Avenir Book"/>
+            </a:endParaRPr>
+          </a:p>
+        </p:txBody>
+      </p:sp>
+      <p:sp>
+        <p:nvSpPr>
+          <p:cNvPr id="9" name="Rounded Rectangular Callout 8"/>
+          <p:cNvSpPr/>
+          <p:nvPr/>
+        </p:nvSpPr>
+        <p:spPr>
+          <a:xfrm>
+            <a:off x="6019800" y="3834045"/>
+            <a:ext cx="2667000" cy="664775"/>
+          </a:xfrm>
+          <a:prstGeom prst="wedgeRoundRectCallout">
+            <a:avLst>
+              <a:gd name="adj1" fmla="val -20086"/>
+              <a:gd name="adj2" fmla="val 86676"/>
+              <a:gd name="adj3" fmla="val 16667"/>
+            </a:avLst>
+          </a:prstGeom>
+          <a:noFill/>
+          <a:ln w="25400">
+            <a:solidFill>
+              <a:srgbClr val="6C0424"/>
+            </a:solidFill>
+          </a:ln>
+          <a:effectLst/>
+        </p:spPr>
+        <p:style>
+          <a:lnRef idx="1">
+            <a:schemeClr val="accent1"/>
+          </a:lnRef>
+          <a:fillRef idx="3">
+            <a:schemeClr val="accent1"/>
+          </a:fillRef>
+          <a:effectRef idx="2">
+            <a:schemeClr val="accent1"/>
+          </a:effectRef>
+          <a:fontRef idx="minor">
+            <a:schemeClr val="lt1"/>
+          </a:fontRef>
+        </p:style>
+        <p:txBody>
+          <a:bodyPr rtlCol="0" anchor="ctr"/>
+          <a:lstStyle/>
+          <a:p>
+            <a:pPr algn="ctr"/>
+            <a:r>
+              <a:rPr lang="en-US" sz="1600" dirty="0" smtClean="0">
+                <a:solidFill>
+                  <a:schemeClr val="accent1">
+                    <a:lumMod val="50000"/>
+                  </a:schemeClr>
+                </a:solidFill>
+                <a:latin typeface="Avenir Book"/>
+              </a:rPr>
+              <a:t>status of recently submitted jobs</a:t>
+            </a:r>
+            <a:endParaRPr lang="en-US" sz="1600" dirty="0">
+              <a:solidFill>
+                <a:schemeClr val="accent1">
+                  <a:lumMod val="50000"/>
+                </a:schemeClr>
+              </a:solidFill>
+              <a:latin typeface="Avenir Book"/>
+            </a:endParaRPr>
+          </a:p>
+        </p:txBody>
+      </p:sp>
+      <p:sp>
+        <p:nvSpPr>
+          <p:cNvPr id="10" name="Rounded Rectangular Callout 9"/>
+          <p:cNvSpPr/>
+          <p:nvPr/>
+        </p:nvSpPr>
+        <p:spPr>
+          <a:xfrm>
+            <a:off x="308571" y="4745879"/>
+            <a:ext cx="8014597" cy="1171489"/>
+          </a:xfrm>
+          <a:prstGeom prst="wedgeRoundRectCallout">
+            <a:avLst>
+              <a:gd name="adj1" fmla="val 28043"/>
+              <a:gd name="adj2" fmla="val -30567"/>
+              <a:gd name="adj3" fmla="val 16667"/>
+            </a:avLst>
+          </a:prstGeom>
+          <a:noFill/>
+          <a:ln w="25400">
+            <a:solidFill>
+              <a:srgbClr val="6C0424"/>
+            </a:solidFill>
+          </a:ln>
+          <a:effectLst/>
+        </p:spPr>
+        <p:style>
+          <a:lnRef idx="1">
+            <a:schemeClr val="accent1"/>
+          </a:lnRef>
+          <a:fillRef idx="3">
+            <a:schemeClr val="accent1"/>
+          </a:fillRef>
+          <a:effectRef idx="2">
+            <a:schemeClr val="accent1"/>
+          </a:effectRef>
+          <a:fontRef idx="minor">
+            <a:schemeClr val="lt1"/>
+          </a:fontRef>
+        </p:style>
+        <p:txBody>
+          <a:bodyPr rtlCol="0" anchor="ctr"/>
+          <a:lstStyle/>
+          <a:p>
+            <a:pPr algn="ctr"/>
+            <a:endParaRPr lang="en-US" dirty="0">
+              <a:solidFill>
+                <a:schemeClr val="accent1">
+                  <a:lumMod val="50000"/>
+                </a:schemeClr>
+              </a:solidFill>
+              <a:latin typeface="Avenir Book"/>
+            </a:endParaRPr>
+          </a:p>
+        </p:txBody>
+      </p:sp>
+      <p:sp>
+        <p:nvSpPr>
+          <p:cNvPr id="11" name="Rounded Rectangular Callout 10"/>
+          <p:cNvSpPr/>
+          <p:nvPr/>
+        </p:nvSpPr>
+        <p:spPr>
+          <a:xfrm>
+            <a:off x="6019800" y="6056700"/>
+            <a:ext cx="2667000" cy="455107"/>
+          </a:xfrm>
+          <a:prstGeom prst="wedgeRoundRectCallout">
+            <a:avLst>
+              <a:gd name="adj1" fmla="val 7778"/>
+              <a:gd name="adj2" fmla="val -109974"/>
+              <a:gd name="adj3" fmla="val 16667"/>
+            </a:avLst>
+          </a:prstGeom>
+          <a:noFill/>
+          <a:ln w="25400">
+            <a:solidFill>
+              <a:srgbClr val="6C0424"/>
+            </a:solidFill>
+          </a:ln>
+          <a:effectLst/>
+        </p:spPr>
+        <p:style>
+          <a:lnRef idx="1">
+            <a:schemeClr val="accent1"/>
+          </a:lnRef>
+          <a:fillRef idx="3">
+            <a:schemeClr val="accent1"/>
+          </a:fillRef>
+          <a:effectRef idx="2">
+            <a:schemeClr val="accent1"/>
+          </a:effectRef>
+          <a:fontRef idx="minor">
+            <a:schemeClr val="lt1"/>
+          </a:fontRef>
+        </p:style>
+        <p:txBody>
+          <a:bodyPr rtlCol="0" anchor="ctr"/>
+          <a:lstStyle/>
+          <a:p>
+            <a:pPr algn="ctr"/>
+            <a:r>
+              <a:rPr lang="en-US" sz="1600" dirty="0" smtClean="0">
+                <a:solidFill>
+                  <a:schemeClr val="accent1">
+                    <a:lumMod val="50000"/>
+                  </a:schemeClr>
+                </a:solidFill>
+                <a:latin typeface="Avenir Book"/>
+              </a:rPr>
+              <a:t>this job is </a:t>
+            </a:r>
+            <a:r>
+              <a:rPr lang="en-US" sz="1600" dirty="0" smtClean="0">
+                <a:solidFill>
+                  <a:srgbClr val="800000"/>
+                </a:solidFill>
+                <a:latin typeface="Avenir Book"/>
+              </a:rPr>
+              <a:t>C</a:t>
+            </a:r>
+            <a:r>
+              <a:rPr lang="en-US" sz="1600" dirty="0" smtClean="0">
+                <a:solidFill>
+                  <a:schemeClr val="accent1">
+                    <a:lumMod val="50000"/>
+                  </a:schemeClr>
+                </a:solidFill>
+                <a:latin typeface="Avenir Book"/>
+              </a:rPr>
+              <a:t>ompleted and hence ready for retrieval</a:t>
+            </a:r>
+            <a:endParaRPr lang="en-US" sz="1600" dirty="0">
+              <a:solidFill>
+                <a:schemeClr val="accent1">
+                  <a:lumMod val="50000"/>
+                </a:schemeClr>
+              </a:solidFill>
+              <a:latin typeface="Avenir Book"/>
+            </a:endParaRPr>
+          </a:p>
+        </p:txBody>
+      </p:sp>
+      <p:sp>
+        <p:nvSpPr>
+          <p:cNvPr id="12" name="Rounded Rectangular Callout 11"/>
+          <p:cNvSpPr/>
+          <p:nvPr/>
+        </p:nvSpPr>
+        <p:spPr>
+          <a:xfrm>
+            <a:off x="4715560" y="1946440"/>
+            <a:ext cx="3971239" cy="431315"/>
+          </a:xfrm>
+          <a:prstGeom prst="wedgeRoundRectCallout">
+            <a:avLst>
+              <a:gd name="adj1" fmla="val -137257"/>
+              <a:gd name="adj2" fmla="val -29926"/>
+              <a:gd name="adj3" fmla="val 16667"/>
+            </a:avLst>
+          </a:prstGeom>
+          <a:noFill/>
+          <a:ln w="25400">
+            <a:solidFill>
+              <a:srgbClr val="6C0424"/>
+            </a:solidFill>
+          </a:ln>
+          <a:effectLst/>
+        </p:spPr>
+        <p:style>
+          <a:lnRef idx="1">
+            <a:schemeClr val="accent1"/>
+          </a:lnRef>
+          <a:fillRef idx="3">
+            <a:schemeClr val="accent1"/>
+          </a:fillRef>
+          <a:effectRef idx="2">
+            <a:schemeClr val="accent1"/>
+          </a:effectRef>
+          <a:fontRef idx="minor">
+            <a:schemeClr val="lt1"/>
+          </a:fontRef>
+        </p:style>
+        <p:txBody>
+          <a:bodyPr rtlCol="0" anchor="ctr"/>
+          <a:lstStyle/>
+          <a:p>
+            <a:pPr algn="ctr"/>
+            <a:r>
+              <a:rPr lang="en-US" sz="1600" dirty="0" smtClean="0">
+                <a:solidFill>
+                  <a:schemeClr val="accent1">
+                    <a:lumMod val="50000"/>
+                  </a:schemeClr>
+                </a:solidFill>
+                <a:latin typeface="Avenir Book"/>
+              </a:rPr>
+              <a:t>of all submitted jobs non is retrieved</a:t>
+            </a:r>
+            <a:endParaRPr lang="en-US" sz="1600" dirty="0">
+              <a:solidFill>
+                <a:schemeClr val="accent1">
+                  <a:lumMod val="50000"/>
+                </a:schemeClr>
+              </a:solidFill>
+              <a:latin typeface="Avenir Book"/>
+            </a:endParaRPr>
+          </a:p>
+        </p:txBody>
+      </p:sp>
+    </p:spTree>
+    <p:extLst>
+      <p:ext uri="{BB962C8B-B14F-4D97-AF65-F5344CB8AC3E}">
+        <p14:creationId xmlns:p14="http://schemas.microsoft.com/office/powerpoint/2010/main" val="1039430365"/>
+      </p:ext>
+    </p:extLst>
+  </p:cSld>
+  <p:clrMapOvr>
+    <a:masterClrMapping/>
+  </p:clrMapOvr>
+  <p:timing>
+    <p:tnLst>
+      <p:par>
+        <p:cTn xmlns:p14="http://schemas.microsoft.com/office/powerpoint/2010/main" id="1" dur="indefinite" restart="never" nodeType="tmRoot">
+          <p:childTnLst>
+            <p:seq concurrent="1" nextAc="seek">
+              <p:cTn id="2" dur="indefinite" nodeType="mainSeq">
+                <p:childTnLst>
+                  <p:par>
+                    <p:cTn id="3" fill="hold">
+                      <p:stCondLst>
+                        <p:cond delay="indefinite"/>
+                      </p:stCondLst>
+                      <p:childTnLst>
+                        <p:par>
+                          <p:cTn id="4" fill="hold">
+                            <p:stCondLst>
+                              <p:cond delay="0"/>
+                            </p:stCondLst>
+                            <p:childTnLst>
+                              <p:par>
+                                <p:cTn id="5" presetID="1" presetClass="entr" presetSubtype="0" fill="hold" grpId="0" nodeType="clickEffect">
+                                  <p:stCondLst>
+                                    <p:cond delay="0"/>
+                                  </p:stCondLst>
+                                  <p:childTnLst>
+                                    <p:set>
+                                      <p:cBhvr>
+                                        <p:cTn id="6" dur="1" fill="hold">
+                                          <p:stCondLst>
+                                            <p:cond delay="0"/>
+                                          </p:stCondLst>
+                                        </p:cTn>
+                                        <p:tgtEl>
+                                          <p:spTgt spid="7"/>
+                                        </p:tgtEl>
+                                        <p:attrNameLst>
+                                          <p:attrName>style.visibility</p:attrName>
+                                        </p:attrNameLst>
+                                      </p:cBhvr>
+                                      <p:to>
+                                        <p:strVal val="visible"/>
+                                      </p:to>
+                                    </p:set>
+                                  </p:childTnLst>
+                                </p:cTn>
+                              </p:par>
+                              <p:par>
+                                <p:cTn id="7" presetID="1" presetClass="entr" presetSubtype="0" fill="hold" grpId="0" nodeType="withEffect">
+                                  <p:stCondLst>
+                                    <p:cond delay="0"/>
+                                  </p:stCondLst>
+                                  <p:childTnLst>
+                                    <p:set>
+                                      <p:cBhvr>
+                                        <p:cTn id="8" dur="1" fill="hold">
+                                          <p:stCondLst>
+                                            <p:cond delay="0"/>
+                                          </p:stCondLst>
+                                        </p:cTn>
+                                        <p:tgtEl>
+                                          <p:spTgt spid="8"/>
+                                        </p:tgtEl>
+                                        <p:attrNameLst>
+                                          <p:attrName>style.visibility</p:attrName>
+                                        </p:attrNameLst>
+                                      </p:cBhvr>
+                                      <p:to>
+                                        <p:strVal val="visible"/>
+                                      </p:to>
+                                    </p:set>
+                                  </p:childTnLst>
+                                </p:cTn>
+                              </p:par>
+                            </p:childTnLst>
+                          </p:cTn>
+                        </p:par>
+                      </p:childTnLst>
+                    </p:cTn>
+                  </p:par>
+                  <p:par>
+                    <p:cTn id="9" fill="hold">
+                      <p:stCondLst>
+                        <p:cond delay="indefinite"/>
+                      </p:stCondLst>
+                      <p:childTnLst>
+                        <p:par>
+                          <p:cTn id="10" fill="hold">
+                            <p:stCondLst>
+                              <p:cond delay="0"/>
+                            </p:stCondLst>
+                            <p:childTnLst>
+                              <p:par>
+                                <p:cTn id="11" presetID="1" presetClass="entr" presetSubtype="0" fill="hold" grpId="0" nodeType="clickEffect">
+                                  <p:stCondLst>
+                                    <p:cond delay="0"/>
+                                  </p:stCondLst>
+                                  <p:childTnLst>
+                                    <p:set>
+                                      <p:cBhvr>
+                                        <p:cTn id="12" dur="1" fill="hold">
+                                          <p:stCondLst>
+                                            <p:cond delay="0"/>
+                                          </p:stCondLst>
+                                        </p:cTn>
+                                        <p:tgtEl>
+                                          <p:spTgt spid="9"/>
+                                        </p:tgtEl>
+                                        <p:attrNameLst>
+                                          <p:attrName>style.visibility</p:attrName>
+                                        </p:attrNameLst>
+                                      </p:cBhvr>
+                                      <p:to>
+                                        <p:strVal val="visible"/>
+                                      </p:to>
+                                    </p:set>
+                                  </p:childTnLst>
+                                </p:cTn>
+                              </p:par>
+                              <p:par>
+                                <p:cTn id="13" presetID="1" presetClass="entr" presetSubtype="0" fill="hold" grpId="0" nodeType="withEffect">
+                                  <p:stCondLst>
+                                    <p:cond delay="0"/>
+                                  </p:stCondLst>
+                                  <p:childTnLst>
+                                    <p:set>
+                                      <p:cBhvr>
+                                        <p:cTn id="14" dur="1" fill="hold">
+                                          <p:stCondLst>
+                                            <p:cond delay="0"/>
+                                          </p:stCondLst>
+                                        </p:cTn>
+                                        <p:tgtEl>
+                                          <p:spTgt spid="10"/>
+                                        </p:tgtEl>
+                                        <p:attrNameLst>
+                                          <p:attrName>style.visibility</p:attrName>
+                                        </p:attrNameLst>
+                                      </p:cBhvr>
+                                      <p:to>
+                                        <p:strVal val="visible"/>
+                                      </p:to>
+                                    </p:set>
+                                  </p:childTnLst>
+                                </p:cTn>
+                              </p:par>
+                            </p:childTnLst>
+                          </p:cTn>
+                        </p:par>
+                      </p:childTnLst>
+                    </p:cTn>
+                  </p:par>
+                  <p:par>
+                    <p:cTn id="15" fill="hold">
+                      <p:stCondLst>
+                        <p:cond delay="indefinite"/>
+                      </p:stCondLst>
+                      <p:childTnLst>
+                        <p:par>
+                          <p:cTn id="16" fill="hold">
+                            <p:stCondLst>
+                              <p:cond delay="0"/>
+                            </p:stCondLst>
+                            <p:childTnLst>
+                              <p:par>
+                                <p:cTn id="17" presetID="1" presetClass="entr" presetSubtype="0" fill="hold" grpId="0" nodeType="clickEffect">
+                                  <p:stCondLst>
+                                    <p:cond delay="0"/>
+                                  </p:stCondLst>
+                                  <p:childTnLst>
+                                    <p:set>
+                                      <p:cBhvr>
+                                        <p:cTn id="18" dur="1" fill="hold">
+                                          <p:stCondLst>
+                                            <p:cond delay="0"/>
+                                          </p:stCondLst>
+                                        </p:cTn>
+                                        <p:tgtEl>
+                                          <p:spTgt spid="11"/>
+                                        </p:tgtEl>
+                                        <p:attrNameLst>
+                                          <p:attrName>style.visibility</p:attrName>
+                                        </p:attrNameLst>
+                                      </p:cBhvr>
+                                      <p:to>
+                                        <p:strVal val="visible"/>
+                                      </p:to>
+                                    </p:set>
+                                  </p:childTnLst>
+                                </p:cTn>
+                              </p:par>
+                              <p:par>
+                                <p:cTn id="19" presetID="1" presetClass="entr" presetSubtype="0" fill="hold" grpId="0" nodeType="withEffect">
+                                  <p:stCondLst>
+                                    <p:cond delay="0"/>
+                                  </p:stCondLst>
+                                  <p:childTnLst>
+                                    <p:set>
+                                      <p:cBhvr>
+                                        <p:cTn id="20" dur="1" fill="hold">
+                                          <p:stCondLst>
+                                            <p:cond delay="0"/>
+                                          </p:stCondLst>
+                                        </p:cTn>
+                                        <p:tgtEl>
                                           <p:spTgt spid="12"/>
                                         </p:tgtEl>
                                         <p:attrNameLst>
@@ -11070,14 +13118,18 @@
       </p:par>
     </p:tnLst>
     <p:bldLst>
+      <p:bldP spid="7" grpId="0" animBg="1"/>
+      <p:bldP spid="8" grpId="0" animBg="1"/>
       <p:bldP spid="9" grpId="0" animBg="1"/>
+      <p:bldP spid="10" grpId="0" animBg="1"/>
+      <p:bldP spid="11" grpId="0" animBg="1"/>
       <p:bldP spid="12" grpId="0" animBg="1"/>
     </p:bldLst>
   </p:timing>
 </p:sld>
 </file>
 
-<file path=ppt/slides/slide2.xml><?xml version="1.0" encoding="utf-8"?>
+<file path=ppt/slides/slide24.xml><?xml version="1.0" encoding="utf-8"?>
 <p:sld xmlns:a="http://schemas.openxmlformats.org/drawingml/2006/main" xmlns:r="http://schemas.openxmlformats.org/officeDocument/2006/relationships" xmlns:p="http://schemas.openxmlformats.org/presentationml/2006/main">
   <p:cSld>
     <p:spTree>
@@ -11094,6 +13146,29 @@
           <a:chExt cx="0" cy="0"/>
         </a:xfrm>
       </p:grpSpPr>
+      <p:pic>
+        <p:nvPicPr>
+          <p:cNvPr id="6" name="Picture 5"/>
+          <p:cNvPicPr>
+            <a:picLocks noChangeAspect="1"/>
+          </p:cNvPicPr>
+          <p:nvPr/>
+        </p:nvPicPr>
+        <p:blipFill rotWithShape="1">
+          <a:blip r:embed="rId2"/>
+          <a:srcRect t="5228" b="3310"/>
+          <a:stretch/>
+        </p:blipFill>
+        <p:spPr>
+          <a:xfrm>
+            <a:off x="0" y="1161859"/>
+            <a:ext cx="9144000" cy="5748402"/>
+          </a:xfrm>
+          <a:prstGeom prst="rect">
+            <a:avLst/>
+          </a:prstGeom>
+        </p:spPr>
+      </p:pic>
       <p:sp>
         <p:nvSpPr>
           <p:cNvPr id="2" name="Title 1"/>
@@ -11109,18 +13184,22 @@
           <a:bodyPr/>
           <a:lstStyle/>
           <a:p>
+            <a:r>
+              <a:rPr lang="en-US" dirty="0" smtClean="0"/>
+              <a:t>4. Job management</a:t>
+            </a:r>
             <a:endParaRPr lang="en-US" dirty="0"/>
           </a:p>
         </p:txBody>
       </p:sp>
       <p:sp>
         <p:nvSpPr>
-          <p:cNvPr id="3" name="Content Placeholder 2"/>
-          <p:cNvSpPr>
-            <a:spLocks noGrp="1"/>
-          </p:cNvSpPr>
-          <p:nvPr>
-            <p:ph idx="1"/>
+          <p:cNvPr id="3" name="Date Placeholder 2"/>
+          <p:cNvSpPr>
+            <a:spLocks noGrp="1"/>
+          </p:cNvSpPr>
+          <p:nvPr>
+            <p:ph type="dt" sz="half" idx="10"/>
           </p:nvPr>
         </p:nvSpPr>
         <p:spPr/>
@@ -11128,70 +13207,7 @@
           <a:bodyPr/>
           <a:lstStyle/>
           <a:p>
-            <a:pPr marL="0" indent="0">
-              <a:buNone/>
-            </a:pPr>
-            <a:r>
-              <a:rPr lang="en-US" dirty="0" smtClean="0"/>
-              <a:t>Launcher is a GUI for </a:t>
-            </a:r>
-          </a:p>
-          <a:p>
-            <a:r>
-              <a:rPr lang="en-US" dirty="0" smtClean="0"/>
-              <a:t>easy resource allocation</a:t>
-            </a:r>
-          </a:p>
-          <a:p>
-            <a:r>
-              <a:rPr lang="en-US" dirty="0" smtClean="0"/>
-              <a:t>job script creation</a:t>
-            </a:r>
-          </a:p>
-          <a:p>
-            <a:r>
-              <a:rPr lang="en-US" dirty="0" smtClean="0"/>
-              <a:t>submitting jobs</a:t>
-            </a:r>
-          </a:p>
-          <a:p>
-            <a:r>
-              <a:rPr lang="en-US" dirty="0" smtClean="0"/>
-              <a:t>retrieving and storing results</a:t>
-            </a:r>
-          </a:p>
-          <a:p>
-            <a:r>
-              <a:rPr lang="en-US" dirty="0" smtClean="0"/>
-              <a:t>VSC clusters</a:t>
-            </a:r>
-          </a:p>
-          <a:p>
-            <a:pPr lvl="1"/>
-            <a:r>
-              <a:rPr lang="en-US" dirty="0" smtClean="0"/>
-              <a:t>currently only Hopper and Turing</a:t>
-            </a:r>
-            <a:endParaRPr lang="en-US" dirty="0"/>
-          </a:p>
-        </p:txBody>
-      </p:sp>
-      <p:sp>
-        <p:nvSpPr>
-          <p:cNvPr id="4" name="Date Placeholder 3"/>
-          <p:cNvSpPr>
-            <a:spLocks noGrp="1"/>
-          </p:cNvSpPr>
-          <p:nvPr>
-            <p:ph type="dt" sz="half" idx="10"/>
-          </p:nvPr>
-        </p:nvSpPr>
-        <p:spPr/>
-        <p:txBody>
-          <a:bodyPr/>
-          <a:lstStyle/>
-          <a:p>
-            <a:fld id="{575CC414-8FA8-3A46-A15A-107E8D313399}" type="datetime6">
+            <a:fld id="{A6EF29A7-BBF5-A84F-8C8E-08BE54B3CC62}" type="datetime6">
               <a:rPr lang="en-US" smtClean="0"/>
               <a:t>May 15</a:t>
             </a:fld>
@@ -11201,7 +13217,7 @@
       </p:sp>
       <p:sp>
         <p:nvSpPr>
-          <p:cNvPr id="5" name="Footer Placeholder 4"/>
+          <p:cNvPr id="4" name="Footer Placeholder 3"/>
           <p:cNvSpPr>
             <a:spLocks noGrp="1"/>
           </p:cNvSpPr>
@@ -11215,15 +13231,16 @@
           <a:lstStyle/>
           <a:p>
             <a:r>
-              <a:rPr lang="en-US" dirty="0" smtClean="0"/>
+              <a:rPr lang="en-US" smtClean="0"/>
               <a:t>Launcher-presentation</a:t>
             </a:r>
-          </a:p>
-        </p:txBody>
-      </p:sp>
-      <p:sp>
-        <p:nvSpPr>
-          <p:cNvPr id="6" name="Slide Number Placeholder 5"/>
+            <a:endParaRPr lang="en-US"/>
+          </a:p>
+        </p:txBody>
+      </p:sp>
+      <p:sp>
+        <p:nvSpPr>
+          <p:cNvPr id="5" name="Slide Number Placeholder 4"/>
           <p:cNvSpPr>
             <a:spLocks noGrp="1"/>
           </p:cNvSpPr>
@@ -11238,16 +13255,1239 @@
           <a:p>
             <a:fld id="{1F70BE4E-F0F4-974B-B603-7347B10BD271}" type="slidenum">
               <a:rPr lang="en-US" smtClean="0"/>
-              <a:t>1</a:t>
+              <a:t>23</a:t>
             </a:fld>
             <a:endParaRPr lang="en-US"/>
+          </a:p>
+        </p:txBody>
+      </p:sp>
+      <p:sp>
+        <p:nvSpPr>
+          <p:cNvPr id="7" name="Rounded Rectangular Callout 6"/>
+          <p:cNvSpPr/>
+          <p:nvPr/>
+        </p:nvSpPr>
+        <p:spPr>
+          <a:xfrm>
+            <a:off x="457200" y="3459558"/>
+            <a:ext cx="3475080" cy="759344"/>
+          </a:xfrm>
+          <a:prstGeom prst="wedgeRoundRectCallout">
+            <a:avLst>
+              <a:gd name="adj1" fmla="val 31131"/>
+              <a:gd name="adj2" fmla="val 343434"/>
+              <a:gd name="adj3" fmla="val 16667"/>
+            </a:avLst>
+          </a:prstGeom>
+          <a:noFill/>
+          <a:ln w="25400">
+            <a:solidFill>
+              <a:srgbClr val="6C0424"/>
+            </a:solidFill>
+          </a:ln>
+          <a:effectLst/>
+        </p:spPr>
+        <p:style>
+          <a:lnRef idx="1">
+            <a:schemeClr val="accent1"/>
+          </a:lnRef>
+          <a:fillRef idx="3">
+            <a:schemeClr val="accent1"/>
+          </a:fillRef>
+          <a:effectRef idx="2">
+            <a:schemeClr val="accent1"/>
+          </a:effectRef>
+          <a:fontRef idx="minor">
+            <a:schemeClr val="lt1"/>
+          </a:fontRef>
+        </p:style>
+        <p:txBody>
+          <a:bodyPr rtlCol="0" anchor="ctr"/>
+          <a:lstStyle/>
+          <a:p>
+            <a:pPr algn="ctr"/>
+            <a:r>
+              <a:rPr lang="en-US" sz="1600" dirty="0" smtClean="0">
+                <a:solidFill>
+                  <a:schemeClr val="accent1">
+                    <a:lumMod val="50000"/>
+                  </a:schemeClr>
+                </a:solidFill>
+                <a:latin typeface="Avenir Book"/>
+              </a:rPr>
+              <a:t>after hitting the </a:t>
+            </a:r>
+            <a:r>
+              <a:rPr lang="en-US" sz="1600" i="1" dirty="0" smtClean="0">
+                <a:solidFill>
+                  <a:schemeClr val="accent1">
+                    <a:lumMod val="50000"/>
+                  </a:schemeClr>
+                </a:solidFill>
+                <a:latin typeface="Avenir Book"/>
+              </a:rPr>
+              <a:t>Retrieve-results-of-submitted-jobs </a:t>
+            </a:r>
+            <a:r>
+              <a:rPr lang="en-US" sz="1600" dirty="0" smtClean="0">
+                <a:solidFill>
+                  <a:schemeClr val="accent1">
+                    <a:lumMod val="50000"/>
+                  </a:schemeClr>
+                </a:solidFill>
+                <a:latin typeface="Avenir Book"/>
+              </a:rPr>
+              <a:t>button </a:t>
+            </a:r>
+            <a:endParaRPr lang="en-US" sz="1600" dirty="0">
+              <a:solidFill>
+                <a:schemeClr val="accent1">
+                  <a:lumMod val="50000"/>
+                </a:schemeClr>
+              </a:solidFill>
+              <a:latin typeface="Avenir Book"/>
+            </a:endParaRPr>
+          </a:p>
+        </p:txBody>
+      </p:sp>
+      <p:sp>
+        <p:nvSpPr>
+          <p:cNvPr id="8" name="Rounded Rectangular Callout 7"/>
+          <p:cNvSpPr/>
+          <p:nvPr/>
+        </p:nvSpPr>
+        <p:spPr>
+          <a:xfrm>
+            <a:off x="5211720" y="3459558"/>
+            <a:ext cx="3475080" cy="759344"/>
+          </a:xfrm>
+          <a:prstGeom prst="wedgeRoundRectCallout">
+            <a:avLst>
+              <a:gd name="adj1" fmla="val -118507"/>
+              <a:gd name="adj2" fmla="val -247248"/>
+              <a:gd name="adj3" fmla="val 16667"/>
+            </a:avLst>
+          </a:prstGeom>
+          <a:noFill/>
+          <a:ln w="25400">
+            <a:solidFill>
+              <a:srgbClr val="6C0424"/>
+            </a:solidFill>
+          </a:ln>
+          <a:effectLst/>
+        </p:spPr>
+        <p:style>
+          <a:lnRef idx="1">
+            <a:schemeClr val="accent1"/>
+          </a:lnRef>
+          <a:fillRef idx="3">
+            <a:schemeClr val="accent1"/>
+          </a:fillRef>
+          <a:effectRef idx="2">
+            <a:schemeClr val="accent1"/>
+          </a:effectRef>
+          <a:fontRef idx="minor">
+            <a:schemeClr val="lt1"/>
+          </a:fontRef>
+        </p:style>
+        <p:txBody>
+          <a:bodyPr rtlCol="0" anchor="ctr"/>
+          <a:lstStyle/>
+          <a:p>
+            <a:pPr algn="ctr"/>
+            <a:r>
+              <a:rPr lang="en-US" sz="1600" dirty="0" smtClean="0">
+                <a:solidFill>
+                  <a:schemeClr val="accent1">
+                    <a:lumMod val="50000"/>
+                  </a:schemeClr>
+                </a:solidFill>
+                <a:latin typeface="Avenir Book"/>
+              </a:rPr>
+              <a:t>our job is retrieved</a:t>
+            </a:r>
+            <a:endParaRPr lang="en-US" sz="1600" dirty="0">
+              <a:solidFill>
+                <a:schemeClr val="accent1">
+                  <a:lumMod val="50000"/>
+                </a:schemeClr>
+              </a:solidFill>
+              <a:latin typeface="Avenir Book"/>
+            </a:endParaRPr>
+          </a:p>
+        </p:txBody>
+      </p:sp>
+      <p:sp>
+        <p:nvSpPr>
+          <p:cNvPr id="9" name="Rounded Rectangular Callout 8"/>
+          <p:cNvSpPr/>
+          <p:nvPr/>
+        </p:nvSpPr>
+        <p:spPr>
+          <a:xfrm>
+            <a:off x="5211720" y="4793901"/>
+            <a:ext cx="3475080" cy="759344"/>
+          </a:xfrm>
+          <a:prstGeom prst="wedgeRoundRectCallout">
+            <a:avLst>
+              <a:gd name="adj1" fmla="val -119674"/>
+              <a:gd name="adj2" fmla="val -266819"/>
+              <a:gd name="adj3" fmla="val 16667"/>
+            </a:avLst>
+          </a:prstGeom>
+          <a:noFill/>
+          <a:ln w="25400">
+            <a:solidFill>
+              <a:srgbClr val="6C0424"/>
+            </a:solidFill>
+          </a:ln>
+          <a:effectLst/>
+        </p:spPr>
+        <p:style>
+          <a:lnRef idx="1">
+            <a:schemeClr val="accent1"/>
+          </a:lnRef>
+          <a:fillRef idx="3">
+            <a:schemeClr val="accent1"/>
+          </a:fillRef>
+          <a:effectRef idx="2">
+            <a:schemeClr val="accent1"/>
+          </a:effectRef>
+          <a:fontRef idx="minor">
+            <a:schemeClr val="lt1"/>
+          </a:fontRef>
+        </p:style>
+        <p:txBody>
+          <a:bodyPr rtlCol="0" anchor="ctr"/>
+          <a:lstStyle/>
+          <a:p>
+            <a:pPr algn="ctr"/>
+            <a:r>
+              <a:rPr lang="en-US" sz="1600" dirty="0" smtClean="0">
+                <a:solidFill>
+                  <a:schemeClr val="accent1">
+                    <a:lumMod val="50000"/>
+                  </a:schemeClr>
+                </a:solidFill>
+                <a:latin typeface="Avenir Book"/>
+              </a:rPr>
+              <a:t>the results of all finished jobs are retrieved, and the list is now empty</a:t>
+            </a:r>
+            <a:endParaRPr lang="en-US" sz="1600" dirty="0">
+              <a:solidFill>
+                <a:schemeClr val="accent1">
+                  <a:lumMod val="50000"/>
+                </a:schemeClr>
+              </a:solidFill>
+              <a:latin typeface="Avenir Book"/>
+            </a:endParaRPr>
           </a:p>
         </p:txBody>
       </p:sp>
     </p:spTree>
     <p:extLst>
       <p:ext uri="{BB962C8B-B14F-4D97-AF65-F5344CB8AC3E}">
-        <p14:creationId xmlns:p14="http://schemas.microsoft.com/office/powerpoint/2010/main" val="67010969"/>
+        <p14:creationId xmlns:p14="http://schemas.microsoft.com/office/powerpoint/2010/main" val="1252334639"/>
+      </p:ext>
+    </p:extLst>
+  </p:cSld>
+  <p:clrMapOvr>
+    <a:masterClrMapping/>
+  </p:clrMapOvr>
+  <p:timing>
+    <p:tnLst>
+      <p:par>
+        <p:cTn xmlns:p14="http://schemas.microsoft.com/office/powerpoint/2010/main" id="1" dur="indefinite" restart="never" nodeType="tmRoot">
+          <p:childTnLst>
+            <p:seq concurrent="1" nextAc="seek">
+              <p:cTn id="2" dur="indefinite" nodeType="mainSeq">
+                <p:childTnLst>
+                  <p:par>
+                    <p:cTn id="3" fill="hold">
+                      <p:stCondLst>
+                        <p:cond delay="indefinite"/>
+                      </p:stCondLst>
+                      <p:childTnLst>
+                        <p:par>
+                          <p:cTn id="4" fill="hold">
+                            <p:stCondLst>
+                              <p:cond delay="0"/>
+                            </p:stCondLst>
+                            <p:childTnLst>
+                              <p:par>
+                                <p:cTn id="5" presetID="1" presetClass="entr" presetSubtype="0" fill="hold" grpId="0" nodeType="clickEffect">
+                                  <p:stCondLst>
+                                    <p:cond delay="0"/>
+                                  </p:stCondLst>
+                                  <p:childTnLst>
+                                    <p:set>
+                                      <p:cBhvr>
+                                        <p:cTn id="6" dur="1" fill="hold">
+                                          <p:stCondLst>
+                                            <p:cond delay="0"/>
+                                          </p:stCondLst>
+                                        </p:cTn>
+                                        <p:tgtEl>
+                                          <p:spTgt spid="7"/>
+                                        </p:tgtEl>
+                                        <p:attrNameLst>
+                                          <p:attrName>style.visibility</p:attrName>
+                                        </p:attrNameLst>
+                                      </p:cBhvr>
+                                      <p:to>
+                                        <p:strVal val="visible"/>
+                                      </p:to>
+                                    </p:set>
+                                  </p:childTnLst>
+                                </p:cTn>
+                              </p:par>
+                            </p:childTnLst>
+                          </p:cTn>
+                        </p:par>
+                      </p:childTnLst>
+                    </p:cTn>
+                  </p:par>
+                  <p:par>
+                    <p:cTn id="7" fill="hold">
+                      <p:stCondLst>
+                        <p:cond delay="indefinite"/>
+                      </p:stCondLst>
+                      <p:childTnLst>
+                        <p:par>
+                          <p:cTn id="8" fill="hold">
+                            <p:stCondLst>
+                              <p:cond delay="0"/>
+                            </p:stCondLst>
+                            <p:childTnLst>
+                              <p:par>
+                                <p:cTn id="9" presetID="1" presetClass="entr" presetSubtype="0" fill="hold" grpId="0" nodeType="clickEffect">
+                                  <p:stCondLst>
+                                    <p:cond delay="0"/>
+                                  </p:stCondLst>
+                                  <p:childTnLst>
+                                    <p:set>
+                                      <p:cBhvr>
+                                        <p:cTn id="10" dur="1" fill="hold">
+                                          <p:stCondLst>
+                                            <p:cond delay="0"/>
+                                          </p:stCondLst>
+                                        </p:cTn>
+                                        <p:tgtEl>
+                                          <p:spTgt spid="8"/>
+                                        </p:tgtEl>
+                                        <p:attrNameLst>
+                                          <p:attrName>style.visibility</p:attrName>
+                                        </p:attrNameLst>
+                                      </p:cBhvr>
+                                      <p:to>
+                                        <p:strVal val="visible"/>
+                                      </p:to>
+                                    </p:set>
+                                  </p:childTnLst>
+                                </p:cTn>
+                              </p:par>
+                            </p:childTnLst>
+                          </p:cTn>
+                        </p:par>
+                      </p:childTnLst>
+                    </p:cTn>
+                  </p:par>
+                  <p:par>
+                    <p:cTn id="11" fill="hold">
+                      <p:stCondLst>
+                        <p:cond delay="indefinite"/>
+                      </p:stCondLst>
+                      <p:childTnLst>
+                        <p:par>
+                          <p:cTn id="12" fill="hold">
+                            <p:stCondLst>
+                              <p:cond delay="0"/>
+                            </p:stCondLst>
+                            <p:childTnLst>
+                              <p:par>
+                                <p:cTn id="13" presetID="1" presetClass="entr" presetSubtype="0" fill="hold" grpId="0" nodeType="clickEffect">
+                                  <p:stCondLst>
+                                    <p:cond delay="0"/>
+                                  </p:stCondLst>
+                                  <p:childTnLst>
+                                    <p:set>
+                                      <p:cBhvr>
+                                        <p:cTn id="14" dur="1" fill="hold">
+                                          <p:stCondLst>
+                                            <p:cond delay="0"/>
+                                          </p:stCondLst>
+                                        </p:cTn>
+                                        <p:tgtEl>
+                                          <p:spTgt spid="9"/>
+                                        </p:tgtEl>
+                                        <p:attrNameLst>
+                                          <p:attrName>style.visibility</p:attrName>
+                                        </p:attrNameLst>
+                                      </p:cBhvr>
+                                      <p:to>
+                                        <p:strVal val="visible"/>
+                                      </p:to>
+                                    </p:set>
+                                  </p:childTnLst>
+                                </p:cTn>
+                              </p:par>
+                            </p:childTnLst>
+                          </p:cTn>
+                        </p:par>
+                      </p:childTnLst>
+                    </p:cTn>
+                  </p:par>
+                </p:childTnLst>
+              </p:cTn>
+              <p:prevCondLst>
+                <p:cond evt="onPrev" delay="0">
+                  <p:tgtEl>
+                    <p:sldTgt/>
+                  </p:tgtEl>
+                </p:cond>
+              </p:prevCondLst>
+              <p:nextCondLst>
+                <p:cond evt="onNext" delay="0">
+                  <p:tgtEl>
+                    <p:sldTgt/>
+                  </p:tgtEl>
+                </p:cond>
+              </p:nextCondLst>
+            </p:seq>
+          </p:childTnLst>
+        </p:cTn>
+      </p:par>
+    </p:tnLst>
+    <p:bldLst>
+      <p:bldP spid="7" grpId="0" animBg="1"/>
+      <p:bldP spid="8" grpId="0" animBg="1"/>
+      <p:bldP spid="9" grpId="0" animBg="1"/>
+    </p:bldLst>
+  </p:timing>
+</p:sld>
+</file>
+
+<file path=ppt/slides/slide25.xml><?xml version="1.0" encoding="utf-8"?>
+<p:sld xmlns:a="http://schemas.openxmlformats.org/drawingml/2006/main" xmlns:r="http://schemas.openxmlformats.org/officeDocument/2006/relationships" xmlns:p="http://schemas.openxmlformats.org/presentationml/2006/main">
+  <p:cSld>
+    <p:spTree>
+      <p:nvGrpSpPr>
+        <p:cNvPr id="1" name=""/>
+        <p:cNvGrpSpPr/>
+        <p:nvPr/>
+      </p:nvGrpSpPr>
+      <p:grpSpPr>
+        <a:xfrm>
+          <a:off x="0" y="0"/>
+          <a:ext cx="0" cy="0"/>
+          <a:chOff x="0" y="0"/>
+          <a:chExt cx="0" cy="0"/>
+        </a:xfrm>
+      </p:grpSpPr>
+      <p:sp>
+        <p:nvSpPr>
+          <p:cNvPr id="2" name="Title 1"/>
+          <p:cNvSpPr>
+            <a:spLocks noGrp="1"/>
+          </p:cNvSpPr>
+          <p:nvPr>
+            <p:ph type="title"/>
+          </p:nvPr>
+        </p:nvSpPr>
+        <p:spPr/>
+        <p:txBody>
+          <a:bodyPr/>
+          <a:lstStyle/>
+          <a:p>
+            <a:r>
+              <a:rPr lang="en-US" dirty="0" smtClean="0"/>
+              <a:t>4. Job management</a:t>
+            </a:r>
+            <a:endParaRPr lang="en-US" dirty="0"/>
+          </a:p>
+        </p:txBody>
+      </p:sp>
+      <p:sp>
+        <p:nvSpPr>
+          <p:cNvPr id="3" name="Date Placeholder 2"/>
+          <p:cNvSpPr>
+            <a:spLocks noGrp="1"/>
+          </p:cNvSpPr>
+          <p:nvPr>
+            <p:ph type="dt" sz="half" idx="10"/>
+          </p:nvPr>
+        </p:nvSpPr>
+        <p:spPr/>
+        <p:txBody>
+          <a:bodyPr/>
+          <a:lstStyle/>
+          <a:p>
+            <a:fld id="{A6EF29A7-BBF5-A84F-8C8E-08BE54B3CC62}" type="datetime6">
+              <a:rPr lang="en-US" smtClean="0"/>
+              <a:t>May 15</a:t>
+            </a:fld>
+            <a:endParaRPr lang="en-US"/>
+          </a:p>
+        </p:txBody>
+      </p:sp>
+      <p:sp>
+        <p:nvSpPr>
+          <p:cNvPr id="4" name="Footer Placeholder 3"/>
+          <p:cNvSpPr>
+            <a:spLocks noGrp="1"/>
+          </p:cNvSpPr>
+          <p:nvPr>
+            <p:ph type="ftr" sz="quarter" idx="11"/>
+          </p:nvPr>
+        </p:nvSpPr>
+        <p:spPr/>
+        <p:txBody>
+          <a:bodyPr/>
+          <a:lstStyle/>
+          <a:p>
+            <a:r>
+              <a:rPr lang="en-US" smtClean="0"/>
+              <a:t>Launcher-presentation</a:t>
+            </a:r>
+            <a:endParaRPr lang="en-US"/>
+          </a:p>
+        </p:txBody>
+      </p:sp>
+      <p:sp>
+        <p:nvSpPr>
+          <p:cNvPr id="5" name="Slide Number Placeholder 4"/>
+          <p:cNvSpPr>
+            <a:spLocks noGrp="1"/>
+          </p:cNvSpPr>
+          <p:nvPr>
+            <p:ph type="sldNum" sz="quarter" idx="12"/>
+          </p:nvPr>
+        </p:nvSpPr>
+        <p:spPr/>
+        <p:txBody>
+          <a:bodyPr/>
+          <a:lstStyle/>
+          <a:p>
+            <a:fld id="{1F70BE4E-F0F4-974B-B603-7347B10BD271}" type="slidenum">
+              <a:rPr lang="en-US" smtClean="0"/>
+              <a:t>24</a:t>
+            </a:fld>
+            <a:endParaRPr lang="en-US"/>
+          </a:p>
+        </p:txBody>
+      </p:sp>
+      <p:pic>
+        <p:nvPicPr>
+          <p:cNvPr id="6" name="Picture 5"/>
+          <p:cNvPicPr>
+            <a:picLocks noChangeAspect="1"/>
+          </p:cNvPicPr>
+          <p:nvPr/>
+        </p:nvPicPr>
+        <p:blipFill>
+          <a:blip r:embed="rId2"/>
+          <a:stretch>
+            <a:fillRect/>
+          </a:stretch>
+        </p:blipFill>
+        <p:spPr>
+          <a:xfrm>
+            <a:off x="0" y="2146300"/>
+            <a:ext cx="9144000" cy="2547916"/>
+          </a:xfrm>
+          <a:prstGeom prst="rect">
+            <a:avLst/>
+          </a:prstGeom>
+        </p:spPr>
+      </p:pic>
+      <p:sp>
+        <p:nvSpPr>
+          <p:cNvPr id="7" name="Rounded Rectangular Callout 6"/>
+          <p:cNvSpPr/>
+          <p:nvPr/>
+        </p:nvSpPr>
+        <p:spPr>
+          <a:xfrm>
+            <a:off x="1386660" y="4891614"/>
+            <a:ext cx="3761274" cy="1201383"/>
+          </a:xfrm>
+          <a:prstGeom prst="wedgeRoundRectCallout">
+            <a:avLst>
+              <a:gd name="adj1" fmla="val 50474"/>
+              <a:gd name="adj2" fmla="val -217475"/>
+              <a:gd name="adj3" fmla="val 16667"/>
+            </a:avLst>
+          </a:prstGeom>
+          <a:noFill/>
+          <a:ln w="25400">
+            <a:solidFill>
+              <a:srgbClr val="6C0424"/>
+            </a:solidFill>
+          </a:ln>
+          <a:effectLst/>
+        </p:spPr>
+        <p:style>
+          <a:lnRef idx="1">
+            <a:schemeClr val="accent1"/>
+          </a:lnRef>
+          <a:fillRef idx="3">
+            <a:schemeClr val="accent1"/>
+          </a:fillRef>
+          <a:effectRef idx="2">
+            <a:schemeClr val="accent1"/>
+          </a:effectRef>
+          <a:fontRef idx="minor">
+            <a:schemeClr val="lt1"/>
+          </a:fontRef>
+        </p:style>
+        <p:txBody>
+          <a:bodyPr rtlCol="0" anchor="ctr"/>
+          <a:lstStyle/>
+          <a:p>
+            <a:pPr algn="ctr"/>
+            <a:r>
+              <a:rPr lang="en-US" sz="1600" dirty="0" smtClean="0">
+                <a:solidFill>
+                  <a:schemeClr val="accent1">
+                    <a:lumMod val="50000"/>
+                  </a:schemeClr>
+                </a:solidFill>
+                <a:latin typeface="Avenir Book"/>
+              </a:rPr>
+              <a:t>after hitting the </a:t>
+            </a:r>
+            <a:r>
+              <a:rPr lang="en-US" sz="1600" i="1" dirty="0" smtClean="0">
+                <a:solidFill>
+                  <a:schemeClr val="accent1">
+                    <a:lumMod val="50000"/>
+                  </a:schemeClr>
+                </a:solidFill>
+                <a:latin typeface="Avenir Book"/>
+              </a:rPr>
+              <a:t>Retrieve-results-of-submitted-jobs </a:t>
+            </a:r>
+            <a:r>
+              <a:rPr lang="en-US" sz="1600" dirty="0" smtClean="0">
+                <a:solidFill>
+                  <a:schemeClr val="accent1">
+                    <a:lumMod val="50000"/>
+                  </a:schemeClr>
+                </a:solidFill>
+                <a:latin typeface="Avenir Book"/>
+              </a:rPr>
+              <a:t>button  the local job folder has the same structure and contents as he remote job folder</a:t>
+            </a:r>
+            <a:endParaRPr lang="en-US" sz="1600" dirty="0">
+              <a:solidFill>
+                <a:schemeClr val="accent1">
+                  <a:lumMod val="50000"/>
+                </a:schemeClr>
+              </a:solidFill>
+              <a:latin typeface="Avenir Book"/>
+            </a:endParaRPr>
+          </a:p>
+        </p:txBody>
+      </p:sp>
+    </p:spTree>
+    <p:extLst>
+      <p:ext uri="{BB962C8B-B14F-4D97-AF65-F5344CB8AC3E}">
+        <p14:creationId xmlns:p14="http://schemas.microsoft.com/office/powerpoint/2010/main" val="2786020293"/>
+      </p:ext>
+    </p:extLst>
+  </p:cSld>
+  <p:clrMapOvr>
+    <a:masterClrMapping/>
+  </p:clrMapOvr>
+  <p:timing>
+    <p:tnLst>
+      <p:par>
+        <p:cTn xmlns:p14="http://schemas.microsoft.com/office/powerpoint/2010/main" id="1" dur="indefinite" restart="never" nodeType="tmRoot">
+          <p:childTnLst>
+            <p:seq concurrent="1" nextAc="seek">
+              <p:cTn id="2" dur="indefinite" nodeType="mainSeq">
+                <p:childTnLst>
+                  <p:par>
+                    <p:cTn id="3" fill="hold">
+                      <p:stCondLst>
+                        <p:cond delay="indefinite"/>
+                      </p:stCondLst>
+                      <p:childTnLst>
+                        <p:par>
+                          <p:cTn id="4" fill="hold">
+                            <p:stCondLst>
+                              <p:cond delay="0"/>
+                            </p:stCondLst>
+                            <p:childTnLst>
+                              <p:par>
+                                <p:cTn id="5" presetID="1" presetClass="entr" presetSubtype="0" fill="hold" grpId="0" nodeType="clickEffect">
+                                  <p:stCondLst>
+                                    <p:cond delay="0"/>
+                                  </p:stCondLst>
+                                  <p:childTnLst>
+                                    <p:set>
+                                      <p:cBhvr>
+                                        <p:cTn id="6" dur="1" fill="hold">
+                                          <p:stCondLst>
+                                            <p:cond delay="0"/>
+                                          </p:stCondLst>
+                                        </p:cTn>
+                                        <p:tgtEl>
+                                          <p:spTgt spid="7"/>
+                                        </p:tgtEl>
+                                        <p:attrNameLst>
+                                          <p:attrName>style.visibility</p:attrName>
+                                        </p:attrNameLst>
+                                      </p:cBhvr>
+                                      <p:to>
+                                        <p:strVal val="visible"/>
+                                      </p:to>
+                                    </p:set>
+                                  </p:childTnLst>
+                                </p:cTn>
+                              </p:par>
+                            </p:childTnLst>
+                          </p:cTn>
+                        </p:par>
+                      </p:childTnLst>
+                    </p:cTn>
+                  </p:par>
+                </p:childTnLst>
+              </p:cTn>
+              <p:prevCondLst>
+                <p:cond evt="onPrev" delay="0">
+                  <p:tgtEl>
+                    <p:sldTgt/>
+                  </p:tgtEl>
+                </p:cond>
+              </p:prevCondLst>
+              <p:nextCondLst>
+                <p:cond evt="onNext" delay="0">
+                  <p:tgtEl>
+                    <p:sldTgt/>
+                  </p:tgtEl>
+                </p:cond>
+              </p:nextCondLst>
+            </p:seq>
+          </p:childTnLst>
+        </p:cTn>
+      </p:par>
+    </p:tnLst>
+    <p:bldLst>
+      <p:bldP spid="7" grpId="0" animBg="1"/>
+    </p:bldLst>
+  </p:timing>
+</p:sld>
+</file>
+
+<file path=ppt/slides/slide26.xml><?xml version="1.0" encoding="utf-8"?>
+<p:sld xmlns:a="http://schemas.openxmlformats.org/drawingml/2006/main" xmlns:r="http://schemas.openxmlformats.org/officeDocument/2006/relationships" xmlns:p="http://schemas.openxmlformats.org/presentationml/2006/main">
+  <p:cSld>
+    <p:spTree>
+      <p:nvGrpSpPr>
+        <p:cNvPr id="1" name=""/>
+        <p:cNvGrpSpPr/>
+        <p:nvPr/>
+      </p:nvGrpSpPr>
+      <p:grpSpPr>
+        <a:xfrm>
+          <a:off x="0" y="0"/>
+          <a:ext cx="0" cy="0"/>
+          <a:chOff x="0" y="0"/>
+          <a:chExt cx="0" cy="0"/>
+        </a:xfrm>
+      </p:grpSpPr>
+      <p:grpSp>
+        <p:nvGrpSpPr>
+          <p:cNvPr id="4" name="Group 3"/>
+          <p:cNvGrpSpPr/>
+          <p:nvPr/>
+        </p:nvGrpSpPr>
+        <p:grpSpPr>
+          <a:xfrm rot="1412904">
+            <a:off x="1181189" y="2758220"/>
+            <a:ext cx="1461127" cy="1392764"/>
+            <a:chOff x="1010499" y="2799184"/>
+            <a:chExt cx="2225831" cy="2184728"/>
+          </a:xfrm>
+        </p:grpSpPr>
+        <p:sp>
+          <p:nvSpPr>
+            <p:cNvPr id="5" name="Donut 4"/>
+            <p:cNvSpPr/>
+            <p:nvPr/>
+          </p:nvSpPr>
+          <p:spPr>
+            <a:xfrm>
+              <a:off x="1010499" y="2799184"/>
+              <a:ext cx="2225831" cy="2184728"/>
+            </a:xfrm>
+            <a:prstGeom prst="donut">
+              <a:avLst>
+                <a:gd name="adj" fmla="val 8106"/>
+              </a:avLst>
+            </a:prstGeom>
+            <a:solidFill>
+              <a:schemeClr val="accent1">
+                <a:lumMod val="50000"/>
+              </a:schemeClr>
+            </a:solidFill>
+            <a:ln>
+              <a:solidFill>
+                <a:schemeClr val="accent1">
+                  <a:lumMod val="50000"/>
+                </a:schemeClr>
+              </a:solidFill>
+            </a:ln>
+            <a:effectLst/>
+          </p:spPr>
+          <p:style>
+            <a:lnRef idx="1">
+              <a:schemeClr val="accent1"/>
+            </a:lnRef>
+            <a:fillRef idx="3">
+              <a:schemeClr val="accent1"/>
+            </a:fillRef>
+            <a:effectRef idx="2">
+              <a:schemeClr val="accent1"/>
+            </a:effectRef>
+            <a:fontRef idx="minor">
+              <a:schemeClr val="lt1"/>
+            </a:fontRef>
+          </p:style>
+          <p:txBody>
+            <a:bodyPr rtlCol="0" anchor="ctr"/>
+            <a:lstStyle/>
+            <a:p>
+              <a:pPr algn="ctr"/>
+              <a:endParaRPr lang="en-US">
+                <a:solidFill>
+                  <a:schemeClr val="tx1"/>
+                </a:solidFill>
+              </a:endParaRPr>
+            </a:p>
+          </p:txBody>
+        </p:sp>
+        <p:sp>
+          <p:nvSpPr>
+            <p:cNvPr id="6" name="Isosceles Triangle 5"/>
+            <p:cNvSpPr/>
+            <p:nvPr/>
+          </p:nvSpPr>
+          <p:spPr>
+            <a:xfrm>
+              <a:off x="1418622" y="2963489"/>
+              <a:ext cx="1408049" cy="1542514"/>
+            </a:xfrm>
+            <a:prstGeom prst="triangle">
+              <a:avLst/>
+            </a:prstGeom>
+            <a:solidFill>
+              <a:schemeClr val="accent1">
+                <a:lumMod val="50000"/>
+              </a:schemeClr>
+            </a:solidFill>
+            <a:ln>
+              <a:solidFill>
+                <a:schemeClr val="accent1">
+                  <a:lumMod val="50000"/>
+                </a:schemeClr>
+              </a:solidFill>
+            </a:ln>
+            <a:effectLst/>
+          </p:spPr>
+          <p:style>
+            <a:lnRef idx="1">
+              <a:schemeClr val="accent1"/>
+            </a:lnRef>
+            <a:fillRef idx="3">
+              <a:schemeClr val="accent1"/>
+            </a:fillRef>
+            <a:effectRef idx="2">
+              <a:schemeClr val="accent1"/>
+            </a:effectRef>
+            <a:fontRef idx="minor">
+              <a:schemeClr val="lt1"/>
+            </a:fontRef>
+          </p:style>
+          <p:txBody>
+            <a:bodyPr rtlCol="0" anchor="ctr"/>
+            <a:lstStyle/>
+            <a:p>
+              <a:pPr algn="ctr"/>
+              <a:endParaRPr lang="en-US"/>
+            </a:p>
+          </p:txBody>
+        </p:sp>
+      </p:grpSp>
+      <p:sp>
+        <p:nvSpPr>
+          <p:cNvPr id="3" name="Subtitle 2"/>
+          <p:cNvSpPr>
+            <a:spLocks noGrp="1"/>
+          </p:cNvSpPr>
+          <p:nvPr>
+            <p:ph type="subTitle" idx="1"/>
+          </p:nvPr>
+        </p:nvSpPr>
+        <p:spPr>
+          <a:xfrm>
+            <a:off x="715927" y="2838072"/>
+            <a:ext cx="7818000" cy="2502348"/>
+          </a:xfrm>
+        </p:spPr>
+        <p:txBody>
+          <a:bodyPr anchor="t">
+            <a:normAutofit/>
+          </a:bodyPr>
+          <a:lstStyle/>
+          <a:p>
+            <a:r>
+              <a:rPr lang="en-US" sz="8000" dirty="0" smtClean="0"/>
+              <a:t>L      u n c h e </a:t>
+            </a:r>
+            <a:r>
+              <a:rPr lang="en-US" sz="8000" dirty="0" smtClean="0"/>
+              <a:t>r</a:t>
+            </a:r>
+          </a:p>
+          <a:p>
+            <a:r>
+              <a:rPr lang="en-US" sz="4400" dirty="0" smtClean="0"/>
+              <a:t>installation</a:t>
+            </a:r>
+            <a:endParaRPr lang="en-US" sz="4400" dirty="0" smtClean="0"/>
+          </a:p>
+          <a:p>
+            <a:endParaRPr lang="en-US" sz="8000" dirty="0"/>
+          </a:p>
+        </p:txBody>
+      </p:sp>
+      <p:sp>
+        <p:nvSpPr>
+          <p:cNvPr id="7" name="Title 1"/>
+          <p:cNvSpPr txBox="1">
+            <a:spLocks/>
+          </p:cNvSpPr>
+          <p:nvPr/>
+        </p:nvSpPr>
+        <p:spPr>
+          <a:xfrm>
+            <a:off x="-1128103" y="6211669"/>
+            <a:ext cx="3357523" cy="646331"/>
+          </a:xfrm>
+          <a:prstGeom prst="rect">
+            <a:avLst/>
+          </a:prstGeom>
+        </p:spPr>
+        <p:txBody>
+          <a:bodyPr vert="horz" wrap="square" lIns="91440" tIns="45720" rIns="91440" bIns="45720" rtlCol="0" anchor="ctr">
+            <a:noAutofit/>
+          </a:bodyPr>
+          <a:lstStyle>
+            <a:lvl1pPr algn="ctr" defTabSz="457200" rtl="0" eaLnBrk="1" latinLnBrk="0" hangingPunct="1">
+              <a:spcBef>
+                <a:spcPct val="0"/>
+              </a:spcBef>
+              <a:buNone/>
+              <a:defRPr sz="3600" kern="1200">
+                <a:solidFill>
+                  <a:srgbClr val="FFFFFF"/>
+                </a:solidFill>
+                <a:latin typeface="+mn-lt"/>
+                <a:ea typeface="+mj-ea"/>
+                <a:cs typeface="Verdana"/>
+              </a:defRPr>
+            </a:lvl1pPr>
+          </a:lstStyle>
+          <a:p>
+            <a:pPr algn="l"/>
+            <a:r>
+              <a:rPr lang="en-US" sz="1400" b="0" dirty="0" smtClean="0">
+                <a:solidFill>
+                  <a:schemeClr val="bg1">
+                    <a:lumMod val="85000"/>
+                  </a:schemeClr>
+                </a:solidFill>
+                <a:latin typeface="Avenir Book"/>
+                <a:cs typeface="Avenir Book"/>
+              </a:rPr>
+              <a:t>[</a:t>
+            </a:r>
+            <a:r>
+              <a:rPr lang="en-US" sz="1400" b="0" dirty="0" err="1" smtClean="0">
+                <a:solidFill>
+                  <a:schemeClr val="bg1">
+                    <a:lumMod val="85000"/>
+                  </a:schemeClr>
+                </a:solidFill>
+                <a:latin typeface="Avenir Book"/>
+                <a:cs typeface="Avenir Book"/>
+              </a:rPr>
+              <a:t>engel</a:t>
+            </a:r>
+            <a:r>
+              <a:rPr lang="en-US" sz="1400" b="0" dirty="0" smtClean="0">
+                <a:solidFill>
+                  <a:schemeClr val="bg1">
+                    <a:lumMod val="85000"/>
+                  </a:schemeClr>
+                </a:solidFill>
+                <a:latin typeface="Avenir Book"/>
+                <a:cs typeface="Avenir Book"/>
+              </a:rPr>
+              <a:t>]</a:t>
+            </a:r>
+            <a:r>
+              <a:rPr lang="en-US" sz="1400" b="0" dirty="0" err="1" smtClean="0">
+                <a:solidFill>
+                  <a:schemeClr val="bg1">
+                    <a:lumMod val="85000"/>
+                  </a:schemeClr>
+                </a:solidFill>
+                <a:latin typeface="Avenir Book"/>
+                <a:cs typeface="Avenir Book"/>
+              </a:rPr>
+              <a:t>bert</a:t>
+            </a:r>
+            <a:r>
+              <a:rPr lang="en-US" sz="1400" b="0" dirty="0" smtClean="0">
+                <a:solidFill>
+                  <a:schemeClr val="bg1">
+                    <a:lumMod val="85000"/>
+                  </a:schemeClr>
+                </a:solidFill>
+                <a:latin typeface="Avenir Book"/>
+                <a:cs typeface="Avenir Book"/>
+              </a:rPr>
+              <a:t> </a:t>
+            </a:r>
+            <a:r>
+              <a:rPr lang="en-US" sz="1400" dirty="0" err="1">
+                <a:solidFill>
+                  <a:schemeClr val="bg1">
+                    <a:lumMod val="85000"/>
+                  </a:schemeClr>
+                </a:solidFill>
+                <a:latin typeface="Avenir Book"/>
+                <a:cs typeface="Avenir Book"/>
+              </a:rPr>
+              <a:t>t</a:t>
+            </a:r>
+            <a:r>
+              <a:rPr lang="en-US" sz="1400" b="0" dirty="0" err="1" smtClean="0">
+                <a:solidFill>
+                  <a:schemeClr val="bg1">
+                    <a:lumMod val="85000"/>
+                  </a:schemeClr>
+                </a:solidFill>
+                <a:latin typeface="Avenir Book"/>
+                <a:cs typeface="Avenir Book"/>
+              </a:rPr>
+              <a:t>ijskens</a:t>
+            </a:r>
+            <a:r>
+              <a:rPr lang="en-US" sz="1400" b="0" dirty="0" smtClean="0">
+                <a:solidFill>
+                  <a:schemeClr val="bg1">
+                    <a:lumMod val="85000"/>
+                  </a:schemeClr>
+                </a:solidFill>
+                <a:latin typeface="Avenir Book"/>
+                <a:cs typeface="Avenir Book"/>
+              </a:rPr>
+              <a:t>  - may 2015</a:t>
+            </a:r>
+            <a:endParaRPr lang="en-US" sz="1400" b="0" dirty="0">
+              <a:solidFill>
+                <a:schemeClr val="bg1">
+                  <a:lumMod val="85000"/>
+                </a:schemeClr>
+              </a:solidFill>
+              <a:latin typeface="Avenir Book"/>
+              <a:cs typeface="Avenir Book"/>
+            </a:endParaRPr>
+          </a:p>
+        </p:txBody>
+      </p:sp>
+    </p:spTree>
+    <p:extLst>
+      <p:ext uri="{BB962C8B-B14F-4D97-AF65-F5344CB8AC3E}">
+        <p14:creationId xmlns:p14="http://schemas.microsoft.com/office/powerpoint/2010/main" val="2407085365"/>
+      </p:ext>
+    </p:extLst>
+  </p:cSld>
+  <p:clrMapOvr>
+    <a:masterClrMapping/>
+  </p:clrMapOvr>
+  <p:timing>
+    <p:tnLst>
+      <p:par>
+        <p:cTn xmlns:p14="http://schemas.microsoft.com/office/powerpoint/2010/main" id="1" dur="indefinite" restart="never" nodeType="tmRoot"/>
+      </p:par>
+    </p:tnLst>
+  </p:timing>
+</p:sld>
+</file>
+
+<file path=ppt/slides/slide27.xml><?xml version="1.0" encoding="utf-8"?>
+<p:sld xmlns:a="http://schemas.openxmlformats.org/drawingml/2006/main" xmlns:r="http://schemas.openxmlformats.org/officeDocument/2006/relationships" xmlns:p="http://schemas.openxmlformats.org/presentationml/2006/main">
+  <p:cSld>
+    <p:spTree>
+      <p:nvGrpSpPr>
+        <p:cNvPr id="1" name=""/>
+        <p:cNvGrpSpPr/>
+        <p:nvPr/>
+      </p:nvGrpSpPr>
+      <p:grpSpPr>
+        <a:xfrm>
+          <a:off x="0" y="0"/>
+          <a:ext cx="0" cy="0"/>
+          <a:chOff x="0" y="0"/>
+          <a:chExt cx="0" cy="0"/>
+        </a:xfrm>
+      </p:grpSpPr>
+      <p:sp>
+        <p:nvSpPr>
+          <p:cNvPr id="2" name="Title 1"/>
+          <p:cNvSpPr>
+            <a:spLocks noGrp="1"/>
+          </p:cNvSpPr>
+          <p:nvPr>
+            <p:ph type="title"/>
+          </p:nvPr>
+        </p:nvSpPr>
+        <p:spPr/>
+        <p:txBody>
+          <a:bodyPr/>
+          <a:lstStyle/>
+          <a:p>
+            <a:r>
+              <a:rPr lang="en-US" dirty="0" smtClean="0"/>
+              <a:t>installation instructions</a:t>
+            </a:r>
+            <a:endParaRPr lang="en-US" dirty="0"/>
+          </a:p>
+        </p:txBody>
+      </p:sp>
+      <p:sp>
+        <p:nvSpPr>
+          <p:cNvPr id="3" name="Content Placeholder 2"/>
+          <p:cNvSpPr>
+            <a:spLocks noGrp="1"/>
+          </p:cNvSpPr>
+          <p:nvPr>
+            <p:ph idx="1"/>
+          </p:nvPr>
+        </p:nvSpPr>
+        <p:spPr/>
+        <p:txBody>
+          <a:bodyPr/>
+          <a:lstStyle/>
+          <a:p>
+            <a:pPr marL="0" indent="0" algn="ctr">
+              <a:buNone/>
+            </a:pPr>
+            <a:r>
+              <a:rPr lang="en-US" sz="2800" smtClean="0"/>
+              <a:t>https</a:t>
+            </a:r>
+            <a:r>
+              <a:rPr lang="en-US" sz="2800" dirty="0"/>
+              <a:t>://</a:t>
+            </a:r>
+            <a:r>
+              <a:rPr lang="en-US" sz="2800" dirty="0" err="1"/>
+              <a:t>github.com</a:t>
+            </a:r>
+            <a:r>
+              <a:rPr lang="en-US" sz="2800" dirty="0"/>
+              <a:t>/</a:t>
+            </a:r>
+            <a:r>
+              <a:rPr lang="en-US" sz="2800" dirty="0" err="1"/>
+              <a:t>hpcuantwerpen</a:t>
+            </a:r>
+            <a:r>
+              <a:rPr lang="en-US" sz="2800" dirty="0"/>
+              <a:t>/Launcher</a:t>
+            </a:r>
+          </a:p>
+        </p:txBody>
+      </p:sp>
+      <p:sp>
+        <p:nvSpPr>
+          <p:cNvPr id="4" name="Date Placeholder 3"/>
+          <p:cNvSpPr>
+            <a:spLocks noGrp="1"/>
+          </p:cNvSpPr>
+          <p:nvPr>
+            <p:ph type="dt" sz="half" idx="10"/>
+          </p:nvPr>
+        </p:nvSpPr>
+        <p:spPr/>
+        <p:txBody>
+          <a:bodyPr/>
+          <a:lstStyle/>
+          <a:p>
+            <a:fld id="{A6EF29A7-BBF5-A84F-8C8E-08BE54B3CC62}" type="datetime6">
+              <a:rPr lang="en-US" smtClean="0"/>
+              <a:t>May 15</a:t>
+            </a:fld>
+            <a:endParaRPr lang="en-US"/>
+          </a:p>
+        </p:txBody>
+      </p:sp>
+      <p:sp>
+        <p:nvSpPr>
+          <p:cNvPr id="5" name="Footer Placeholder 4"/>
+          <p:cNvSpPr>
+            <a:spLocks noGrp="1"/>
+          </p:cNvSpPr>
+          <p:nvPr>
+            <p:ph type="ftr" sz="quarter" idx="11"/>
+          </p:nvPr>
+        </p:nvSpPr>
+        <p:spPr/>
+        <p:txBody>
+          <a:bodyPr/>
+          <a:lstStyle/>
+          <a:p>
+            <a:r>
+              <a:rPr lang="en-US" smtClean="0"/>
+              <a:t>Launcher-presentation</a:t>
+            </a:r>
+            <a:endParaRPr lang="en-US"/>
+          </a:p>
+        </p:txBody>
+      </p:sp>
+      <p:sp>
+        <p:nvSpPr>
+          <p:cNvPr id="6" name="Slide Number Placeholder 5"/>
+          <p:cNvSpPr>
+            <a:spLocks noGrp="1"/>
+          </p:cNvSpPr>
+          <p:nvPr>
+            <p:ph type="sldNum" sz="quarter" idx="12"/>
+          </p:nvPr>
+        </p:nvSpPr>
+        <p:spPr/>
+        <p:txBody>
+          <a:bodyPr/>
+          <a:lstStyle/>
+          <a:p>
+            <a:fld id="{1F70BE4E-F0F4-974B-B603-7347B10BD271}" type="slidenum">
+              <a:rPr lang="en-US" smtClean="0"/>
+              <a:t>26</a:t>
+            </a:fld>
+            <a:endParaRPr lang="en-US"/>
+          </a:p>
+        </p:txBody>
+      </p:sp>
+    </p:spTree>
+    <p:extLst>
+      <p:ext uri="{BB962C8B-B14F-4D97-AF65-F5344CB8AC3E}">
+        <p14:creationId xmlns:p14="http://schemas.microsoft.com/office/powerpoint/2010/main" val="1893826054"/>
       </p:ext>
     </p:extLst>
   </p:cSld>

</xml_diff>

<commit_message>
wip on MVC conversion of Launcher
</commit_message>
<xml_diff>
--- a/Launcher-presentation.pptx
+++ b/Launcher-presentation.pptx
@@ -5,10 +5,10 @@
     <p:sldMasterId id="2147483648" r:id="rId1"/>
   </p:sldMasterIdLst>
   <p:notesMasterIdLst>
-    <p:notesMasterId r:id="rId29"/>
+    <p:notesMasterId r:id="rId30"/>
   </p:notesMasterIdLst>
   <p:handoutMasterIdLst>
-    <p:handoutMasterId r:id="rId30"/>
+    <p:handoutMasterId r:id="rId31"/>
   </p:handoutMasterIdLst>
   <p:sldIdLst>
     <p:sldId id="256" r:id="rId2"/>
@@ -36,8 +36,9 @@
     <p:sldId id="327" r:id="rId24"/>
     <p:sldId id="328" r:id="rId25"/>
     <p:sldId id="329" r:id="rId26"/>
-    <p:sldId id="330" r:id="rId27"/>
-    <p:sldId id="331" r:id="rId28"/>
+    <p:sldId id="332" r:id="rId27"/>
+    <p:sldId id="330" r:id="rId28"/>
+    <p:sldId id="331" r:id="rId29"/>
   </p:sldIdLst>
   <p:sldSz cx="9144000" cy="6858000" type="screen4x3"/>
   <p:notesSz cx="6858000" cy="9144000"/>
@@ -221,7 +222,7 @@
           <a:p>
             <a:fld id="{F8B85826-3BA1-4E4F-B00E-6F5A52028E75}" type="datetimeFigureOut">
               <a:rPr lang="en-US" smtClean="0"/>
-              <a:t>18/05/15</a:t>
+              <a:t>27/05/15</a:t>
             </a:fld>
             <a:endParaRPr lang="en-US"/>
           </a:p>
@@ -387,7 +388,7 @@
           <a:p>
             <a:fld id="{4CFE598A-AE60-9043-A173-FEB8DB03713D}" type="datetimeFigureOut">
               <a:rPr lang="en-US" smtClean="0"/>
-              <a:t>18/05/15</a:t>
+              <a:t>27/05/15</a:t>
             </a:fld>
             <a:endParaRPr lang="en-US"/>
           </a:p>
@@ -5861,13 +5862,13 @@
         </p:nvSpPr>
         <p:spPr>
           <a:xfrm>
-            <a:off x="812800" y="4629294"/>
-            <a:ext cx="2605644" cy="450455"/>
+            <a:off x="4992785" y="4602784"/>
+            <a:ext cx="3365766" cy="450455"/>
           </a:xfrm>
           <a:prstGeom prst="wedgeRoundRectCallout">
             <a:avLst>
-              <a:gd name="adj1" fmla="val 173691"/>
-              <a:gd name="adj2" fmla="val -255478"/>
+              <a:gd name="adj1" fmla="val 9930"/>
+              <a:gd name="adj2" fmla="val -243353"/>
               <a:gd name="adj3" fmla="val 16667"/>
             </a:avLst>
           </a:prstGeom>
@@ -5897,6 +5898,12 @@
           <a:bodyPr rtlCol="0" anchor="ctr"/>
           <a:lstStyle/>
           <a:p>
+            <a:r>
+              <a:rPr lang="en-US" dirty="0" smtClean="0">
+                <a:latin typeface="Avenir Book"/>
+              </a:rPr>
+              <a:t>unchanged (but we need more</a:t>
+            </a:r>
             <a:endParaRPr lang="en-US" dirty="0">
               <a:latin typeface="Avenir Book"/>
             </a:endParaRPr>
@@ -5947,62 +5954,6 @@
           <a:bodyPr rtlCol="0" anchor="ctr"/>
           <a:lstStyle/>
           <a:p>
-            <a:endParaRPr lang="en-US" dirty="0">
-              <a:latin typeface="Avenir Book"/>
-            </a:endParaRPr>
-          </a:p>
-        </p:txBody>
-      </p:sp>
-      <p:sp>
-        <p:nvSpPr>
-          <p:cNvPr id="21" name="Rounded Rectangular Callout 20"/>
-          <p:cNvSpPr/>
-          <p:nvPr/>
-        </p:nvSpPr>
-        <p:spPr>
-          <a:xfrm>
-            <a:off x="6890934" y="4484290"/>
-            <a:ext cx="1482665" cy="595459"/>
-          </a:xfrm>
-          <a:prstGeom prst="wedgeRoundRectCallout">
-            <a:avLst>
-              <a:gd name="adj1" fmla="val -42986"/>
-              <a:gd name="adj2" fmla="val -173800"/>
-              <a:gd name="adj3" fmla="val 16667"/>
-            </a:avLst>
-          </a:prstGeom>
-          <a:noFill/>
-          <a:ln w="25400">
-            <a:solidFill>
-              <a:srgbClr val="6C0424"/>
-            </a:solidFill>
-          </a:ln>
-          <a:effectLst/>
-        </p:spPr>
-        <p:style>
-          <a:lnRef idx="1">
-            <a:schemeClr val="accent1"/>
-          </a:lnRef>
-          <a:fillRef idx="3">
-            <a:schemeClr val="accent1"/>
-          </a:fillRef>
-          <a:effectRef idx="2">
-            <a:schemeClr val="accent1"/>
-          </a:effectRef>
-          <a:fontRef idx="minor">
-            <a:schemeClr val="lt1"/>
-          </a:fontRef>
-        </p:style>
-        <p:txBody>
-          <a:bodyPr rtlCol="0" anchor="ctr"/>
-          <a:lstStyle/>
-          <a:p>
-            <a:r>
-              <a:rPr lang="en-US" dirty="0" smtClean="0">
-                <a:latin typeface="Avenir Book"/>
-              </a:rPr>
-              <a:t>not enough memory ...</a:t>
-            </a:r>
             <a:endParaRPr lang="en-US" dirty="0">
               <a:latin typeface="Avenir Book"/>
             </a:endParaRPr>
@@ -6053,61 +6004,7 @@
                                           </p:stCondLst>
                                         </p:cTn>
                                         <p:tgtEl>
-                                          <p:spTgt spid="17"/>
-                                        </p:tgtEl>
-                                        <p:attrNameLst>
-                                          <p:attrName>style.visibility</p:attrName>
-                                        </p:attrNameLst>
-                                      </p:cBhvr>
-                                      <p:to>
-                                        <p:strVal val="visible"/>
-                                      </p:to>
-                                    </p:set>
-                                  </p:childTnLst>
-                                </p:cTn>
-                              </p:par>
-                              <p:par>
-                                <p:cTn id="7" presetID="1" presetClass="entr" presetSubtype="0" fill="hold" grpId="0" nodeType="withEffect">
-                                  <p:stCondLst>
-                                    <p:cond delay="0"/>
-                                  </p:stCondLst>
-                                  <p:childTnLst>
-                                    <p:set>
-                                      <p:cBhvr>
-                                        <p:cTn id="8" dur="1" fill="hold">
-                                          <p:stCondLst>
-                                            <p:cond delay="0"/>
-                                          </p:stCondLst>
-                                        </p:cTn>
-                                        <p:tgtEl>
                                           <p:spTgt spid="19"/>
-                                        </p:tgtEl>
-                                        <p:attrNameLst>
-                                          <p:attrName>style.visibility</p:attrName>
-                                        </p:attrNameLst>
-                                      </p:cBhvr>
-                                      <p:to>
-                                        <p:strVal val="visible"/>
-                                      </p:to>
-                                    </p:set>
-                                  </p:childTnLst>
-                                </p:cTn>
-                              </p:par>
-                              <p:par>
-                                <p:cTn id="9" presetID="1" presetClass="entr" presetSubtype="0" fill="hold" grpId="0" nodeType="withEffect">
-                                  <p:stCondLst>
-                                    <p:cond delay="0"/>
-                                  </p:stCondLst>
-                                  <p:childTnLst>
-                                    <p:set>
-                                      <p:cBhvr>
-                                        <p:cTn id="10" dur="1" fill="hold">
-                                          <p:stCondLst>
-                                            <p:cond delay="0"/>
-                                          </p:stCondLst>
-                                        </p:cTn>
-                                        <p:tgtEl>
-                                          <p:spTgt spid="20"/>
                                         </p:tgtEl>
                                         <p:attrNameLst>
                                           <p:attrName>style.visibility</p:attrName>
@@ -6127,32 +6024,59 @@
                     </p:cTn>
                   </p:par>
                   <p:par>
-                    <p:cTn id="11" fill="hold">
+                    <p:cTn id="7" fill="hold">
                       <p:stCondLst>
                         <p:cond delay="indefinite"/>
                       </p:stCondLst>
                       <p:childTnLst>
                         <p:par>
-                          <p:cTn id="12" fill="hold">
+                          <p:cTn id="8" fill="hold">
                             <p:stCondLst>
                               <p:cond delay="0"/>
                             </p:stCondLst>
                             <p:childTnLst>
                               <p:par>
-                                <p:cTn id="13" presetID="1" presetClass="entr" presetSubtype="0" fill="hold" grpId="0" nodeType="clickEffect">
+                                <p:cTn id="9" presetID="1" presetClass="entr" presetSubtype="0" fill="hold" grpId="0" nodeType="clickEffect">
                                   <p:stCondLst>
                                     <p:cond delay="0"/>
                                   </p:stCondLst>
                                   <p:childTnLst>
                                     <p:set>
                                       <p:cBhvr>
-                                        <p:cTn id="14" dur="1" fill="hold">
+                                        <p:cTn id="10" dur="1" fill="hold">
                                           <p:stCondLst>
                                             <p:cond delay="0"/>
                                           </p:stCondLst>
                                         </p:cTn>
                                         <p:tgtEl>
-                                          <p:spTgt spid="21"/>
+                                          <p:spTgt spid="17"/>
+                                        </p:tgtEl>
+                                        <p:attrNameLst>
+                                          <p:attrName>style.visibility</p:attrName>
+                                        </p:attrNameLst>
+                                      </p:cBhvr>
+                                      <p:to>
+                                        <p:strVal val="visible"/>
+                                      </p:to>
+                                    </p:set>
+                                  </p:childTnLst>
+                                </p:cTn>
+                              </p:par>
+                              <p:par>
+                                <p:cTn id="11" presetID="1" presetClass="entr" presetSubtype="0" fill="hold" grpId="0" nodeType="withEffect">
+                                  <p:stCondLst>
+                                    <p:cond delay="0"/>
+                                  </p:stCondLst>
+                                  <p:childTnLst>
+                                    <p:set>
+                                      <p:cBhvr>
+                                        <p:cTn id="12" dur="1" fill="hold">
+                                          <p:stCondLst>
+                                            <p:cond delay="0"/>
+                                          </p:stCondLst>
+                                        </p:cTn>
+                                        <p:tgtEl>
+                                          <p:spTgt spid="20"/>
                                         </p:tgtEl>
                                         <p:attrNameLst>
                                           <p:attrName>style.visibility</p:attrName>
@@ -6196,7 +6120,6 @@
       <p:bldP spid="17" grpId="0" animBg="1"/>
       <p:bldP spid="19" grpId="0" animBg="1"/>
       <p:bldP spid="20" grpId="0" animBg="1"/>
-      <p:bldP spid="21" grpId="0" animBg="1"/>
     </p:bldLst>
   </p:timing>
 </p:sld>
@@ -7272,7 +7195,7 @@
           </a:prstGeom>
         </p:spPr>
         <p:txBody>
-          <a:bodyPr vert="horz" lIns="91440" tIns="45720" rIns="91440" bIns="45720" rtlCol="0" anchor="t" anchorCtr="0">
+          <a:bodyPr vert="horz" lIns="91440" tIns="45720" rIns="91440" bIns="45720" rtlCol="0" anchor="ctr" anchorCtr="0">
             <a:normAutofit/>
           </a:bodyPr>
           <a:lstStyle>
@@ -7421,8 +7344,31 @@
                 <a:latin typeface="Avenir Book"/>
                 <a:cs typeface="Avenir Book"/>
               </a:rPr>
-              <a:t>if you need much more memory per core, make a resource request for Hopper-fat-nodes (250 GB/node)</a:t>
-            </a:r>
+              <a:t>if you need much more memory per core, make a resource request for Hopper-fat-nodes (250 GB/node</a:t>
+            </a:r>
+            <a:r>
+              <a:rPr lang="en-US" dirty="0" smtClean="0">
+                <a:latin typeface="Avenir Book"/>
+                <a:cs typeface="Avenir Book"/>
+              </a:rPr>
+              <a:t>)</a:t>
+            </a:r>
+          </a:p>
+          <a:p>
+            <a:pPr marL="0" indent="0">
+              <a:buNone/>
+            </a:pPr>
+            <a:r>
+              <a:rPr lang="en-US" sz="2800" dirty="0" smtClean="0">
+                <a:latin typeface="Avenir Book"/>
+                <a:cs typeface="Avenir Book"/>
+              </a:rPr>
+              <a:t>(you need to ask permission to use them)</a:t>
+            </a:r>
+            <a:endParaRPr lang="en-US" sz="2800" dirty="0" smtClean="0">
+              <a:latin typeface="Avenir Book"/>
+              <a:cs typeface="Avenir Book"/>
+            </a:endParaRPr>
           </a:p>
         </p:txBody>
       </p:sp>
@@ -7971,9 +7917,107 @@
   <p:timing>
     <p:tnLst>
       <p:par>
-        <p:cTn xmlns:p14="http://schemas.microsoft.com/office/powerpoint/2010/main" id="1" dur="indefinite" restart="never" nodeType="tmRoot"/>
+        <p:cTn xmlns:p14="http://schemas.microsoft.com/office/powerpoint/2010/main" id="1" dur="indefinite" restart="never" nodeType="tmRoot">
+          <p:childTnLst>
+            <p:seq concurrent="1" nextAc="seek">
+              <p:cTn id="2" dur="indefinite" nodeType="mainSeq">
+                <p:childTnLst>
+                  <p:par>
+                    <p:cTn id="3" fill="hold">
+                      <p:stCondLst>
+                        <p:cond delay="indefinite"/>
+                      </p:stCondLst>
+                      <p:childTnLst>
+                        <p:par>
+                          <p:cTn id="4" fill="hold">
+                            <p:stCondLst>
+                              <p:cond delay="0"/>
+                            </p:stCondLst>
+                            <p:childTnLst>
+                              <p:par>
+                                <p:cTn id="5" presetID="1" presetClass="entr" presetSubtype="0" fill="hold" grpId="0" nodeType="clickEffect">
+                                  <p:stCondLst>
+                                    <p:cond delay="0"/>
+                                  </p:stCondLst>
+                                  <p:childTnLst>
+                                    <p:set>
+                                      <p:cBhvr>
+                                        <p:cTn id="6" dur="1" fill="hold">
+                                          <p:stCondLst>
+                                            <p:cond delay="0"/>
+                                          </p:stCondLst>
+                                        </p:cTn>
+                                        <p:tgtEl>
+                                          <p:spTgt spid="9"/>
+                                        </p:tgtEl>
+                                        <p:attrNameLst>
+                                          <p:attrName>style.visibility</p:attrName>
+                                        </p:attrNameLst>
+                                      </p:cBhvr>
+                                      <p:to>
+                                        <p:strVal val="visible"/>
+                                      </p:to>
+                                    </p:set>
+                                  </p:childTnLst>
+                                </p:cTn>
+                              </p:par>
+                              <p:par>
+                                <p:cTn id="7" presetID="1" presetClass="entr" presetSubtype="0" fill="hold" nodeType="withEffect">
+                                  <p:stCondLst>
+                                    <p:cond delay="0"/>
+                                  </p:stCondLst>
+                                  <p:childTnLst>
+                                    <p:set>
+                                      <p:cBhvr>
+                                        <p:cTn id="8" dur="1" fill="hold">
+                                          <p:stCondLst>
+                                            <p:cond delay="0"/>
+                                          </p:stCondLst>
+                                        </p:cTn>
+                                        <p:tgtEl>
+                                          <p:spTgt spid="11"/>
+                                        </p:tgtEl>
+                                        <p:attrNameLst>
+                                          <p:attrName>style.visibility</p:attrName>
+                                        </p:attrNameLst>
+                                      </p:cBhvr>
+                                      <p:to>
+                                        <p:strVal val="visible"/>
+                                      </p:to>
+                                    </p:set>
+                                  </p:childTnLst>
+                                </p:cTn>
+                              </p:par>
+                            </p:childTnLst>
+                          </p:cTn>
+                        </p:par>
+                      </p:childTnLst>
+                    </p:cTn>
+                  </p:par>
+                </p:childTnLst>
+              </p:cTn>
+              <p:prevCondLst>
+                <p:cond evt="onPrev" delay="0">
+                  <p:tgtEl>
+                    <p:sldTgt/>
+                  </p:tgtEl>
+                </p:cond>
+              </p:prevCondLst>
+              <p:nextCondLst>
+                <p:cond evt="onNext" delay="0">
+                  <p:tgtEl>
+                    <p:sldTgt/>
+                  </p:tgtEl>
+                </p:cond>
+              </p:nextCondLst>
+            </p:seq>
+          </p:childTnLst>
+        </p:cTn>
       </p:par>
     </p:tnLst>
+    <p:bldLst>
+      <p:bldP spid="9" grpId="0"/>
+    </p:bldLst>
   </p:timing>
 </p:sld>
 </file>
@@ -8376,18 +8420,7 @@
                 </a:solidFill>
                 <a:latin typeface="Avenir Book"/>
               </a:rPr>
-              <a:t> destination</a:t>
-            </a:r>
-            <a:r>
-              <a:rPr lang="en-US" dirty="0" smtClean="0">
-                <a:solidFill>
-                  <a:schemeClr val="accent1">
-                    <a:lumMod val="50000"/>
-                  </a:schemeClr>
-                </a:solidFill>
-                <a:latin typeface="Avenir Book"/>
-              </a:rPr>
-              <a:t>).</a:t>
+              <a:t> destination).</a:t>
             </a:r>
           </a:p>
           <a:p>
@@ -8475,7 +8508,7 @@
                 </a:solidFill>
                 <a:latin typeface="Avenir Book"/>
               </a:rPr>
-              <a:t>copied</a:t>
+              <a:t>stored </a:t>
             </a:r>
             <a:r>
               <a:rPr lang="en-US" dirty="0" smtClean="0">
@@ -8486,7 +8519,7 @@
                 </a:solidFill>
                 <a:latin typeface="Avenir Book"/>
               </a:rPr>
-              <a:t> here (</a:t>
+              <a:t>here (</a:t>
             </a:r>
             <a:r>
               <a:rPr lang="en-US" b="1" dirty="0" smtClean="0">
@@ -8506,18 +8539,7 @@
                 </a:solidFill>
                 <a:latin typeface="Avenir Book"/>
               </a:rPr>
-              <a:t> destination</a:t>
-            </a:r>
-            <a:r>
-              <a:rPr lang="en-US" dirty="0" smtClean="0">
-                <a:solidFill>
-                  <a:schemeClr val="accent1">
-                    <a:lumMod val="50000"/>
-                  </a:schemeClr>
-                </a:solidFill>
-                <a:latin typeface="Avenir Book"/>
-              </a:rPr>
-              <a:t>) or stored when working off line.</a:t>
+              <a:t> destination)</a:t>
             </a:r>
             <a:endParaRPr lang="en-US" dirty="0">
               <a:solidFill>
@@ -8574,7 +8596,7 @@
                                           </p:stCondLst>
                                         </p:cTn>
                                         <p:tgtEl>
-                                          <p:spTgt spid="8"/>
+                                          <p:spTgt spid="9"/>
                                         </p:tgtEl>
                                         <p:attrNameLst>
                                           <p:attrName>style.visibility</p:attrName>
@@ -8619,7 +8641,7 @@
                                           </p:stCondLst>
                                         </p:cTn>
                                         <p:tgtEl>
-                                          <p:spTgt spid="9"/>
+                                          <p:spTgt spid="8"/>
                                         </p:tgtEl>
                                         <p:attrNameLst>
                                           <p:attrName>style.visibility</p:attrName>
@@ -8703,7 +8725,6 @@
               <a:rPr lang="en-US" dirty="0"/>
               <a:t>2. I/O destinations</a:t>
             </a:r>
-            <a:endParaRPr lang="en-US" dirty="0"/>
           </a:p>
         </p:txBody>
       </p:sp>
@@ -9047,18 +9068,7 @@
                 </a:solidFill>
                 <a:latin typeface="Avenir Book"/>
               </a:rPr>
-              <a:t>” that script will be loaded, and all fields above will be </a:t>
-            </a:r>
-            <a:r>
-              <a:rPr lang="en-US" dirty="0" smtClean="0">
-                <a:solidFill>
-                  <a:schemeClr val="accent1">
-                    <a:lumMod val="50000"/>
-                  </a:schemeClr>
-                </a:solidFill>
-                <a:latin typeface="Avenir Book"/>
-              </a:rPr>
-              <a:t>set according to the job script</a:t>
+              <a:t>” that script will be loaded, and all fields above will be set according to the job script</a:t>
             </a:r>
             <a:endParaRPr lang="en-US" dirty="0">
               <a:solidFill>
@@ -9198,7 +9208,6 @@
               <a:rPr lang="en-US" dirty="0"/>
               <a:t>2. I/O destinations</a:t>
             </a:r>
-            <a:endParaRPr lang="en-US" dirty="0"/>
           </a:p>
         </p:txBody>
       </p:sp>
@@ -9595,40 +9604,7 @@
                 </a:solidFill>
                 <a:latin typeface="Avenir Book"/>
               </a:rPr>
-              <a:t> destination </a:t>
-            </a:r>
-            <a:r>
-              <a:rPr lang="en-US" dirty="0" smtClean="0">
-                <a:solidFill>
-                  <a:schemeClr val="accent1">
-                    <a:lumMod val="50000"/>
-                  </a:schemeClr>
-                </a:solidFill>
-                <a:latin typeface="Avenir Book"/>
-              </a:rPr>
-              <a:t>folder to your preference, </a:t>
-            </a:r>
-            <a:r>
-              <a:rPr lang="en-US" dirty="0" smtClean="0">
-                <a:solidFill>
-                  <a:schemeClr val="accent1">
-                    <a:lumMod val="50000"/>
-                  </a:schemeClr>
-                </a:solidFill>
-                <a:latin typeface="Avenir Book"/>
-              </a:rPr>
-              <a:t>the job name will be </a:t>
-            </a:r>
-            <a:r>
-              <a:rPr lang="en-US" dirty="0" smtClean="0">
-                <a:solidFill>
-                  <a:schemeClr val="accent1">
-                    <a:lumMod val="50000"/>
-                  </a:schemeClr>
-                </a:solidFill>
-                <a:latin typeface="Avenir Book"/>
-              </a:rPr>
-              <a:t>added.</a:t>
+              <a:t> destination folder to your preference, the job name will be added.</a:t>
             </a:r>
             <a:endParaRPr lang="en-US" dirty="0">
               <a:solidFill>
@@ -9698,33 +9674,15 @@
                                   </p:childTnLst>
                                 </p:cTn>
                               </p:par>
-                            </p:childTnLst>
-                          </p:cTn>
-                        </p:par>
-                      </p:childTnLst>
-                    </p:cTn>
-                  </p:par>
-                  <p:par>
-                    <p:cTn id="7" fill="hold">
-                      <p:stCondLst>
-                        <p:cond delay="indefinite"/>
-                      </p:stCondLst>
-                      <p:childTnLst>
-                        <p:par>
-                          <p:cTn id="8" fill="hold">
-                            <p:stCondLst>
-                              <p:cond delay="0"/>
-                            </p:stCondLst>
-                            <p:childTnLst>
                               <p:par>
-                                <p:cTn id="9" presetID="1" presetClass="entr" presetSubtype="0" fill="hold" grpId="0" nodeType="clickEffect">
+                                <p:cTn id="7" presetID="1" presetClass="entr" presetSubtype="0" fill="hold" grpId="0" nodeType="withEffect">
                                   <p:stCondLst>
                                     <p:cond delay="0"/>
                                   </p:stCondLst>
                                   <p:childTnLst>
                                     <p:set>
                                       <p:cBhvr>
-                                        <p:cTn id="10" dur="1" fill="hold">
+                                        <p:cTn id="8" dur="1" fill="hold">
                                           <p:stCondLst>
                                             <p:cond delay="0"/>
                                           </p:stCondLst>
@@ -9837,7 +9795,6 @@
               <a:rPr lang="en-US" dirty="0"/>
               <a:t>2. I/O destinations</a:t>
             </a:r>
-            <a:endParaRPr lang="en-US" dirty="0"/>
           </a:p>
         </p:txBody>
       </p:sp>
@@ -10155,18 +10112,7 @@
                 </a:solidFill>
                 <a:latin typeface="Avenir Book"/>
               </a:rPr>
-              <a:t>destination folder </a:t>
-            </a:r>
-            <a:r>
-              <a:rPr lang="en-US" dirty="0" smtClean="0">
-                <a:solidFill>
-                  <a:schemeClr val="accent1">
-                    <a:lumMod val="50000"/>
-                  </a:schemeClr>
-                </a:solidFill>
-                <a:latin typeface="Avenir Book"/>
-              </a:rPr>
-              <a:t>here</a:t>
+              <a:t>destination folder here</a:t>
             </a:r>
             <a:endParaRPr lang="en-US" dirty="0">
               <a:solidFill>
@@ -10399,367 +10345,143 @@
           <a:chExt cx="0" cy="0"/>
         </a:xfrm>
       </p:grpSpPr>
-      <p:grpSp>
-        <p:nvGrpSpPr>
-          <p:cNvPr id="19" name="Group 18"/>
-          <p:cNvGrpSpPr/>
+      <p:pic>
+        <p:nvPicPr>
+          <p:cNvPr id="17" name="Picture 16"/>
+          <p:cNvPicPr>
+            <a:picLocks noChangeAspect="1"/>
+          </p:cNvPicPr>
           <p:nvPr/>
-        </p:nvGrpSpPr>
-        <p:grpSpPr>
+        </p:nvPicPr>
+        <p:blipFill>
+          <a:blip r:embed="rId2"/>
+          <a:stretch>
+            <a:fillRect/>
+          </a:stretch>
+        </p:blipFill>
+        <p:spPr>
           <a:xfrm>
             <a:off x="4025899" y="1404290"/>
-            <a:ext cx="4660900" cy="5030408"/>
-            <a:chOff x="4025899" y="1404290"/>
-            <a:chExt cx="4660900" cy="5030408"/>
-          </a:xfrm>
-        </p:grpSpPr>
-        <p:pic>
-          <p:nvPicPr>
-            <p:cNvPr id="17" name="Picture 16"/>
-            <p:cNvPicPr>
-              <a:picLocks noChangeAspect="1"/>
-            </p:cNvPicPr>
-            <p:nvPr/>
-          </p:nvPicPr>
-          <p:blipFill>
-            <a:blip r:embed="rId2"/>
-            <a:stretch>
-              <a:fillRect/>
-            </a:stretch>
-          </p:blipFill>
-          <p:spPr>
-            <a:xfrm>
-              <a:off x="4025899" y="1404290"/>
-              <a:ext cx="4660900" cy="4292600"/>
-            </a:xfrm>
-            <a:prstGeom prst="rect">
-              <a:avLst/>
-            </a:prstGeom>
-          </p:spPr>
-        </p:pic>
-        <p:pic>
-          <p:nvPicPr>
-            <p:cNvPr id="18" name="Picture 17"/>
-            <p:cNvPicPr>
-              <a:picLocks noChangeAspect="1"/>
-            </p:cNvPicPr>
-            <p:nvPr/>
-          </p:nvPicPr>
-          <p:blipFill>
-            <a:blip r:embed="rId3"/>
-            <a:stretch>
-              <a:fillRect/>
-            </a:stretch>
-          </p:blipFill>
-          <p:spPr>
-            <a:xfrm>
-              <a:off x="6178880" y="5075798"/>
-              <a:ext cx="2082800" cy="1358900"/>
-            </a:xfrm>
-            <a:prstGeom prst="rect">
-              <a:avLst/>
-            </a:prstGeom>
-          </p:spPr>
-        </p:pic>
-      </p:grpSp>
-      <p:sp>
-        <p:nvSpPr>
-          <p:cNvPr id="2" name="Title 1"/>
-          <p:cNvSpPr>
-            <a:spLocks noGrp="1"/>
-          </p:cNvSpPr>
-          <p:nvPr>
-            <p:ph type="title"/>
-          </p:nvPr>
-        </p:nvSpPr>
-        <p:spPr/>
-        <p:txBody>
-          <a:bodyPr/>
-          <a:lstStyle/>
-          <a:p>
-            <a:r>
-              <a:rPr lang="en-US" dirty="0" smtClean="0"/>
-              <a:t>3. Adding commands and modules</a:t>
-            </a:r>
-            <a:endParaRPr lang="en-US" dirty="0"/>
-          </a:p>
-        </p:txBody>
-      </p:sp>
-      <p:sp>
-        <p:nvSpPr>
-          <p:cNvPr id="3" name="Date Placeholder 2"/>
-          <p:cNvSpPr>
-            <a:spLocks noGrp="1"/>
-          </p:cNvSpPr>
-          <p:nvPr>
-            <p:ph type="dt" sz="half" idx="10"/>
-          </p:nvPr>
-        </p:nvSpPr>
-        <p:spPr/>
-        <p:txBody>
-          <a:bodyPr/>
-          <a:lstStyle/>
-          <a:p>
-            <a:fld id="{A6EF29A7-BBF5-A84F-8C8E-08BE54B3CC62}" type="datetime6">
-              <a:rPr lang="en-US" smtClean="0"/>
-              <a:t>May 15</a:t>
-            </a:fld>
-            <a:endParaRPr lang="en-US"/>
-          </a:p>
-        </p:txBody>
-      </p:sp>
-      <p:sp>
-        <p:nvSpPr>
-          <p:cNvPr id="4" name="Footer Placeholder 3"/>
-          <p:cNvSpPr>
-            <a:spLocks noGrp="1"/>
-          </p:cNvSpPr>
-          <p:nvPr>
-            <p:ph type="ftr" sz="quarter" idx="11"/>
-          </p:nvPr>
-        </p:nvSpPr>
-        <p:spPr/>
-        <p:txBody>
-          <a:bodyPr/>
-          <a:lstStyle/>
-          <a:p>
-            <a:r>
-              <a:rPr lang="en-US" smtClean="0"/>
-              <a:t>Launcher-presentation</a:t>
-            </a:r>
-            <a:endParaRPr lang="en-US"/>
-          </a:p>
-        </p:txBody>
-      </p:sp>
-      <p:sp>
-        <p:nvSpPr>
-          <p:cNvPr id="5" name="Slide Number Placeholder 4"/>
-          <p:cNvSpPr>
-            <a:spLocks noGrp="1"/>
-          </p:cNvSpPr>
-          <p:nvPr>
-            <p:ph type="sldNum" sz="quarter" idx="12"/>
-          </p:nvPr>
-        </p:nvSpPr>
-        <p:spPr/>
-        <p:txBody>
-          <a:bodyPr/>
-          <a:lstStyle/>
-          <a:p>
-            <a:fld id="{1F70BE4E-F0F4-974B-B603-7347B10BD271}" type="slidenum">
-              <a:rPr lang="en-US" smtClean="0"/>
-              <a:t>18</a:t>
-            </a:fld>
-            <a:endParaRPr lang="en-US"/>
-          </a:p>
-        </p:txBody>
-      </p:sp>
-      <p:sp>
-        <p:nvSpPr>
-          <p:cNvPr id="7" name="Content Placeholder 2"/>
-          <p:cNvSpPr txBox="1">
-            <a:spLocks/>
-          </p:cNvSpPr>
-          <p:nvPr/>
-        </p:nvSpPr>
-        <p:spPr>
-          <a:xfrm>
-            <a:off x="457200" y="1567157"/>
-            <a:ext cx="8229599" cy="1567157"/>
+            <a:ext cx="4660900" cy="4292600"/>
           </a:xfrm>
           <a:prstGeom prst="rect">
             <a:avLst/>
           </a:prstGeom>
         </p:spPr>
-        <p:txBody>
-          <a:bodyPr vert="horz" lIns="91440" tIns="45720" rIns="91440" bIns="45720" rtlCol="0" anchor="t" anchorCtr="0">
-            <a:normAutofit/>
-          </a:bodyPr>
-          <a:lstStyle>
-            <a:lvl1pPr marL="268288" indent="-268288" algn="l" defTabSz="457200" rtl="0" eaLnBrk="1" latinLnBrk="0" hangingPunct="1">
-              <a:spcBef>
-                <a:spcPct val="20000"/>
-              </a:spcBef>
-              <a:buFont typeface="Arial"/>
-              <a:buChar char="•"/>
-              <a:defRPr sz="3200" kern="1200">
-                <a:solidFill>
-                  <a:srgbClr val="043356"/>
-                </a:solidFill>
-                <a:latin typeface="Verdana"/>
-                <a:ea typeface="+mn-ea"/>
-                <a:cs typeface="Verdana"/>
-              </a:defRPr>
-            </a:lvl1pPr>
-            <a:lvl2pPr marL="536575" indent="-268288" algn="l" defTabSz="457200" rtl="0" eaLnBrk="1" latinLnBrk="0" hangingPunct="1">
-              <a:spcBef>
-                <a:spcPct val="20000"/>
-              </a:spcBef>
-              <a:buFont typeface="Arial"/>
-              <a:buChar char="•"/>
-              <a:defRPr sz="2800" kern="1200">
-                <a:solidFill>
-                  <a:srgbClr val="043356"/>
-                </a:solidFill>
-                <a:latin typeface="Verdana"/>
-                <a:ea typeface="+mn-ea"/>
-                <a:cs typeface="Verdana"/>
-              </a:defRPr>
-            </a:lvl2pPr>
-            <a:lvl3pPr marL="719138" indent="-182563" algn="l" defTabSz="457200" rtl="0" eaLnBrk="1" latinLnBrk="0" hangingPunct="1">
-              <a:spcBef>
-                <a:spcPct val="20000"/>
-              </a:spcBef>
-              <a:buFont typeface="Arial"/>
-              <a:buChar char="•"/>
-              <a:defRPr sz="2400" kern="1200">
-                <a:solidFill>
-                  <a:srgbClr val="043356"/>
-                </a:solidFill>
-                <a:latin typeface="Verdana"/>
-                <a:ea typeface="+mn-ea"/>
-                <a:cs typeface="Verdana"/>
-              </a:defRPr>
-            </a:lvl3pPr>
-            <a:lvl4pPr marL="903288" indent="-184150" algn="l" defTabSz="457200" rtl="0" eaLnBrk="1" latinLnBrk="0" hangingPunct="1">
-              <a:spcBef>
-                <a:spcPct val="20000"/>
-              </a:spcBef>
-              <a:buFont typeface="Arial"/>
-              <a:buChar char="•"/>
-              <a:defRPr sz="2000" kern="1200">
-                <a:solidFill>
-                  <a:srgbClr val="043356"/>
-                </a:solidFill>
-                <a:latin typeface="Verdana"/>
-                <a:ea typeface="+mn-ea"/>
-                <a:cs typeface="Verdana"/>
-              </a:defRPr>
-            </a:lvl4pPr>
-            <a:lvl5pPr marL="1073150" indent="-169863" algn="l" defTabSz="457200" rtl="0" eaLnBrk="1" latinLnBrk="0" hangingPunct="1">
-              <a:spcBef>
-                <a:spcPct val="20000"/>
-              </a:spcBef>
-              <a:buFont typeface="Arial"/>
-              <a:buChar char="•"/>
-              <a:defRPr sz="2000" kern="1200">
-                <a:solidFill>
-                  <a:srgbClr val="043356"/>
-                </a:solidFill>
-                <a:latin typeface="Verdana"/>
-                <a:ea typeface="+mn-ea"/>
-                <a:cs typeface="Verdana"/>
-              </a:defRPr>
-            </a:lvl5pPr>
-            <a:lvl6pPr marL="2514600" indent="-228600" algn="l" defTabSz="457200" rtl="0" eaLnBrk="1" latinLnBrk="0" hangingPunct="1">
-              <a:spcBef>
-                <a:spcPct val="20000"/>
-              </a:spcBef>
-              <a:buFont typeface="Arial"/>
-              <a:buChar char="•"/>
-              <a:defRPr sz="2000" kern="1200">
-                <a:solidFill>
-                  <a:schemeClr val="tx1"/>
-                </a:solidFill>
-                <a:latin typeface="+mn-lt"/>
-                <a:ea typeface="+mn-ea"/>
-                <a:cs typeface="+mn-cs"/>
-              </a:defRPr>
-            </a:lvl6pPr>
-            <a:lvl7pPr marL="2971800" indent="-228600" algn="l" defTabSz="457200" rtl="0" eaLnBrk="1" latinLnBrk="0" hangingPunct="1">
-              <a:spcBef>
-                <a:spcPct val="20000"/>
-              </a:spcBef>
-              <a:buFont typeface="Arial"/>
-              <a:buChar char="•"/>
-              <a:defRPr sz="2000" kern="1200">
-                <a:solidFill>
-                  <a:schemeClr val="tx1"/>
-                </a:solidFill>
-                <a:latin typeface="+mn-lt"/>
-                <a:ea typeface="+mn-ea"/>
-                <a:cs typeface="+mn-cs"/>
-              </a:defRPr>
-            </a:lvl7pPr>
-            <a:lvl8pPr marL="3429000" indent="-228600" algn="l" defTabSz="457200" rtl="0" eaLnBrk="1" latinLnBrk="0" hangingPunct="1">
-              <a:spcBef>
-                <a:spcPct val="20000"/>
-              </a:spcBef>
-              <a:buFont typeface="Arial"/>
-              <a:buChar char="•"/>
-              <a:defRPr sz="2000" kern="1200">
-                <a:solidFill>
-                  <a:schemeClr val="tx1"/>
-                </a:solidFill>
-                <a:latin typeface="+mn-lt"/>
-                <a:ea typeface="+mn-ea"/>
-                <a:cs typeface="+mn-cs"/>
-              </a:defRPr>
-            </a:lvl8pPr>
-            <a:lvl9pPr marL="3886200" indent="-228600" algn="l" defTabSz="457200" rtl="0" eaLnBrk="1" latinLnBrk="0" hangingPunct="1">
-              <a:spcBef>
-                <a:spcPct val="20000"/>
-              </a:spcBef>
-              <a:buFont typeface="Arial"/>
-              <a:buChar char="•"/>
-              <a:defRPr sz="2000" kern="1200">
-                <a:solidFill>
-                  <a:schemeClr val="tx1"/>
-                </a:solidFill>
-                <a:latin typeface="+mn-lt"/>
-                <a:ea typeface="+mn-ea"/>
-                <a:cs typeface="+mn-cs"/>
-              </a:defRPr>
-            </a:lvl9pPr>
-          </a:lstStyle>
-          <a:p>
-            <a:pPr marL="0" indent="0">
-              <a:buNone/>
-            </a:pPr>
-            <a:r>
-              <a:rPr lang="en-US" dirty="0" smtClean="0">
-                <a:latin typeface="Avenir Book"/>
-                <a:cs typeface="Avenir Book"/>
-              </a:rPr>
-              <a:t>select the </a:t>
-            </a:r>
-            <a:br>
-              <a:rPr lang="en-US" dirty="0" smtClean="0">
-                <a:latin typeface="Avenir Book"/>
-                <a:cs typeface="Avenir Book"/>
-              </a:rPr>
-            </a:br>
-            <a:r>
-              <a:rPr lang="en-US" i="1" dirty="0" smtClean="0">
-                <a:latin typeface="Avenir Book"/>
-                <a:cs typeface="Avenir Book"/>
-              </a:rPr>
-              <a:t>Job script</a:t>
-            </a:r>
-            <a:r>
-              <a:rPr lang="en-US" dirty="0" smtClean="0">
-                <a:latin typeface="Avenir Book"/>
-                <a:cs typeface="Avenir Book"/>
-              </a:rPr>
-              <a:t> </a:t>
-            </a:r>
-            <a:br>
-              <a:rPr lang="en-US" dirty="0" smtClean="0">
-                <a:latin typeface="Avenir Book"/>
-                <a:cs typeface="Avenir Book"/>
-              </a:rPr>
-            </a:br>
-            <a:r>
-              <a:rPr lang="en-US" dirty="0" smtClean="0">
-                <a:latin typeface="Avenir Book"/>
-                <a:cs typeface="Avenir Book"/>
-              </a:rPr>
-              <a:t>page</a:t>
-            </a:r>
-            <a:endParaRPr lang="en-US" dirty="0" smtClean="0">
-              <a:latin typeface="Avenir Book"/>
-              <a:cs typeface="Avenir Book"/>
-            </a:endParaRPr>
+      </p:pic>
+      <p:pic>
+        <p:nvPicPr>
+          <p:cNvPr id="18" name="Picture 17"/>
+          <p:cNvPicPr>
+            <a:picLocks noChangeAspect="1"/>
+          </p:cNvPicPr>
+          <p:nvPr/>
+        </p:nvPicPr>
+        <p:blipFill>
+          <a:blip r:embed="rId3"/>
+          <a:stretch>
+            <a:fillRect/>
+          </a:stretch>
+        </p:blipFill>
+        <p:spPr>
+          <a:xfrm>
+            <a:off x="6178880" y="5075798"/>
+            <a:ext cx="2082800" cy="1358900"/>
+          </a:xfrm>
+          <a:prstGeom prst="rect">
+            <a:avLst/>
+          </a:prstGeom>
+        </p:spPr>
+      </p:pic>
+      <p:sp>
+        <p:nvSpPr>
+          <p:cNvPr id="2" name="Title 1"/>
+          <p:cNvSpPr>
+            <a:spLocks noGrp="1"/>
+          </p:cNvSpPr>
+          <p:nvPr>
+            <p:ph type="title"/>
+          </p:nvPr>
+        </p:nvSpPr>
+        <p:spPr/>
+        <p:txBody>
+          <a:bodyPr/>
+          <a:lstStyle/>
+          <a:p>
+            <a:r>
+              <a:rPr lang="en-US" dirty="0" smtClean="0"/>
+              <a:t>3. Adding commands and modules</a:t>
+            </a:r>
+            <a:endParaRPr lang="en-US" dirty="0"/>
+          </a:p>
+        </p:txBody>
+      </p:sp>
+      <p:sp>
+        <p:nvSpPr>
+          <p:cNvPr id="3" name="Date Placeholder 2"/>
+          <p:cNvSpPr>
+            <a:spLocks noGrp="1"/>
+          </p:cNvSpPr>
+          <p:nvPr>
+            <p:ph type="dt" sz="half" idx="10"/>
+          </p:nvPr>
+        </p:nvSpPr>
+        <p:spPr/>
+        <p:txBody>
+          <a:bodyPr/>
+          <a:lstStyle/>
+          <a:p>
+            <a:fld id="{A6EF29A7-BBF5-A84F-8C8E-08BE54B3CC62}" type="datetime6">
+              <a:rPr lang="en-US" smtClean="0"/>
+              <a:t>May 15</a:t>
+            </a:fld>
+            <a:endParaRPr lang="en-US"/>
+          </a:p>
+        </p:txBody>
+      </p:sp>
+      <p:sp>
+        <p:nvSpPr>
+          <p:cNvPr id="4" name="Footer Placeholder 3"/>
+          <p:cNvSpPr>
+            <a:spLocks noGrp="1"/>
+          </p:cNvSpPr>
+          <p:nvPr>
+            <p:ph type="ftr" sz="quarter" idx="11"/>
+          </p:nvPr>
+        </p:nvSpPr>
+        <p:spPr/>
+        <p:txBody>
+          <a:bodyPr/>
+          <a:lstStyle/>
+          <a:p>
+            <a:r>
+              <a:rPr lang="en-US" smtClean="0"/>
+              <a:t>Launcher-presentation</a:t>
+            </a:r>
+            <a:endParaRPr lang="en-US"/>
+          </a:p>
+        </p:txBody>
+      </p:sp>
+      <p:sp>
+        <p:nvSpPr>
+          <p:cNvPr id="5" name="Slide Number Placeholder 4"/>
+          <p:cNvSpPr>
+            <a:spLocks noGrp="1"/>
+          </p:cNvSpPr>
+          <p:nvPr>
+            <p:ph type="sldNum" sz="quarter" idx="12"/>
+          </p:nvPr>
+        </p:nvSpPr>
+        <p:spPr/>
+        <p:txBody>
+          <a:bodyPr/>
+          <a:lstStyle/>
+          <a:p>
+            <a:fld id="{1F70BE4E-F0F4-974B-B603-7347B10BD271}" type="slidenum">
+              <a:rPr lang="en-US" smtClean="0"/>
+              <a:t>18</a:t>
+            </a:fld>
+            <a:endParaRPr lang="en-US"/>
           </a:p>
         </p:txBody>
       </p:sp>
@@ -10891,6 +10613,121 @@
                 </a:schemeClr>
               </a:solidFill>
               <a:latin typeface="Avenir Book"/>
+            </a:endParaRPr>
+          </a:p>
+        </p:txBody>
+      </p:sp>
+      <p:sp>
+        <p:nvSpPr>
+          <p:cNvPr id="12" name="Rounded Rectangular Callout 11"/>
+          <p:cNvSpPr/>
+          <p:nvPr/>
+        </p:nvSpPr>
+        <p:spPr>
+          <a:xfrm>
+            <a:off x="320846" y="1725536"/>
+            <a:ext cx="3327295" cy="1141919"/>
+          </a:xfrm>
+          <a:prstGeom prst="wedgeRoundRectCallout">
+            <a:avLst>
+              <a:gd name="adj1" fmla="val 117748"/>
+              <a:gd name="adj2" fmla="val -33550"/>
+              <a:gd name="adj3" fmla="val 16667"/>
+            </a:avLst>
+          </a:prstGeom>
+          <a:noFill/>
+          <a:ln w="25400">
+            <a:solidFill>
+              <a:srgbClr val="6C0424"/>
+            </a:solidFill>
+          </a:ln>
+          <a:effectLst/>
+        </p:spPr>
+        <p:style>
+          <a:lnRef idx="1">
+            <a:schemeClr val="accent1"/>
+          </a:lnRef>
+          <a:fillRef idx="3">
+            <a:schemeClr val="accent1"/>
+          </a:fillRef>
+          <a:effectRef idx="2">
+            <a:schemeClr val="accent1"/>
+          </a:effectRef>
+          <a:fontRef idx="minor">
+            <a:schemeClr val="lt1"/>
+          </a:fontRef>
+        </p:style>
+        <p:txBody>
+          <a:bodyPr rtlCol="0" anchor="ctr"/>
+          <a:lstStyle/>
+          <a:p>
+            <a:pPr algn="ctr"/>
+            <a:r>
+              <a:rPr lang="en-US" sz="3200" dirty="0">
+                <a:solidFill>
+                  <a:srgbClr val="043356"/>
+                </a:solidFill>
+                <a:latin typeface="Avenir Book"/>
+                <a:cs typeface="Avenir Book"/>
+              </a:rPr>
+              <a:t>select </a:t>
+            </a:r>
+            <a:r>
+              <a:rPr lang="en-US" sz="3200" dirty="0" smtClean="0">
+                <a:solidFill>
+                  <a:srgbClr val="043356"/>
+                </a:solidFill>
+                <a:latin typeface="Avenir Book"/>
+                <a:cs typeface="Avenir Book"/>
+              </a:rPr>
+              <a:t>the </a:t>
+            </a:r>
+            <a:r>
+              <a:rPr lang="en-US" sz="3200" i="1" dirty="0" smtClean="0">
+                <a:solidFill>
+                  <a:srgbClr val="043356"/>
+                </a:solidFill>
+                <a:latin typeface="Avenir Book"/>
+                <a:cs typeface="Avenir Book"/>
+              </a:rPr>
+              <a:t>Job </a:t>
+            </a:r>
+            <a:r>
+              <a:rPr lang="en-US" sz="3200" i="1" dirty="0">
+                <a:solidFill>
+                  <a:srgbClr val="043356"/>
+                </a:solidFill>
+                <a:latin typeface="Avenir Book"/>
+                <a:cs typeface="Avenir Book"/>
+              </a:rPr>
+              <a:t>script</a:t>
+            </a:r>
+            <a:r>
+              <a:rPr lang="en-US" sz="3200" dirty="0">
+                <a:solidFill>
+                  <a:srgbClr val="043356"/>
+                </a:solidFill>
+                <a:latin typeface="Avenir Book"/>
+                <a:cs typeface="Avenir Book"/>
+              </a:rPr>
+              <a:t> </a:t>
+            </a:r>
+            <a:r>
+              <a:rPr lang="en-US" sz="3200" dirty="0" smtClean="0">
+                <a:solidFill>
+                  <a:srgbClr val="043356"/>
+                </a:solidFill>
+                <a:latin typeface="Avenir Book"/>
+                <a:cs typeface="Avenir Book"/>
+              </a:rPr>
+              <a:t>page</a:t>
+            </a:r>
+            <a:endParaRPr lang="en-US" sz="3200" dirty="0">
+              <a:solidFill>
+                <a:srgbClr val="043356"/>
+              </a:solidFill>
+              <a:latin typeface="Avenir Book"/>
+              <a:cs typeface="Avenir Book"/>
             </a:endParaRPr>
           </a:p>
         </p:txBody>
@@ -10939,7 +10776,7 @@
                                           </p:stCondLst>
                                         </p:cTn>
                                         <p:tgtEl>
-                                          <p:spTgt spid="9"/>
+                                          <p:spTgt spid="12"/>
                                         </p:tgtEl>
                                         <p:attrNameLst>
                                           <p:attrName>style.visibility</p:attrName>
@@ -10979,6 +10816,78 @@
                                     <p:set>
                                       <p:cBhvr>
                                         <p:cTn id="10" dur="1" fill="hold">
+                                          <p:stCondLst>
+                                            <p:cond delay="0"/>
+                                          </p:stCondLst>
+                                        </p:cTn>
+                                        <p:tgtEl>
+                                          <p:spTgt spid="9"/>
+                                        </p:tgtEl>
+                                        <p:attrNameLst>
+                                          <p:attrName>style.visibility</p:attrName>
+                                        </p:attrNameLst>
+                                      </p:cBhvr>
+                                      <p:to>
+                                        <p:strVal val="visible"/>
+                                      </p:to>
+                                    </p:set>
+                                  </p:childTnLst>
+                                </p:cTn>
+                              </p:par>
+                              <p:par>
+                                <p:cTn id="11" presetID="1" presetClass="entr" presetSubtype="0" fill="hold" nodeType="withEffect">
+                                  <p:stCondLst>
+                                    <p:cond delay="0"/>
+                                  </p:stCondLst>
+                                  <p:childTnLst>
+                                    <p:set>
+                                      <p:cBhvr>
+                                        <p:cTn id="12" dur="1" fill="hold">
+                                          <p:stCondLst>
+                                            <p:cond delay="0"/>
+                                          </p:stCondLst>
+                                        </p:cTn>
+                                        <p:tgtEl>
+                                          <p:spTgt spid="18"/>
+                                        </p:tgtEl>
+                                        <p:attrNameLst>
+                                          <p:attrName>style.visibility</p:attrName>
+                                        </p:attrNameLst>
+                                      </p:cBhvr>
+                                      <p:to>
+                                        <p:strVal val="visible"/>
+                                      </p:to>
+                                    </p:set>
+                                  </p:childTnLst>
+                                </p:cTn>
+                              </p:par>
+                            </p:childTnLst>
+                          </p:cTn>
+                        </p:par>
+                      </p:childTnLst>
+                    </p:cTn>
+                  </p:par>
+                  <p:par>
+                    <p:cTn id="13" fill="hold">
+                      <p:stCondLst>
+                        <p:cond delay="indefinite"/>
+                      </p:stCondLst>
+                      <p:childTnLst>
+                        <p:par>
+                          <p:cTn id="14" fill="hold">
+                            <p:stCondLst>
+                              <p:cond delay="0"/>
+                            </p:stCondLst>
+                            <p:childTnLst>
+                              <p:par>
+                                <p:cTn id="15" presetID="1" presetClass="entr" presetSubtype="0" fill="hold" grpId="0" nodeType="clickEffect">
+                                  <p:stCondLst>
+                                    <p:cond delay="0"/>
+                                  </p:stCondLst>
+                                  <p:childTnLst>
+                                    <p:set>
+                                      <p:cBhvr>
+                                        <p:cTn id="16" dur="1" fill="hold">
                                           <p:stCondLst>
                                             <p:cond delay="0"/>
                                           </p:stCondLst>
@@ -11027,6 +10936,7 @@
     <p:bldLst>
       <p:bldP spid="9" grpId="0" animBg="1"/>
       <p:bldP spid="13" grpId="0" animBg="1"/>
+      <p:bldP spid="12" grpId="0" animBg="1"/>
     </p:bldLst>
   </p:timing>
 </p:sld>
@@ -11559,7 +11469,7 @@
                 </a:solidFill>
                 <a:latin typeface="Avenir Book"/>
               </a:rPr>
-              <a:t>create a job </a:t>
+              <a:t>save the job </a:t>
             </a:r>
             <a:r>
               <a:rPr lang="en-US" dirty="0" smtClean="0">
@@ -11570,10 +11480,10 @@
                 </a:solidFill>
                 <a:latin typeface="Avenir Book"/>
               </a:rPr>
-              <a:t>script file </a:t>
-            </a:r>
-            <a:r>
-              <a:rPr lang="en-US" dirty="0">
+              <a:t>script </a:t>
+            </a:r>
+            <a:r>
+              <a:rPr lang="en-US" dirty="0" smtClean="0">
                 <a:solidFill>
                   <a:schemeClr val="accent1">
                     <a:lumMod val="50000"/>
@@ -11581,18 +11491,7 @@
                 </a:solidFill>
                 <a:latin typeface="Avenir Book"/>
               </a:rPr>
-              <a:t>and save </a:t>
-            </a:r>
-            <a:r>
-              <a:rPr lang="en-US" dirty="0" smtClean="0">
-                <a:solidFill>
-                  <a:schemeClr val="accent1">
-                    <a:lumMod val="50000"/>
-                  </a:schemeClr>
-                </a:solidFill>
-                <a:latin typeface="Avenir Book"/>
-              </a:rPr>
-              <a:t>it locally</a:t>
+              <a:t>in a local file</a:t>
             </a:r>
             <a:endParaRPr lang="en-US" dirty="0">
               <a:solidFill>
@@ -11659,7 +11558,18 @@
                 </a:solidFill>
                 <a:latin typeface="Avenir Book"/>
               </a:rPr>
-              <a:t>save and submit the job script</a:t>
+              <a:t>(save and) </a:t>
+            </a:r>
+            <a:r>
+              <a:rPr lang="en-US" dirty="0" smtClean="0">
+                <a:solidFill>
+                  <a:schemeClr val="accent1">
+                    <a:lumMod val="50000"/>
+                  </a:schemeClr>
+                </a:solidFill>
+                <a:latin typeface="Avenir Book"/>
+              </a:rPr>
+              <a:t>submit the job script</a:t>
             </a:r>
             <a:endParaRPr lang="en-US" dirty="0">
               <a:solidFill>
@@ -13997,6 +13907,378 @@
           <a:chExt cx="0" cy="0"/>
         </a:xfrm>
       </p:grpSpPr>
+      <p:sp>
+        <p:nvSpPr>
+          <p:cNvPr id="2" name="Title 1"/>
+          <p:cNvSpPr>
+            <a:spLocks noGrp="1"/>
+          </p:cNvSpPr>
+          <p:nvPr>
+            <p:ph type="title"/>
+          </p:nvPr>
+        </p:nvSpPr>
+        <p:spPr/>
+        <p:txBody>
+          <a:bodyPr/>
+          <a:lstStyle/>
+          <a:p>
+            <a:endParaRPr lang="en-US" dirty="0"/>
+          </a:p>
+        </p:txBody>
+      </p:sp>
+      <p:sp>
+        <p:nvSpPr>
+          <p:cNvPr id="3" name="Content Placeholder 2"/>
+          <p:cNvSpPr>
+            <a:spLocks noGrp="1"/>
+          </p:cNvSpPr>
+          <p:nvPr>
+            <p:ph idx="1"/>
+          </p:nvPr>
+        </p:nvSpPr>
+        <p:spPr/>
+        <p:txBody>
+          <a:bodyPr>
+            <a:normAutofit lnSpcReduction="10000"/>
+          </a:bodyPr>
+          <a:lstStyle/>
+          <a:p>
+            <a:pPr marL="0" indent="0">
+              <a:buNone/>
+            </a:pPr>
+            <a:r>
+              <a:rPr lang="en-US" dirty="0" smtClean="0"/>
+              <a:t>help to improve Launcher</a:t>
+            </a:r>
+          </a:p>
+          <a:p>
+            <a:r>
+              <a:rPr lang="en-US" sz="2800" dirty="0" smtClean="0"/>
+              <a:t>are you missing a feature?</a:t>
+            </a:r>
+          </a:p>
+          <a:p>
+            <a:r>
+              <a:rPr lang="en-US" sz="2800" dirty="0" smtClean="0"/>
+              <a:t>is something impractical?</a:t>
+            </a:r>
+          </a:p>
+          <a:p>
+            <a:pPr marL="0" indent="0">
+              <a:buNone/>
+            </a:pPr>
+            <a:r>
+              <a:rPr lang="en-US" dirty="0" smtClean="0"/>
+              <a:t>suggestions for improvements are welcome,</a:t>
+            </a:r>
+            <a:r>
+              <a:rPr lang="en-US" dirty="0"/>
+              <a:t> </a:t>
+            </a:r>
+            <a:r>
+              <a:rPr lang="en-US" dirty="0" smtClean="0"/>
+              <a:t>and will be rewarded:</a:t>
+            </a:r>
+          </a:p>
+          <a:p>
+            <a:r>
+              <a:rPr lang="en-US" sz="2800" dirty="0" smtClean="0"/>
+              <a:t>best suggestion every month will get a beer or chocolates</a:t>
+            </a:r>
+          </a:p>
+          <a:p>
+            <a:pPr marL="0" indent="0">
+              <a:buNone/>
+            </a:pPr>
+            <a:r>
+              <a:rPr lang="en-US" dirty="0" smtClean="0"/>
+              <a:t>send suggestions to </a:t>
+            </a:r>
+          </a:p>
+          <a:p>
+            <a:r>
+              <a:rPr lang="en-US" sz="2800" dirty="0" smtClean="0">
+                <a:hlinkClick r:id="rId2"/>
+              </a:rPr>
+              <a:t>engelbert.tijskens@uantwerpen.be</a:t>
+            </a:r>
+            <a:r>
+              <a:rPr lang="en-US" sz="2800" dirty="0" smtClean="0"/>
+              <a:t>  </a:t>
+            </a:r>
+          </a:p>
+        </p:txBody>
+      </p:sp>
+      <p:sp>
+        <p:nvSpPr>
+          <p:cNvPr id="4" name="Date Placeholder 3"/>
+          <p:cNvSpPr>
+            <a:spLocks noGrp="1"/>
+          </p:cNvSpPr>
+          <p:nvPr>
+            <p:ph type="dt" sz="half" idx="10"/>
+          </p:nvPr>
+        </p:nvSpPr>
+        <p:spPr/>
+        <p:txBody>
+          <a:bodyPr/>
+          <a:lstStyle/>
+          <a:p>
+            <a:fld id="{575CC414-8FA8-3A46-A15A-107E8D313399}" type="datetime6">
+              <a:rPr lang="en-US" smtClean="0"/>
+              <a:t>May 15</a:t>
+            </a:fld>
+            <a:endParaRPr lang="en-US"/>
+          </a:p>
+        </p:txBody>
+      </p:sp>
+      <p:sp>
+        <p:nvSpPr>
+          <p:cNvPr id="5" name="Footer Placeholder 4"/>
+          <p:cNvSpPr>
+            <a:spLocks noGrp="1"/>
+          </p:cNvSpPr>
+          <p:nvPr>
+            <p:ph type="ftr" sz="quarter" idx="11"/>
+          </p:nvPr>
+        </p:nvSpPr>
+        <p:spPr/>
+        <p:txBody>
+          <a:bodyPr/>
+          <a:lstStyle/>
+          <a:p>
+            <a:r>
+              <a:rPr lang="en-US" dirty="0" smtClean="0"/>
+              <a:t>Launcher-presentation</a:t>
+            </a:r>
+          </a:p>
+        </p:txBody>
+      </p:sp>
+      <p:sp>
+        <p:nvSpPr>
+          <p:cNvPr id="6" name="Slide Number Placeholder 5"/>
+          <p:cNvSpPr>
+            <a:spLocks noGrp="1"/>
+          </p:cNvSpPr>
+          <p:nvPr>
+            <p:ph type="sldNum" sz="quarter" idx="12"/>
+          </p:nvPr>
+        </p:nvSpPr>
+        <p:spPr/>
+        <p:txBody>
+          <a:bodyPr/>
+          <a:lstStyle/>
+          <a:p>
+            <a:fld id="{1F70BE4E-F0F4-974B-B603-7347B10BD271}" type="slidenum">
+              <a:rPr lang="en-US" smtClean="0"/>
+              <a:t>25</a:t>
+            </a:fld>
+            <a:endParaRPr lang="en-US"/>
+          </a:p>
+        </p:txBody>
+      </p:sp>
+    </p:spTree>
+    <p:extLst>
+      <p:ext uri="{BB962C8B-B14F-4D97-AF65-F5344CB8AC3E}">
+        <p14:creationId xmlns:p14="http://schemas.microsoft.com/office/powerpoint/2010/main" val="390342405"/>
+      </p:ext>
+    </p:extLst>
+  </p:cSld>
+  <p:clrMapOvr>
+    <a:masterClrMapping/>
+  </p:clrMapOvr>
+  <p:timing>
+    <p:tnLst>
+      <p:par>
+        <p:cTn xmlns:p14="http://schemas.microsoft.com/office/powerpoint/2010/main" id="1" dur="indefinite" restart="never" nodeType="tmRoot">
+          <p:childTnLst>
+            <p:seq concurrent="1" nextAc="seek">
+              <p:cTn id="2" dur="indefinite" nodeType="mainSeq">
+                <p:childTnLst>
+                  <p:par>
+                    <p:cTn id="3" fill="hold">
+                      <p:stCondLst>
+                        <p:cond delay="indefinite"/>
+                      </p:stCondLst>
+                      <p:childTnLst>
+                        <p:par>
+                          <p:cTn id="4" fill="hold">
+                            <p:stCondLst>
+                              <p:cond delay="0"/>
+                            </p:stCondLst>
+                            <p:childTnLst>
+                              <p:par>
+                                <p:cTn id="5" presetID="1" presetClass="entr" presetSubtype="0" fill="hold" nodeType="clickEffect">
+                                  <p:stCondLst>
+                                    <p:cond delay="0"/>
+                                  </p:stCondLst>
+                                  <p:childTnLst>
+                                    <p:set>
+                                      <p:cBhvr>
+                                        <p:cTn id="6" dur="1" fill="hold">
+                                          <p:stCondLst>
+                                            <p:cond delay="0"/>
+                                          </p:stCondLst>
+                                        </p:cTn>
+                                        <p:tgtEl>
+                                          <p:spTgt spid="3">
+                                            <p:txEl>
+                                              <p:pRg st="3" end="3"/>
+                                            </p:txEl>
+                                          </p:spTgt>
+                                        </p:tgtEl>
+                                        <p:attrNameLst>
+                                          <p:attrName>style.visibility</p:attrName>
+                                        </p:attrNameLst>
+                                      </p:cBhvr>
+                                      <p:to>
+                                        <p:strVal val="visible"/>
+                                      </p:to>
+                                    </p:set>
+                                  </p:childTnLst>
+                                </p:cTn>
+                              </p:par>
+                              <p:par>
+                                <p:cTn id="7" presetID="1" presetClass="entr" presetSubtype="0" fill="hold" nodeType="withEffect">
+                                  <p:stCondLst>
+                                    <p:cond delay="0"/>
+                                  </p:stCondLst>
+                                  <p:childTnLst>
+                                    <p:set>
+                                      <p:cBhvr>
+                                        <p:cTn id="8" dur="1" fill="hold">
+                                          <p:stCondLst>
+                                            <p:cond delay="0"/>
+                                          </p:stCondLst>
+                                        </p:cTn>
+                                        <p:tgtEl>
+                                          <p:spTgt spid="3">
+                                            <p:txEl>
+                                              <p:pRg st="4" end="4"/>
+                                            </p:txEl>
+                                          </p:spTgt>
+                                        </p:tgtEl>
+                                        <p:attrNameLst>
+                                          <p:attrName>style.visibility</p:attrName>
+                                        </p:attrNameLst>
+                                      </p:cBhvr>
+                                      <p:to>
+                                        <p:strVal val="visible"/>
+                                      </p:to>
+                                    </p:set>
+                                  </p:childTnLst>
+                                </p:cTn>
+                              </p:par>
+                              <p:par>
+                                <p:cTn id="9" presetID="1" presetClass="entr" presetSubtype="0" fill="hold" nodeType="withEffect">
+                                  <p:stCondLst>
+                                    <p:cond delay="0"/>
+                                  </p:stCondLst>
+                                  <p:childTnLst>
+                                    <p:set>
+                                      <p:cBhvr>
+                                        <p:cTn id="10" dur="1" fill="hold">
+                                          <p:stCondLst>
+                                            <p:cond delay="0"/>
+                                          </p:stCondLst>
+                                        </p:cTn>
+                                        <p:tgtEl>
+                                          <p:spTgt spid="3">
+                                            <p:txEl>
+                                              <p:pRg st="5" end="5"/>
+                                            </p:txEl>
+                                          </p:spTgt>
+                                        </p:tgtEl>
+                                        <p:attrNameLst>
+                                          <p:attrName>style.visibility</p:attrName>
+                                        </p:attrNameLst>
+                                      </p:cBhvr>
+                                      <p:to>
+                                        <p:strVal val="visible"/>
+                                      </p:to>
+                                    </p:set>
+                                  </p:childTnLst>
+                                </p:cTn>
+                              </p:par>
+                              <p:par>
+                                <p:cTn id="11" presetID="1" presetClass="entr" presetSubtype="0" fill="hold" nodeType="withEffect">
+                                  <p:stCondLst>
+                                    <p:cond delay="0"/>
+                                  </p:stCondLst>
+                                  <p:childTnLst>
+                                    <p:set>
+                                      <p:cBhvr>
+                                        <p:cTn id="12" dur="1" fill="hold">
+                                          <p:stCondLst>
+                                            <p:cond delay="0"/>
+                                          </p:stCondLst>
+                                        </p:cTn>
+                                        <p:tgtEl>
+                                          <p:spTgt spid="3">
+                                            <p:txEl>
+                                              <p:pRg st="6" end="6"/>
+                                            </p:txEl>
+                                          </p:spTgt>
+                                        </p:tgtEl>
+                                        <p:attrNameLst>
+                                          <p:attrName>style.visibility</p:attrName>
+                                        </p:attrNameLst>
+                                      </p:cBhvr>
+                                      <p:to>
+                                        <p:strVal val="visible"/>
+                                      </p:to>
+                                    </p:set>
+                                  </p:childTnLst>
+                                </p:cTn>
+                              </p:par>
+                            </p:childTnLst>
+                          </p:cTn>
+                        </p:par>
+                      </p:childTnLst>
+                    </p:cTn>
+                  </p:par>
+                </p:childTnLst>
+              </p:cTn>
+              <p:prevCondLst>
+                <p:cond evt="onPrev" delay="0">
+                  <p:tgtEl>
+                    <p:sldTgt/>
+                  </p:tgtEl>
+                </p:cond>
+              </p:prevCondLst>
+              <p:nextCondLst>
+                <p:cond evt="onNext" delay="0">
+                  <p:tgtEl>
+                    <p:sldTgt/>
+                  </p:tgtEl>
+                </p:cond>
+              </p:nextCondLst>
+            </p:seq>
+          </p:childTnLst>
+        </p:cTn>
+      </p:par>
+    </p:tnLst>
+  </p:timing>
+</p:sld>
+</file>
+
+<file path=ppt/slides/slide27.xml><?xml version="1.0" encoding="utf-8"?>
+<p:sld xmlns:a="http://schemas.openxmlformats.org/drawingml/2006/main" xmlns:r="http://schemas.openxmlformats.org/officeDocument/2006/relationships" xmlns:p="http://schemas.openxmlformats.org/presentationml/2006/main">
+  <p:cSld>
+    <p:spTree>
+      <p:nvGrpSpPr>
+        <p:cNvPr id="1" name=""/>
+        <p:cNvGrpSpPr/>
+        <p:nvPr/>
+      </p:nvGrpSpPr>
+      <p:grpSpPr>
+        <a:xfrm>
+          <a:off x="0" y="0"/>
+          <a:ext cx="0" cy="0"/>
+          <a:chOff x="0" y="0"/>
+          <a:chExt cx="0" cy="0"/>
+        </a:xfrm>
+      </p:grpSpPr>
       <p:grpSp>
         <p:nvGrpSpPr>
           <p:cNvPr id="4" name="Group 3"/>
@@ -14144,11 +14426,7 @@
           <a:p>
             <a:r>
               <a:rPr lang="en-US" sz="8000" dirty="0" smtClean="0"/>
-              <a:t>L      u n c h e </a:t>
-            </a:r>
-            <a:r>
-              <a:rPr lang="en-US" sz="8000" dirty="0" smtClean="0"/>
-              <a:t>r</a:t>
+              <a:t>L      u n c h e r</a:t>
             </a:r>
           </a:p>
           <a:p>
@@ -14156,7 +14434,6 @@
               <a:rPr lang="en-US" sz="4400" dirty="0" smtClean="0"/>
               <a:t>installation</a:t>
             </a:r>
-            <a:endParaRPr lang="en-US" sz="4400" dirty="0" smtClean="0"/>
           </a:p>
           <a:p>
             <a:endParaRPr lang="en-US" sz="8000" dirty="0"/>
@@ -14330,7 +14607,7 @@
 </p:sld>
 </file>
 
-<file path=ppt/slides/slide27.xml><?xml version="1.0" encoding="utf-8"?>
+<file path=ppt/slides/slide28.xml><?xml version="1.0" encoding="utf-8"?>
 <p:sld xmlns:a="http://schemas.openxmlformats.org/drawingml/2006/main" xmlns:r="http://schemas.openxmlformats.org/officeDocument/2006/relationships" xmlns:p="http://schemas.openxmlformats.org/presentationml/2006/main">
   <p:cSld>
     <p:spTree>
@@ -14478,7 +14755,7 @@
           <a:p>
             <a:fld id="{1F70BE4E-F0F4-974B-B603-7347B10BD271}" type="slidenum">
               <a:rPr lang="en-US" smtClean="0"/>
-              <a:t>26</a:t>
+              <a:t>27</a:t>
             </a:fld>
             <a:endParaRPr lang="en-US"/>
           </a:p>
@@ -14889,80 +15166,9 @@
   <p:timing>
     <p:tnLst>
       <p:par>
-        <p:cTn xmlns:p14="http://schemas.microsoft.com/office/powerpoint/2010/main" id="1" dur="indefinite" restart="never" nodeType="tmRoot">
-          <p:childTnLst>
-            <p:seq concurrent="1" nextAc="seek">
-              <p:cTn id="2" dur="indefinite" nodeType="mainSeq">
-                <p:childTnLst>
-                  <p:par>
-                    <p:cTn id="3" fill="hold">
-                      <p:stCondLst>
-                        <p:cond delay="indefinite"/>
-                      </p:stCondLst>
-                      <p:childTnLst>
-                        <p:par>
-                          <p:cTn id="4" fill="hold">
-                            <p:stCondLst>
-                              <p:cond delay="0"/>
-                            </p:stCondLst>
-                            <p:childTnLst>
-                              <p:par>
-                                <p:cTn id="5" presetID="1" presetClass="entr" presetSubtype="0" fill="hold" grpId="0" nodeType="clickEffect">
-                                  <p:stCondLst>
-                                    <p:cond delay="0"/>
-                                  </p:stCondLst>
-                                  <p:childTnLst>
-                                    <p:set>
-                                      <p:cBhvr>
-                                        <p:cTn id="6" dur="1" fill="hold">
-                                          <p:stCondLst>
-                                            <p:cond delay="0"/>
-                                          </p:stCondLst>
-                                        </p:cTn>
-                                        <p:tgtEl>
-                                          <p:spTgt spid="23"/>
-                                        </p:tgtEl>
-                                        <p:attrNameLst>
-                                          <p:attrName>style.visibility</p:attrName>
-                                        </p:attrNameLst>
-                                      </p:cBhvr>
-                                      <p:to>
-                                        <p:strVal val="visible"/>
-                                      </p:to>
-                                    </p:set>
-                                  </p:childTnLst>
-                                </p:cTn>
-                              </p:par>
-                            </p:childTnLst>
-                          </p:cTn>
-                        </p:par>
-                      </p:childTnLst>
-                    </p:cTn>
-                  </p:par>
-                </p:childTnLst>
-              </p:cTn>
-              <p:prevCondLst>
-                <p:cond evt="onPrev" delay="0">
-                  <p:tgtEl>
-                    <p:sldTgt/>
-                  </p:tgtEl>
-                </p:cond>
-              </p:prevCondLst>
-              <p:nextCondLst>
-                <p:cond evt="onNext" delay="0">
-                  <p:tgtEl>
-                    <p:sldTgt/>
-                  </p:tgtEl>
-                </p:cond>
-              </p:nextCondLst>
-            </p:seq>
-          </p:childTnLst>
-        </p:cTn>
+        <p:cTn xmlns:p14="http://schemas.microsoft.com/office/powerpoint/2010/main" id="1" dur="indefinite" restart="never" nodeType="tmRoot"/>
       </p:par>
     </p:tnLst>
-    <p:bldLst>
-      <p:bldP spid="23" grpId="0" animBg="1"/>
-    </p:bldLst>
   </p:timing>
 </p:sld>
 </file>

</xml_diff>